<commit_message>
SLD-61 [WIP]: Add processing a series label
</commit_message>
<xml_diff>
--- a/src/SlideDotNet.Tests/Resource/025.pptx
+++ b/src/SlideDotNet.Tests/Resource/025.pptx
@@ -534,6 +534,463 @@
     </mc:Fallback>
   </mc:AlternateContent>
   <c:chart>
+    <c:title>
+      <c:overlay val="0"/>
+      <c:spPr>
+        <a:noFill/>
+        <a:ln>
+          <a:noFill/>
+        </a:ln>
+        <a:effectLst/>
+      </c:spPr>
+      <c:txPr>
+        <a:bodyPr rot="0" spcFirstLastPara="1" vertOverflow="ellipsis" vert="horz" wrap="square" anchor="ctr" anchorCtr="1"/>
+        <a:lstStyle/>
+        <a:p>
+          <a:pPr>
+            <a:defRPr sz="1862" b="0" i="0" u="none" strike="noStrike" kern="1200" spc="0" baseline="0">
+              <a:solidFill>
+                <a:schemeClr val="tx1">
+                  <a:lumMod val="65000"/>
+                  <a:lumOff val="35000"/>
+                </a:schemeClr>
+              </a:solidFill>
+              <a:latin typeface="+mn-lt"/>
+              <a:ea typeface="+mn-ea"/>
+              <a:cs typeface="+mn-cs"/>
+            </a:defRPr>
+          </a:pPr>
+          <a:endParaRPr lang="ru-UA"/>
+        </a:p>
+      </c:txPr>
+    </c:title>
+    <c:autoTitleDeleted val="0"/>
+    <c:plotArea>
+      <c:layout/>
+      <c:barChart>
+        <c:barDir val="col"/>
+        <c:grouping val="clustered"/>
+        <c:varyColors val="0"/>
+        <c:ser>
+          <c:idx val="0"/>
+          <c:order val="0"/>
+          <c:tx>
+            <c:strRef>
+              <c:f>Лист1!$B$1</c:f>
+              <c:strCache>
+                <c:ptCount val="1"/>
+                <c:pt idx="0">
+                  <c:v>Ряд 1</c:v>
+                </c:pt>
+              </c:strCache>
+            </c:strRef>
+          </c:tx>
+          <c:spPr>
+            <a:solidFill>
+              <a:schemeClr val="accent1"/>
+            </a:solidFill>
+            <a:ln>
+              <a:noFill/>
+            </a:ln>
+            <a:effectLst/>
+          </c:spPr>
+          <c:invertIfNegative val="0"/>
+          <c:cat>
+            <c:strRef>
+              <c:f>Лист1!$A$2:$A$5</c:f>
+              <c:strCache>
+                <c:ptCount val="4"/>
+                <c:pt idx="0">
+                  <c:v>Категория 1</c:v>
+                </c:pt>
+                <c:pt idx="1">
+                  <c:v>Категория 2</c:v>
+                </c:pt>
+                <c:pt idx="2">
+                  <c:v>Категория 3</c:v>
+                </c:pt>
+                <c:pt idx="3">
+                  <c:v>Категория 4</c:v>
+                </c:pt>
+              </c:strCache>
+            </c:strRef>
+          </c:cat>
+          <c:val>
+            <c:numRef>
+              <c:f>Лист1!$B$2:$B$5</c:f>
+              <c:numCache>
+                <c:formatCode>General</c:formatCode>
+                <c:ptCount val="4"/>
+                <c:pt idx="0">
+                  <c:v>4.3</c:v>
+                </c:pt>
+                <c:pt idx="1">
+                  <c:v>2.5</c:v>
+                </c:pt>
+                <c:pt idx="2">
+                  <c:v>3.5</c:v>
+                </c:pt>
+                <c:pt idx="3">
+                  <c:v>4.5</c:v>
+                </c:pt>
+              </c:numCache>
+            </c:numRef>
+          </c:val>
+          <c:extLst>
+            <c:ext xmlns:c16="http://schemas.microsoft.com/office/drawing/2014/chart" uri="{C3380CC4-5D6E-409C-BE32-E72D297353CC}">
+              <c16:uniqueId val="{00000000-93DC-4799-AAE9-98785393A436}"/>
+            </c:ext>
+          </c:extLst>
+        </c:ser>
+        <c:ser>
+          <c:idx val="1"/>
+          <c:order val="1"/>
+          <c:tx>
+            <c:strRef>
+              <c:f>Лист1!$C$1</c:f>
+              <c:strCache>
+                <c:ptCount val="1"/>
+                <c:pt idx="0">
+                  <c:v>Ряд 2</c:v>
+                </c:pt>
+              </c:strCache>
+            </c:strRef>
+          </c:tx>
+          <c:spPr>
+            <a:solidFill>
+              <a:schemeClr val="accent2"/>
+            </a:solidFill>
+            <a:ln>
+              <a:noFill/>
+            </a:ln>
+            <a:effectLst/>
+          </c:spPr>
+          <c:invertIfNegative val="0"/>
+          <c:cat>
+            <c:strRef>
+              <c:f>Лист1!$A$2:$A$5</c:f>
+              <c:strCache>
+                <c:ptCount val="4"/>
+                <c:pt idx="0">
+                  <c:v>Категория 1</c:v>
+                </c:pt>
+                <c:pt idx="1">
+                  <c:v>Категория 2</c:v>
+                </c:pt>
+                <c:pt idx="2">
+                  <c:v>Категория 3</c:v>
+                </c:pt>
+                <c:pt idx="3">
+                  <c:v>Категория 4</c:v>
+                </c:pt>
+              </c:strCache>
+            </c:strRef>
+          </c:cat>
+          <c:val>
+            <c:numRef>
+              <c:f>Лист1!$C$2:$C$5</c:f>
+              <c:numCache>
+                <c:formatCode>General</c:formatCode>
+                <c:ptCount val="4"/>
+                <c:pt idx="0">
+                  <c:v>2.4</c:v>
+                </c:pt>
+                <c:pt idx="1">
+                  <c:v>4.4000000000000004</c:v>
+                </c:pt>
+                <c:pt idx="2">
+                  <c:v>1.8</c:v>
+                </c:pt>
+                <c:pt idx="3">
+                  <c:v>2.8</c:v>
+                </c:pt>
+              </c:numCache>
+            </c:numRef>
+          </c:val>
+          <c:extLst>
+            <c:ext xmlns:c16="http://schemas.microsoft.com/office/drawing/2014/chart" uri="{C3380CC4-5D6E-409C-BE32-E72D297353CC}">
+              <c16:uniqueId val="{00000001-93DC-4799-AAE9-98785393A436}"/>
+            </c:ext>
+          </c:extLst>
+        </c:ser>
+        <c:ser>
+          <c:idx val="2"/>
+          <c:order val="2"/>
+          <c:tx>
+            <c:strRef>
+              <c:f>Лист1!$D$1</c:f>
+              <c:strCache>
+                <c:ptCount val="1"/>
+                <c:pt idx="0">
+                  <c:v>Ряд 3</c:v>
+                </c:pt>
+              </c:strCache>
+            </c:strRef>
+          </c:tx>
+          <c:spPr>
+            <a:solidFill>
+              <a:schemeClr val="accent3"/>
+            </a:solidFill>
+            <a:ln>
+              <a:noFill/>
+            </a:ln>
+            <a:effectLst/>
+          </c:spPr>
+          <c:invertIfNegative val="0"/>
+          <c:cat>
+            <c:strRef>
+              <c:f>Лист1!$A$2:$A$5</c:f>
+              <c:strCache>
+                <c:ptCount val="4"/>
+                <c:pt idx="0">
+                  <c:v>Категория 1</c:v>
+                </c:pt>
+                <c:pt idx="1">
+                  <c:v>Категория 2</c:v>
+                </c:pt>
+                <c:pt idx="2">
+                  <c:v>Категория 3</c:v>
+                </c:pt>
+                <c:pt idx="3">
+                  <c:v>Категория 4</c:v>
+                </c:pt>
+              </c:strCache>
+            </c:strRef>
+          </c:cat>
+          <c:val>
+            <c:numRef>
+              <c:f>Лист1!$D$2:$D$5</c:f>
+              <c:numCache>
+                <c:formatCode>General</c:formatCode>
+                <c:ptCount val="4"/>
+                <c:pt idx="0">
+                  <c:v>2</c:v>
+                </c:pt>
+                <c:pt idx="1">
+                  <c:v>2</c:v>
+                </c:pt>
+                <c:pt idx="2">
+                  <c:v>3</c:v>
+                </c:pt>
+                <c:pt idx="3">
+                  <c:v>5</c:v>
+                </c:pt>
+              </c:numCache>
+            </c:numRef>
+          </c:val>
+          <c:extLst>
+            <c:ext xmlns:c16="http://schemas.microsoft.com/office/drawing/2014/chart" uri="{C3380CC4-5D6E-409C-BE32-E72D297353CC}">
+              <c16:uniqueId val="{00000002-93DC-4799-AAE9-98785393A436}"/>
+            </c:ext>
+          </c:extLst>
+        </c:ser>
+        <c:dLbls>
+          <c:showLegendKey val="0"/>
+          <c:showVal val="0"/>
+          <c:showCatName val="0"/>
+          <c:showSerName val="0"/>
+          <c:showPercent val="0"/>
+          <c:showBubbleSize val="0"/>
+        </c:dLbls>
+        <c:gapWidth val="219"/>
+        <c:overlap val="-27"/>
+        <c:axId val="1852838592"/>
+        <c:axId val="1700667152"/>
+      </c:barChart>
+      <c:catAx>
+        <c:axId val="1852838592"/>
+        <c:scaling>
+          <c:orientation val="minMax"/>
+        </c:scaling>
+        <c:delete val="0"/>
+        <c:axPos val="b"/>
+        <c:numFmt formatCode="General" sourceLinked="1"/>
+        <c:majorTickMark val="none"/>
+        <c:minorTickMark val="none"/>
+        <c:tickLblPos val="nextTo"/>
+        <c:spPr>
+          <a:noFill/>
+          <a:ln w="9525" cap="flat" cmpd="sng" algn="ctr">
+            <a:solidFill>
+              <a:schemeClr val="tx1">
+                <a:lumMod val="15000"/>
+                <a:lumOff val="85000"/>
+              </a:schemeClr>
+            </a:solidFill>
+            <a:round/>
+          </a:ln>
+          <a:effectLst/>
+        </c:spPr>
+        <c:txPr>
+          <a:bodyPr rot="-60000000" spcFirstLastPara="1" vertOverflow="ellipsis" vert="horz" wrap="square" anchor="ctr" anchorCtr="1"/>
+          <a:lstStyle/>
+          <a:p>
+            <a:pPr>
+              <a:defRPr sz="1197" b="0" i="0" u="none" strike="noStrike" kern="1200" baseline="0">
+                <a:solidFill>
+                  <a:schemeClr val="tx1">
+                    <a:lumMod val="65000"/>
+                    <a:lumOff val="35000"/>
+                  </a:schemeClr>
+                </a:solidFill>
+                <a:latin typeface="+mn-lt"/>
+                <a:ea typeface="+mn-ea"/>
+                <a:cs typeface="+mn-cs"/>
+              </a:defRPr>
+            </a:pPr>
+            <a:endParaRPr lang="ru-UA"/>
+          </a:p>
+        </c:txPr>
+        <c:crossAx val="1700667152"/>
+        <c:crosses val="autoZero"/>
+        <c:auto val="1"/>
+        <c:lblAlgn val="ctr"/>
+        <c:lblOffset val="100"/>
+        <c:noMultiLvlLbl val="0"/>
+      </c:catAx>
+      <c:valAx>
+        <c:axId val="1700667152"/>
+        <c:scaling>
+          <c:orientation val="minMax"/>
+        </c:scaling>
+        <c:delete val="0"/>
+        <c:axPos val="l"/>
+        <c:majorGridlines>
+          <c:spPr>
+            <a:ln w="9525" cap="flat" cmpd="sng" algn="ctr">
+              <a:solidFill>
+                <a:schemeClr val="tx1">
+                  <a:lumMod val="15000"/>
+                  <a:lumOff val="85000"/>
+                </a:schemeClr>
+              </a:solidFill>
+              <a:round/>
+            </a:ln>
+            <a:effectLst/>
+          </c:spPr>
+        </c:majorGridlines>
+        <c:numFmt formatCode="General" sourceLinked="1"/>
+        <c:majorTickMark val="none"/>
+        <c:minorTickMark val="none"/>
+        <c:tickLblPos val="nextTo"/>
+        <c:spPr>
+          <a:noFill/>
+          <a:ln>
+            <a:noFill/>
+          </a:ln>
+          <a:effectLst/>
+        </c:spPr>
+        <c:txPr>
+          <a:bodyPr rot="-60000000" spcFirstLastPara="1" vertOverflow="ellipsis" vert="horz" wrap="square" anchor="ctr" anchorCtr="1"/>
+          <a:lstStyle/>
+          <a:p>
+            <a:pPr>
+              <a:defRPr sz="1197" b="0" i="0" u="none" strike="noStrike" kern="1200" baseline="0">
+                <a:solidFill>
+                  <a:schemeClr val="tx1">
+                    <a:lumMod val="65000"/>
+                    <a:lumOff val="35000"/>
+                  </a:schemeClr>
+                </a:solidFill>
+                <a:latin typeface="+mn-lt"/>
+                <a:ea typeface="+mn-ea"/>
+                <a:cs typeface="+mn-cs"/>
+              </a:defRPr>
+            </a:pPr>
+            <a:endParaRPr lang="ru-UA"/>
+          </a:p>
+        </c:txPr>
+        <c:crossAx val="1852838592"/>
+        <c:crosses val="autoZero"/>
+        <c:crossBetween val="between"/>
+      </c:valAx>
+      <c:spPr>
+        <a:noFill/>
+        <a:ln>
+          <a:noFill/>
+        </a:ln>
+        <a:effectLst/>
+      </c:spPr>
+    </c:plotArea>
+    <c:legend>
+      <c:legendPos val="b"/>
+      <c:overlay val="0"/>
+      <c:spPr>
+        <a:noFill/>
+        <a:ln>
+          <a:noFill/>
+        </a:ln>
+        <a:effectLst/>
+      </c:spPr>
+      <c:txPr>
+        <a:bodyPr rot="0" spcFirstLastPara="1" vertOverflow="ellipsis" vert="horz" wrap="square" anchor="ctr" anchorCtr="1"/>
+        <a:lstStyle/>
+        <a:p>
+          <a:pPr>
+            <a:defRPr sz="1197" b="0" i="0" u="none" strike="noStrike" kern="1200" baseline="0">
+              <a:solidFill>
+                <a:schemeClr val="tx1">
+                  <a:lumMod val="65000"/>
+                  <a:lumOff val="35000"/>
+                </a:schemeClr>
+              </a:solidFill>
+              <a:latin typeface="+mn-lt"/>
+              <a:ea typeface="+mn-ea"/>
+              <a:cs typeface="+mn-cs"/>
+            </a:defRPr>
+          </a:pPr>
+          <a:endParaRPr lang="ru-UA"/>
+        </a:p>
+      </c:txPr>
+    </c:legend>
+    <c:plotVisOnly val="1"/>
+    <c:dispBlanksAs val="gap"/>
+    <c:extLst>
+      <c:ext xmlns:c16r3="http://schemas.microsoft.com/office/drawing/2017/03/chart" uri="{56B9EC1D-385E-4148-901F-78D8002777C0}">
+        <c16r3:dataDisplayOptions16>
+          <c16r3:dispNaAsBlank val="1"/>
+        </c16r3:dataDisplayOptions16>
+      </c:ext>
+    </c:extLst>
+    <c:showDLblsOverMax val="0"/>
+  </c:chart>
+  <c:spPr>
+    <a:noFill/>
+    <a:ln>
+      <a:noFill/>
+    </a:ln>
+    <a:effectLst/>
+  </c:spPr>
+  <c:txPr>
+    <a:bodyPr/>
+    <a:lstStyle/>
+    <a:p>
+      <a:pPr>
+        <a:defRPr/>
+      </a:pPr>
+      <a:endParaRPr lang="ru-UA"/>
+    </a:p>
+  </c:txPr>
+  <c:externalData r:id="rId3">
+    <c:autoUpdate val="0"/>
+  </c:externalData>
+</c:chartSpace>
+</file>
+
+<file path=ppt/charts/chart4.xml><?xml version="1.0" encoding="utf-8"?>
+<c:chartSpace xmlns:c="http://schemas.openxmlformats.org/drawingml/2006/chart" xmlns:a="http://schemas.openxmlformats.org/drawingml/2006/main" xmlns:r="http://schemas.openxmlformats.org/officeDocument/2006/relationships" xmlns:c16r2="http://schemas.microsoft.com/office/drawing/2015/06/chart">
+  <c:date1904 val="0"/>
+  <c:lang val="ru-RU"/>
+  <c:roundedCorners val="0"/>
+  <mc:AlternateContent xmlns:mc="http://schemas.openxmlformats.org/markup-compatibility/2006">
+    <mc:Choice xmlns:c14="http://schemas.microsoft.com/office/drawing/2007/8/2/chart" Requires="c14">
+      <c14:style val="102"/>
+    </mc:Choice>
+    <mc:Fallback>
+      <c:style val="2"/>
+    </mc:Fallback>
+  </mc:AlternateContent>
+  <c:chart>
     <c:autoTitleDeleted val="0"/>
     <c:plotArea>
       <c:layout>
@@ -631,7 +1088,7 @@
             </c:numRef>
           </c:yVal>
           <c:smooth val="1"/>
-          <c:extLst xmlns:mc="http://schemas.openxmlformats.org/markup-compatibility/2006" xmlns:c14="http://schemas.microsoft.com/office/drawing/2007/8/2/chart" xmlns:c16="http://schemas.microsoft.com/office/drawing/2014/chart">
+          <c:extLst xmlns:c16="http://schemas.microsoft.com/office/drawing/2014/chart" xmlns:c14="http://schemas.microsoft.com/office/drawing/2007/8/2/chart" xmlns:mc="http://schemas.openxmlformats.org/markup-compatibility/2006">
             <c:ext xmlns:c16="http://schemas.microsoft.com/office/drawing/2014/chart" uri="{C3380CC4-5D6E-409C-BE32-E72D297353CC}">
               <c16:uniqueId val="{00000000-9B82-4F0A-BBF2-F487496F06C9}"/>
             </c:ext>
@@ -718,7 +1175,7 @@
             </c:numRef>
           </c:yVal>
           <c:smooth val="1"/>
-          <c:extLst xmlns:mc="http://schemas.openxmlformats.org/markup-compatibility/2006" xmlns:c14="http://schemas.microsoft.com/office/drawing/2007/8/2/chart" xmlns:c16="http://schemas.microsoft.com/office/drawing/2014/chart">
+          <c:extLst xmlns:c16="http://schemas.microsoft.com/office/drawing/2014/chart" xmlns:c14="http://schemas.microsoft.com/office/drawing/2007/8/2/chart" xmlns:mc="http://schemas.openxmlformats.org/markup-compatibility/2006">
             <c:ext xmlns:c16="http://schemas.microsoft.com/office/drawing/2014/chart" uri="{C3380CC4-5D6E-409C-BE32-E72D297353CC}">
               <c16:uniqueId val="{00000001-9B82-4F0A-BBF2-F487496F06C9}"/>
             </c:ext>
@@ -805,7 +1262,7 @@
             </c:numRef>
           </c:yVal>
           <c:smooth val="1"/>
-          <c:extLst xmlns:mc="http://schemas.openxmlformats.org/markup-compatibility/2006" xmlns:c14="http://schemas.microsoft.com/office/drawing/2007/8/2/chart" xmlns:c16="http://schemas.microsoft.com/office/drawing/2014/chart">
+          <c:extLst xmlns:c16="http://schemas.microsoft.com/office/drawing/2014/chart" xmlns:c14="http://schemas.microsoft.com/office/drawing/2007/8/2/chart" xmlns:mc="http://schemas.openxmlformats.org/markup-compatibility/2006">
             <c:ext xmlns:c16="http://schemas.microsoft.com/office/drawing/2014/chart" uri="{C3380CC4-5D6E-409C-BE32-E72D297353CC}">
               <c16:uniqueId val="{00000002-9B82-4F0A-BBF2-F487496F06C9}"/>
             </c:ext>
@@ -1040,6 +1497,46 @@
 </cs:colorStyle>
 </file>
 
+<file path=ppt/charts/colors3.xml><?xml version="1.0" encoding="utf-8"?>
+<cs:colorStyle xmlns:cs="http://schemas.microsoft.com/office/drawing/2012/chartStyle" xmlns:a="http://schemas.openxmlformats.org/drawingml/2006/main" meth="cycle" id="10">
+  <a:schemeClr val="accent1"/>
+  <a:schemeClr val="accent2"/>
+  <a:schemeClr val="accent3"/>
+  <a:schemeClr val="accent4"/>
+  <a:schemeClr val="accent5"/>
+  <a:schemeClr val="accent6"/>
+  <cs:variation/>
+  <cs:variation>
+    <a:lumMod val="60000"/>
+  </cs:variation>
+  <cs:variation>
+    <a:lumMod val="80000"/>
+    <a:lumOff val="20000"/>
+  </cs:variation>
+  <cs:variation>
+    <a:lumMod val="80000"/>
+  </cs:variation>
+  <cs:variation>
+    <a:lumMod val="60000"/>
+    <a:lumOff val="40000"/>
+  </cs:variation>
+  <cs:variation>
+    <a:lumMod val="50000"/>
+  </cs:variation>
+  <cs:variation>
+    <a:lumMod val="70000"/>
+    <a:lumOff val="30000"/>
+  </cs:variation>
+  <cs:variation>
+    <a:lumMod val="70000"/>
+  </cs:variation>
+  <cs:variation>
+    <a:lumMod val="50000"/>
+    <a:lumOff val="50000"/>
+  </cs:variation>
+</cs:colorStyle>
+</file>
+
 <file path=ppt/charts/style1.xml><?xml version="1.0" encoding="utf-8"?>
 <cs:chartStyle xmlns:cs="http://schemas.microsoft.com/office/drawing/2012/chartStyle" xmlns:a="http://schemas.openxmlformats.org/drawingml/2006/main" id="216">
   <cs:axisTitle>
@@ -1546,6 +2043,509 @@
 </file>
 
 <file path=ppt/charts/style2.xml><?xml version="1.0" encoding="utf-8"?>
+<cs:chartStyle xmlns:cs="http://schemas.microsoft.com/office/drawing/2012/chartStyle" xmlns:a="http://schemas.openxmlformats.org/drawingml/2006/main" id="201">
+  <cs:axisTitle>
+    <cs:lnRef idx="0"/>
+    <cs:fillRef idx="0"/>
+    <cs:effectRef idx="0"/>
+    <cs:fontRef idx="minor">
+      <a:schemeClr val="tx1">
+        <a:lumMod val="65000"/>
+        <a:lumOff val="35000"/>
+      </a:schemeClr>
+    </cs:fontRef>
+    <cs:defRPr sz="1330" kern="1200"/>
+  </cs:axisTitle>
+  <cs:categoryAxis>
+    <cs:lnRef idx="0"/>
+    <cs:fillRef idx="0"/>
+    <cs:effectRef idx="0"/>
+    <cs:fontRef idx="minor">
+      <a:schemeClr val="tx1">
+        <a:lumMod val="65000"/>
+        <a:lumOff val="35000"/>
+      </a:schemeClr>
+    </cs:fontRef>
+    <cs:spPr>
+      <a:ln w="9525" cap="flat" cmpd="sng" algn="ctr">
+        <a:solidFill>
+          <a:schemeClr val="tx1">
+            <a:lumMod val="15000"/>
+            <a:lumOff val="85000"/>
+          </a:schemeClr>
+        </a:solidFill>
+        <a:round/>
+      </a:ln>
+    </cs:spPr>
+    <cs:defRPr sz="1197" kern="1200"/>
+  </cs:categoryAxis>
+  <cs:chartArea mods="allowNoFillOverride allowNoLineOverride">
+    <cs:lnRef idx="0"/>
+    <cs:fillRef idx="0"/>
+    <cs:effectRef idx="0"/>
+    <cs:fontRef idx="minor">
+      <a:schemeClr val="tx1"/>
+    </cs:fontRef>
+    <cs:spPr>
+      <a:solidFill>
+        <a:schemeClr val="bg1"/>
+      </a:solidFill>
+      <a:ln w="9525" cap="flat" cmpd="sng" algn="ctr">
+        <a:solidFill>
+          <a:schemeClr val="tx1">
+            <a:lumMod val="15000"/>
+            <a:lumOff val="85000"/>
+          </a:schemeClr>
+        </a:solidFill>
+        <a:round/>
+      </a:ln>
+    </cs:spPr>
+    <cs:defRPr sz="1330" kern="1200"/>
+  </cs:chartArea>
+  <cs:dataLabel>
+    <cs:lnRef idx="0"/>
+    <cs:fillRef idx="0"/>
+    <cs:effectRef idx="0"/>
+    <cs:fontRef idx="minor">
+      <a:schemeClr val="tx1">
+        <a:lumMod val="75000"/>
+        <a:lumOff val="25000"/>
+      </a:schemeClr>
+    </cs:fontRef>
+    <cs:defRPr sz="1197" kern="1200"/>
+  </cs:dataLabel>
+  <cs:dataLabelCallout>
+    <cs:lnRef idx="0"/>
+    <cs:fillRef idx="0"/>
+    <cs:effectRef idx="0"/>
+    <cs:fontRef idx="minor">
+      <a:schemeClr val="dk1">
+        <a:lumMod val="65000"/>
+        <a:lumOff val="35000"/>
+      </a:schemeClr>
+    </cs:fontRef>
+    <cs:spPr>
+      <a:solidFill>
+        <a:schemeClr val="lt1"/>
+      </a:solidFill>
+      <a:ln>
+        <a:solidFill>
+          <a:schemeClr val="dk1">
+            <a:lumMod val="25000"/>
+            <a:lumOff val="75000"/>
+          </a:schemeClr>
+        </a:solidFill>
+      </a:ln>
+    </cs:spPr>
+    <cs:defRPr sz="1197" kern="1200"/>
+    <cs:bodyPr rot="0" spcFirstLastPara="1" vertOverflow="clip" horzOverflow="clip" vert="horz" wrap="square" lIns="36576" tIns="18288" rIns="36576" bIns="18288" anchor="ctr" anchorCtr="1">
+      <a:spAutoFit/>
+    </cs:bodyPr>
+  </cs:dataLabelCallout>
+  <cs:dataPoint>
+    <cs:lnRef idx="0"/>
+    <cs:fillRef idx="1">
+      <cs:styleClr val="auto"/>
+    </cs:fillRef>
+    <cs:effectRef idx="0"/>
+    <cs:fontRef idx="minor">
+      <a:schemeClr val="tx1"/>
+    </cs:fontRef>
+  </cs:dataPoint>
+  <cs:dataPoint3D>
+    <cs:lnRef idx="0"/>
+    <cs:fillRef idx="1">
+      <cs:styleClr val="auto"/>
+    </cs:fillRef>
+    <cs:effectRef idx="0"/>
+    <cs:fontRef idx="minor">
+      <a:schemeClr val="tx1"/>
+    </cs:fontRef>
+  </cs:dataPoint3D>
+  <cs:dataPointLine>
+    <cs:lnRef idx="0">
+      <cs:styleClr val="auto"/>
+    </cs:lnRef>
+    <cs:fillRef idx="1"/>
+    <cs:effectRef idx="0"/>
+    <cs:fontRef idx="minor">
+      <a:schemeClr val="tx1"/>
+    </cs:fontRef>
+    <cs:spPr>
+      <a:ln w="28575" cap="rnd">
+        <a:solidFill>
+          <a:schemeClr val="phClr"/>
+        </a:solidFill>
+        <a:round/>
+      </a:ln>
+    </cs:spPr>
+  </cs:dataPointLine>
+  <cs:dataPointMarker>
+    <cs:lnRef idx="0">
+      <cs:styleClr val="auto"/>
+    </cs:lnRef>
+    <cs:fillRef idx="1">
+      <cs:styleClr val="auto"/>
+    </cs:fillRef>
+    <cs:effectRef idx="0"/>
+    <cs:fontRef idx="minor">
+      <a:schemeClr val="tx1"/>
+    </cs:fontRef>
+    <cs:spPr>
+      <a:ln w="9525">
+        <a:solidFill>
+          <a:schemeClr val="phClr"/>
+        </a:solidFill>
+      </a:ln>
+    </cs:spPr>
+  </cs:dataPointMarker>
+  <cs:dataPointMarkerLayout symbol="circle" size="5"/>
+  <cs:dataPointWireframe>
+    <cs:lnRef idx="0">
+      <cs:styleClr val="auto"/>
+    </cs:lnRef>
+    <cs:fillRef idx="1"/>
+    <cs:effectRef idx="0"/>
+    <cs:fontRef idx="minor">
+      <a:schemeClr val="tx1"/>
+    </cs:fontRef>
+    <cs:spPr>
+      <a:ln w="9525" cap="rnd">
+        <a:solidFill>
+          <a:schemeClr val="phClr"/>
+        </a:solidFill>
+        <a:round/>
+      </a:ln>
+    </cs:spPr>
+  </cs:dataPointWireframe>
+  <cs:dataTable>
+    <cs:lnRef idx="0"/>
+    <cs:fillRef idx="0"/>
+    <cs:effectRef idx="0"/>
+    <cs:fontRef idx="minor">
+      <a:schemeClr val="tx1">
+        <a:lumMod val="65000"/>
+        <a:lumOff val="35000"/>
+      </a:schemeClr>
+    </cs:fontRef>
+    <cs:spPr>
+      <a:noFill/>
+      <a:ln w="9525" cap="flat" cmpd="sng" algn="ctr">
+        <a:solidFill>
+          <a:schemeClr val="tx1">
+            <a:lumMod val="15000"/>
+            <a:lumOff val="85000"/>
+          </a:schemeClr>
+        </a:solidFill>
+        <a:round/>
+      </a:ln>
+    </cs:spPr>
+    <cs:defRPr sz="1197" kern="1200"/>
+  </cs:dataTable>
+  <cs:downBar>
+    <cs:lnRef idx="0"/>
+    <cs:fillRef idx="0"/>
+    <cs:effectRef idx="0"/>
+    <cs:fontRef idx="minor">
+      <a:schemeClr val="dk1"/>
+    </cs:fontRef>
+    <cs:spPr>
+      <a:solidFill>
+        <a:schemeClr val="dk1">
+          <a:lumMod val="65000"/>
+          <a:lumOff val="35000"/>
+        </a:schemeClr>
+      </a:solidFill>
+      <a:ln w="9525">
+        <a:solidFill>
+          <a:schemeClr val="tx1">
+            <a:lumMod val="65000"/>
+            <a:lumOff val="35000"/>
+          </a:schemeClr>
+        </a:solidFill>
+      </a:ln>
+    </cs:spPr>
+  </cs:downBar>
+  <cs:dropLine>
+    <cs:lnRef idx="0"/>
+    <cs:fillRef idx="0"/>
+    <cs:effectRef idx="0"/>
+    <cs:fontRef idx="minor">
+      <a:schemeClr val="tx1"/>
+    </cs:fontRef>
+    <cs:spPr>
+      <a:ln w="9525" cap="flat" cmpd="sng" algn="ctr">
+        <a:solidFill>
+          <a:schemeClr val="tx1">
+            <a:lumMod val="35000"/>
+            <a:lumOff val="65000"/>
+          </a:schemeClr>
+        </a:solidFill>
+        <a:round/>
+      </a:ln>
+    </cs:spPr>
+  </cs:dropLine>
+  <cs:errorBar>
+    <cs:lnRef idx="0"/>
+    <cs:fillRef idx="0"/>
+    <cs:effectRef idx="0"/>
+    <cs:fontRef idx="minor">
+      <a:schemeClr val="tx1"/>
+    </cs:fontRef>
+    <cs:spPr>
+      <a:ln w="9525" cap="flat" cmpd="sng" algn="ctr">
+        <a:solidFill>
+          <a:schemeClr val="tx1">
+            <a:lumMod val="65000"/>
+            <a:lumOff val="35000"/>
+          </a:schemeClr>
+        </a:solidFill>
+        <a:round/>
+      </a:ln>
+    </cs:spPr>
+  </cs:errorBar>
+  <cs:floor>
+    <cs:lnRef idx="0"/>
+    <cs:fillRef idx="0"/>
+    <cs:effectRef idx="0"/>
+    <cs:fontRef idx="minor">
+      <a:schemeClr val="tx1"/>
+    </cs:fontRef>
+    <cs:spPr>
+      <a:noFill/>
+      <a:ln>
+        <a:noFill/>
+      </a:ln>
+    </cs:spPr>
+  </cs:floor>
+  <cs:gridlineMajor>
+    <cs:lnRef idx="0"/>
+    <cs:fillRef idx="0"/>
+    <cs:effectRef idx="0"/>
+    <cs:fontRef idx="minor">
+      <a:schemeClr val="tx1"/>
+    </cs:fontRef>
+    <cs:spPr>
+      <a:ln w="9525" cap="flat" cmpd="sng" algn="ctr">
+        <a:solidFill>
+          <a:schemeClr val="tx1">
+            <a:lumMod val="15000"/>
+            <a:lumOff val="85000"/>
+          </a:schemeClr>
+        </a:solidFill>
+        <a:round/>
+      </a:ln>
+    </cs:spPr>
+  </cs:gridlineMajor>
+  <cs:gridlineMinor>
+    <cs:lnRef idx="0"/>
+    <cs:fillRef idx="0"/>
+    <cs:effectRef idx="0"/>
+    <cs:fontRef idx="minor">
+      <a:schemeClr val="tx1"/>
+    </cs:fontRef>
+    <cs:spPr>
+      <a:ln w="9525" cap="flat" cmpd="sng" algn="ctr">
+        <a:solidFill>
+          <a:schemeClr val="tx1">
+            <a:lumMod val="5000"/>
+            <a:lumOff val="95000"/>
+          </a:schemeClr>
+        </a:solidFill>
+        <a:round/>
+      </a:ln>
+    </cs:spPr>
+  </cs:gridlineMinor>
+  <cs:hiLoLine>
+    <cs:lnRef idx="0"/>
+    <cs:fillRef idx="0"/>
+    <cs:effectRef idx="0"/>
+    <cs:fontRef idx="minor">
+      <a:schemeClr val="tx1"/>
+    </cs:fontRef>
+    <cs:spPr>
+      <a:ln w="9525" cap="flat" cmpd="sng" algn="ctr">
+        <a:solidFill>
+          <a:schemeClr val="tx1">
+            <a:lumMod val="75000"/>
+            <a:lumOff val="25000"/>
+          </a:schemeClr>
+        </a:solidFill>
+        <a:round/>
+      </a:ln>
+    </cs:spPr>
+  </cs:hiLoLine>
+  <cs:leaderLine>
+    <cs:lnRef idx="0"/>
+    <cs:fillRef idx="0"/>
+    <cs:effectRef idx="0"/>
+    <cs:fontRef idx="minor">
+      <a:schemeClr val="tx1"/>
+    </cs:fontRef>
+    <cs:spPr>
+      <a:ln w="9525" cap="flat" cmpd="sng" algn="ctr">
+        <a:solidFill>
+          <a:schemeClr val="tx1">
+            <a:lumMod val="35000"/>
+            <a:lumOff val="65000"/>
+          </a:schemeClr>
+        </a:solidFill>
+        <a:round/>
+      </a:ln>
+    </cs:spPr>
+  </cs:leaderLine>
+  <cs:legend>
+    <cs:lnRef idx="0"/>
+    <cs:fillRef idx="0"/>
+    <cs:effectRef idx="0"/>
+    <cs:fontRef idx="minor">
+      <a:schemeClr val="tx1">
+        <a:lumMod val="65000"/>
+        <a:lumOff val="35000"/>
+      </a:schemeClr>
+    </cs:fontRef>
+    <cs:defRPr sz="1197" kern="1200"/>
+  </cs:legend>
+  <cs:plotArea mods="allowNoFillOverride allowNoLineOverride">
+    <cs:lnRef idx="0"/>
+    <cs:fillRef idx="0"/>
+    <cs:effectRef idx="0"/>
+    <cs:fontRef idx="minor">
+      <a:schemeClr val="tx1"/>
+    </cs:fontRef>
+  </cs:plotArea>
+  <cs:plotArea3D mods="allowNoFillOverride allowNoLineOverride">
+    <cs:lnRef idx="0"/>
+    <cs:fillRef idx="0"/>
+    <cs:effectRef idx="0"/>
+    <cs:fontRef idx="minor">
+      <a:schemeClr val="tx1"/>
+    </cs:fontRef>
+  </cs:plotArea3D>
+  <cs:seriesAxis>
+    <cs:lnRef idx="0"/>
+    <cs:fillRef idx="0"/>
+    <cs:effectRef idx="0"/>
+    <cs:fontRef idx="minor">
+      <a:schemeClr val="tx1">
+        <a:lumMod val="65000"/>
+        <a:lumOff val="35000"/>
+      </a:schemeClr>
+    </cs:fontRef>
+    <cs:defRPr sz="1197" kern="1200"/>
+  </cs:seriesAxis>
+  <cs:seriesLine>
+    <cs:lnRef idx="0"/>
+    <cs:fillRef idx="0"/>
+    <cs:effectRef idx="0"/>
+    <cs:fontRef idx="minor">
+      <a:schemeClr val="tx1"/>
+    </cs:fontRef>
+    <cs:spPr>
+      <a:ln w="9525" cap="flat" cmpd="sng" algn="ctr">
+        <a:solidFill>
+          <a:schemeClr val="tx1">
+            <a:lumMod val="35000"/>
+            <a:lumOff val="65000"/>
+          </a:schemeClr>
+        </a:solidFill>
+        <a:round/>
+      </a:ln>
+    </cs:spPr>
+  </cs:seriesLine>
+  <cs:title>
+    <cs:lnRef idx="0"/>
+    <cs:fillRef idx="0"/>
+    <cs:effectRef idx="0"/>
+    <cs:fontRef idx="minor">
+      <a:schemeClr val="tx1">
+        <a:lumMod val="65000"/>
+        <a:lumOff val="35000"/>
+      </a:schemeClr>
+    </cs:fontRef>
+    <cs:defRPr sz="1862" b="0" kern="1200" spc="0" baseline="0"/>
+  </cs:title>
+  <cs:trendline>
+    <cs:lnRef idx="0">
+      <cs:styleClr val="auto"/>
+    </cs:lnRef>
+    <cs:fillRef idx="0"/>
+    <cs:effectRef idx="0"/>
+    <cs:fontRef idx="minor">
+      <a:schemeClr val="tx1"/>
+    </cs:fontRef>
+    <cs:spPr>
+      <a:ln w="19050" cap="rnd">
+        <a:solidFill>
+          <a:schemeClr val="phClr"/>
+        </a:solidFill>
+        <a:prstDash val="sysDot"/>
+      </a:ln>
+    </cs:spPr>
+  </cs:trendline>
+  <cs:trendlineLabel>
+    <cs:lnRef idx="0"/>
+    <cs:fillRef idx="0"/>
+    <cs:effectRef idx="0"/>
+    <cs:fontRef idx="minor">
+      <a:schemeClr val="tx1">
+        <a:lumMod val="65000"/>
+        <a:lumOff val="35000"/>
+      </a:schemeClr>
+    </cs:fontRef>
+    <cs:defRPr sz="1197" kern="1200"/>
+  </cs:trendlineLabel>
+  <cs:upBar>
+    <cs:lnRef idx="0"/>
+    <cs:fillRef idx="0"/>
+    <cs:effectRef idx="0"/>
+    <cs:fontRef idx="minor">
+      <a:schemeClr val="dk1"/>
+    </cs:fontRef>
+    <cs:spPr>
+      <a:solidFill>
+        <a:schemeClr val="lt1"/>
+      </a:solidFill>
+      <a:ln w="9525">
+        <a:solidFill>
+          <a:schemeClr val="tx1">
+            <a:lumMod val="15000"/>
+            <a:lumOff val="85000"/>
+          </a:schemeClr>
+        </a:solidFill>
+      </a:ln>
+    </cs:spPr>
+  </cs:upBar>
+  <cs:valueAxis>
+    <cs:lnRef idx="0"/>
+    <cs:fillRef idx="0"/>
+    <cs:effectRef idx="0"/>
+    <cs:fontRef idx="minor">
+      <a:schemeClr val="tx1">
+        <a:lumMod val="65000"/>
+        <a:lumOff val="35000"/>
+      </a:schemeClr>
+    </cs:fontRef>
+    <cs:defRPr sz="1197" kern="1200"/>
+  </cs:valueAxis>
+  <cs:wall>
+    <cs:lnRef idx="0"/>
+    <cs:fillRef idx="0"/>
+    <cs:effectRef idx="0"/>
+    <cs:fontRef idx="minor">
+      <a:schemeClr val="tx1"/>
+    </cs:fontRef>
+    <cs:spPr>
+      <a:noFill/>
+      <a:ln>
+        <a:noFill/>
+      </a:ln>
+    </cs:spPr>
+  </cs:wall>
+</cs:chartStyle>
+</file>
+
+<file path=ppt/charts/style3.xml><?xml version="1.0" encoding="utf-8"?>
 <cs:chartStyle xmlns:cs="http://schemas.microsoft.com/office/drawing/2012/chartStyle" xmlns:a="http://schemas.openxmlformats.org/drawingml/2006/main" id="102">
   <cs:axisTitle>
     <cs:lnRef idx="0"/>
@@ -2071,7 +3071,7 @@
               <a:rPr lang="en-US" smtClean="0">
                 <a:latin typeface="Arial" panose="020B0604020202020204" pitchFamily="34" charset="0"/>
               </a:rPr>
-              <a:t>4/27/2020</a:t>
+              <a:t>5/9/2020</a:t>
             </a:fld>
             <a:endParaRPr lang="en-US" dirty="0">
               <a:latin typeface="Arial" panose="020B0604020202020204" pitchFamily="34" charset="0"/>
@@ -2250,7 +3250,7 @@
             <a:fld id="{0BA5BBE4-AEA3-489A-A28E-0C2FAF2506E3}" type="datetimeFigureOut">
               <a:rPr lang="en-US" smtClean="0"/>
               <a:pPr/>
-              <a:t>4/27/2020</a:t>
+              <a:t>5/9/2020</a:t>
             </a:fld>
             <a:endParaRPr lang="en-US" dirty="0"/>
           </a:p>
@@ -2986,7 +3986,7 @@
           <a:graphicData uri="http://schemas.openxmlformats.org/presentationml/2006/ole">
             <mc:AlternateContent xmlns:mc="http://schemas.openxmlformats.org/markup-compatibility/2006">
               <mc:Choice xmlns:v="urn:schemas-microsoft-com:vml" Requires="v">
-                <p:oleObj spid="_x0000_s2357" name="think-cell Slide" r:id="rId5" imgW="270" imgH="270" progId="TCLayout.ActiveDocument.1">
+                <p:oleObj spid="_x0000_s2358" name="think-cell Slide" r:id="rId5" imgW="270" imgH="270" progId="TCLayout.ActiveDocument.1">
                   <p:embed/>
                 </p:oleObj>
               </mc:Choice>
@@ -3771,6 +4771,34 @@
           </a:graphicData>
         </a:graphic>
       </p:graphicFrame>
+      <p:graphicFrame>
+        <p:nvGraphicFramePr>
+          <p:cNvPr id="5" name="Диаграмма 4">
+            <a:extLst>
+              <a:ext uri="{FF2B5EF4-FFF2-40B4-BE49-F238E27FC236}">
+                <a16:creationId xmlns:a16="http://schemas.microsoft.com/office/drawing/2014/main" id="{98117D74-43FF-4698-B23E-D3330C496EEE}"/>
+              </a:ext>
+            </a:extLst>
+          </p:cNvPr>
+          <p:cNvGraphicFramePr/>
+          <p:nvPr>
+            <p:extLst>
+              <p:ext uri="{D42A27DB-BD31-4B8C-83A1-F6EECF244321}">
+                <p14:modId xmlns:p14="http://schemas.microsoft.com/office/powerpoint/2010/main" val="893949083"/>
+              </p:ext>
+            </p:extLst>
+          </p:nvPr>
+        </p:nvGraphicFramePr>
+        <p:xfrm>
+          <a:off x="590479" y="3683299"/>
+          <a:ext cx="4572000" cy="2844848"/>
+        </p:xfrm>
+        <a:graphic>
+          <a:graphicData uri="http://schemas.openxmlformats.org/drawingml/2006/chart">
+            <c:chart xmlns:c="http://schemas.openxmlformats.org/drawingml/2006/chart" xmlns:r="http://schemas.openxmlformats.org/officeDocument/2006/relationships" r:id="rId5"/>
+          </a:graphicData>
+        </a:graphic>
+      </p:graphicFrame>
     </p:spTree>
     <p:extLst>
       <p:ext uri="{BB962C8B-B14F-4D97-AF65-F5344CB8AC3E}">
@@ -3787,7 +4815,7 @@
         <p:fade/>
       </p:transition>
     </mc:Choice>
-    <mc:Fallback xmlns="" xmlns:c="http://schemas.openxmlformats.org/drawingml/2006/chart" xmlns:v="urn:schemas-microsoft-com:vml">
+    <mc:Fallback xmlns:v="urn:schemas-microsoft-com:vml" xmlns:c="http://schemas.openxmlformats.org/drawingml/2006/chart" xmlns="">
       <p:transition spd="med">
         <p:fade/>
       </p:transition>

</xml_diff>

<commit_message>
SLD-61: Add processing a series label
</commit_message>
<xml_diff>
--- a/src/SlideDotNet.Tests/Resource/025.pptx
+++ b/src/SlideDotNet.Tests/Resource/025.pptx
@@ -165,7 +165,7 @@
 <file path=ppt/charts/chart1.xml><?xml version="1.0" encoding="utf-8"?>
 <c:chartSpace xmlns:c="http://schemas.openxmlformats.org/drawingml/2006/chart" xmlns:a="http://schemas.openxmlformats.org/drawingml/2006/main" xmlns:r="http://schemas.openxmlformats.org/officeDocument/2006/relationships" xmlns:c16r2="http://schemas.microsoft.com/office/drawing/2015/06/chart">
   <c:date1904 val="0"/>
-  <c:lang val="ru-RU"/>
+  <c:lang val="en-US"/>
   <c:roundedCorners val="0"/>
   <mc:AlternateContent xmlns:mc="http://schemas.openxmlformats.org/markup-compatibility/2006">
     <mc:Choice xmlns:c14="http://schemas.microsoft.com/office/drawing/2007/8/2/chart" Requires="c14">
@@ -228,7 +228,7 @@
               </a:solidFill>
             </a:defRPr>
           </a:pPr>
-          <a:endParaRPr lang="ru-UA"/>
+          <a:endParaRPr lang="LID4096"/>
         </a:p>
       </c:txPr>
     </c:legend>
@@ -243,7 +243,7 @@
       <a:pPr>
         <a:defRPr sz="1800"/>
       </a:pPr>
-      <a:endParaRPr lang="ru-UA"/>
+      <a:endParaRPr lang="LID4096"/>
     </a:p>
   </c:txPr>
   <c:externalData r:id="rId1">
@@ -255,7 +255,7 @@
 <file path=ppt/charts/chart2.xml><?xml version="1.0" encoding="utf-8"?>
 <c:chartSpace xmlns:c="http://schemas.openxmlformats.org/drawingml/2006/chart" xmlns:a="http://schemas.openxmlformats.org/drawingml/2006/main" xmlns:r="http://schemas.openxmlformats.org/officeDocument/2006/relationships" xmlns:c16r2="http://schemas.microsoft.com/office/drawing/2015/06/chart">
   <c:date1904 val="0"/>
-  <c:lang val="ru-RU"/>
+  <c:lang val="en-US"/>
   <c:roundedCorners val="0"/>
   <mc:AlternateContent xmlns:mc="http://schemas.openxmlformats.org/markup-compatibility/2006">
     <mc:Choice xmlns:c14="http://schemas.microsoft.com/office/drawing/2007/8/2/chart" Requires="c14">
@@ -412,7 +412,7 @@
                 <a:cs typeface="+mn-cs"/>
               </a:defRPr>
             </a:pPr>
-            <a:endParaRPr lang="ru-UA"/>
+            <a:endParaRPr lang="LID4096"/>
           </a:p>
         </c:txPr>
         <c:crossAx val="162226143"/>
@@ -471,7 +471,7 @@
                 <a:cs typeface="+mn-cs"/>
               </a:defRPr>
             </a:pPr>
-            <a:endParaRPr lang="ru-UA"/>
+            <a:endParaRPr lang="LID4096"/>
           </a:p>
         </c:txPr>
         <c:crossAx val="252470559"/>
@@ -511,7 +511,7 @@
       <a:pPr>
         <a:defRPr/>
       </a:pPr>
-      <a:endParaRPr lang="ru-UA"/>
+      <a:endParaRPr lang="LID4096"/>
     </a:p>
   </c:txPr>
   <c:externalData r:id="rId4">
@@ -523,7 +523,7 @@
 <file path=ppt/charts/chart3.xml><?xml version="1.0" encoding="utf-8"?>
 <c:chartSpace xmlns:c="http://schemas.openxmlformats.org/drawingml/2006/chart" xmlns:a="http://schemas.openxmlformats.org/drawingml/2006/main" xmlns:r="http://schemas.openxmlformats.org/officeDocument/2006/relationships" xmlns:c16r2="http://schemas.microsoft.com/office/drawing/2015/06/chart">
   <c:date1904 val="0"/>
-  <c:lang val="ru-RU"/>
+  <c:lang val="en-US"/>
   <c:roundedCorners val="0"/>
   <mc:AlternateContent xmlns:mc="http://schemas.openxmlformats.org/markup-compatibility/2006">
     <mc:Choice xmlns:c14="http://schemas.microsoft.com/office/drawing/2007/8/2/chart" Requires="c14">
@@ -560,7 +560,7 @@
               <a:cs typeface="+mn-cs"/>
             </a:defRPr>
           </a:pPr>
-          <a:endParaRPr lang="ru-UA"/>
+          <a:endParaRPr lang="LID4096"/>
         </a:p>
       </c:txPr>
     </c:title>
@@ -838,7 +838,7 @@
                 <a:cs typeface="+mn-cs"/>
               </a:defRPr>
             </a:pPr>
-            <a:endParaRPr lang="ru-UA"/>
+            <a:endParaRPr lang="LID4096"/>
           </a:p>
         </c:txPr>
         <c:crossAx val="1700667152"/>
@@ -897,7 +897,7 @@
                 <a:cs typeface="+mn-cs"/>
               </a:defRPr>
             </a:pPr>
-            <a:endParaRPr lang="ru-UA"/>
+            <a:endParaRPr lang="LID4096"/>
           </a:p>
         </c:txPr>
         <c:crossAx val="1852838592"/>
@@ -939,7 +939,7 @@
               <a:cs typeface="+mn-cs"/>
             </a:defRPr>
           </a:pPr>
-          <a:endParaRPr lang="ru-UA"/>
+          <a:endParaRPr lang="LID4096"/>
         </a:p>
       </c:txPr>
     </c:legend>
@@ -968,7 +968,7 @@
       <a:pPr>
         <a:defRPr/>
       </a:pPr>
-      <a:endParaRPr lang="ru-UA"/>
+      <a:endParaRPr lang="LID4096"/>
     </a:p>
   </c:txPr>
   <c:externalData r:id="rId3">
@@ -980,7 +980,488 @@
 <file path=ppt/charts/chart4.xml><?xml version="1.0" encoding="utf-8"?>
 <c:chartSpace xmlns:c="http://schemas.openxmlformats.org/drawingml/2006/chart" xmlns:a="http://schemas.openxmlformats.org/drawingml/2006/main" xmlns:r="http://schemas.openxmlformats.org/officeDocument/2006/relationships" xmlns:c16r2="http://schemas.microsoft.com/office/drawing/2015/06/chart">
   <c:date1904 val="0"/>
-  <c:lang val="ru-RU"/>
+  <c:lang val="en-US"/>
+  <c:roundedCorners val="0"/>
+  <mc:AlternateContent xmlns:mc="http://schemas.openxmlformats.org/markup-compatibility/2006">
+    <mc:Choice xmlns:c14="http://schemas.microsoft.com/office/drawing/2007/8/2/chart" Requires="c14">
+      <c14:style val="102"/>
+    </mc:Choice>
+    <mc:Fallback>
+      <c:style val="2"/>
+    </mc:Fallback>
+  </mc:AlternateContent>
+  <c:chart>
+    <c:title>
+      <c:overlay val="0"/>
+      <c:spPr>
+        <a:noFill/>
+        <a:ln>
+          <a:noFill/>
+        </a:ln>
+        <a:effectLst/>
+      </c:spPr>
+      <c:txPr>
+        <a:bodyPr rot="0" spcFirstLastPara="1" vertOverflow="ellipsis" vert="horz" wrap="square" anchor="ctr" anchorCtr="1"/>
+        <a:lstStyle/>
+        <a:p>
+          <a:pPr>
+            <a:defRPr sz="960" b="0" i="0" u="none" strike="noStrike" kern="1200" spc="0" baseline="0">
+              <a:solidFill>
+                <a:schemeClr val="tx1">
+                  <a:lumMod val="65000"/>
+                  <a:lumOff val="35000"/>
+                </a:schemeClr>
+              </a:solidFill>
+              <a:latin typeface="Aharoni" panose="020B0604020202020204" pitchFamily="2" charset="-79"/>
+              <a:ea typeface="+mn-ea"/>
+              <a:cs typeface="Aharoni" panose="020B0604020202020204" pitchFamily="2" charset="-79"/>
+            </a:defRPr>
+          </a:pPr>
+          <a:endParaRPr lang="LID4096"/>
+        </a:p>
+      </c:txPr>
+    </c:title>
+    <c:autoTitleDeleted val="0"/>
+    <c:plotArea>
+      <c:layout/>
+      <c:pieChart>
+        <c:varyColors val="1"/>
+        <c:ser>
+          <c:idx val="0"/>
+          <c:order val="0"/>
+          <c:tx>
+            <c:strRef>
+              <c:f>Sheet1!$B$1</c:f>
+              <c:strCache>
+                <c:ptCount val="1"/>
+                <c:pt idx="0">
+                  <c:v>Series 1</c:v>
+                </c:pt>
+              </c:strCache>
+            </c:strRef>
+          </c:tx>
+          <c:dPt>
+            <c:idx val="0"/>
+            <c:bubble3D val="0"/>
+            <c:spPr>
+              <a:solidFill>
+                <a:schemeClr val="accent1"/>
+              </a:solidFill>
+              <a:ln>
+                <a:noFill/>
+              </a:ln>
+              <a:effectLst/>
+            </c:spPr>
+            <c:extLst>
+              <c:ext xmlns:c16="http://schemas.microsoft.com/office/drawing/2014/chart" uri="{C3380CC4-5D6E-409C-BE32-E72D297353CC}">
+                <c16:uniqueId val="{00000001-85FF-4A9E-A301-DA0EAA17C6A6}"/>
+              </c:ext>
+            </c:extLst>
+          </c:dPt>
+          <c:dPt>
+            <c:idx val="1"/>
+            <c:bubble3D val="0"/>
+            <c:spPr>
+              <a:solidFill>
+                <a:schemeClr val="accent2"/>
+              </a:solidFill>
+              <a:ln>
+                <a:noFill/>
+              </a:ln>
+              <a:effectLst/>
+            </c:spPr>
+            <c:extLst>
+              <c:ext xmlns:c16="http://schemas.microsoft.com/office/drawing/2014/chart" uri="{C3380CC4-5D6E-409C-BE32-E72D297353CC}">
+                <c16:uniqueId val="{00000003-85FF-4A9E-A301-DA0EAA17C6A6}"/>
+              </c:ext>
+            </c:extLst>
+          </c:dPt>
+          <c:cat>
+            <c:strRef>
+              <c:f>Sheet1!$A$2:$A$3</c:f>
+              <c:strCache>
+                <c:ptCount val="2"/>
+                <c:pt idx="0">
+                  <c:v>Category 1</c:v>
+                </c:pt>
+                <c:pt idx="1">
+                  <c:v>Category 2</c:v>
+                </c:pt>
+              </c:strCache>
+            </c:strRef>
+          </c:cat>
+          <c:val>
+            <c:numRef>
+              <c:f>Sheet1!$B$2:$B$3</c:f>
+              <c:numCache>
+                <c:formatCode>General</c:formatCode>
+                <c:ptCount val="2"/>
+                <c:pt idx="0">
+                  <c:v>4.3</c:v>
+                </c:pt>
+                <c:pt idx="1">
+                  <c:v>2.5</c:v>
+                </c:pt>
+              </c:numCache>
+            </c:numRef>
+          </c:val>
+          <c:extLst xmlns:c16r3="http://schemas.microsoft.com/office/drawing/2017/03/chart" xmlns:c16="http://schemas.microsoft.com/office/drawing/2014/chart" xmlns:c14="http://schemas.microsoft.com/office/drawing/2007/8/2/chart" xmlns:mc="http://schemas.openxmlformats.org/markup-compatibility/2006">
+            <c:ext xmlns:c16="http://schemas.microsoft.com/office/drawing/2014/chart" uri="{C3380CC4-5D6E-409C-BE32-E72D297353CC}">
+              <c16:uniqueId val="{00000004-85FF-4A9E-A301-DA0EAA17C6A6}"/>
+            </c:ext>
+          </c:extLst>
+        </c:ser>
+        <c:ser>
+          <c:idx val="1"/>
+          <c:order val="1"/>
+          <c:tx>
+            <c:strRef>
+              <c:f>Sheet1!$C$1</c:f>
+              <c:strCache>
+                <c:ptCount val="1"/>
+                <c:pt idx="0">
+                  <c:v>Series 2</c:v>
+                </c:pt>
+              </c:strCache>
+            </c:strRef>
+          </c:tx>
+          <c:dPt>
+            <c:idx val="0"/>
+            <c:bubble3D val="0"/>
+            <c:spPr>
+              <a:solidFill>
+                <a:schemeClr val="accent1"/>
+              </a:solidFill>
+              <a:ln>
+                <a:noFill/>
+              </a:ln>
+              <a:effectLst/>
+            </c:spPr>
+            <c:extLst>
+              <c:ext xmlns:c16="http://schemas.microsoft.com/office/drawing/2014/chart" uri="{C3380CC4-5D6E-409C-BE32-E72D297353CC}">
+                <c16:uniqueId val="{00000006-85FF-4A9E-A301-DA0EAA17C6A6}"/>
+              </c:ext>
+            </c:extLst>
+          </c:dPt>
+          <c:dPt>
+            <c:idx val="1"/>
+            <c:bubble3D val="0"/>
+            <c:spPr>
+              <a:solidFill>
+                <a:schemeClr val="accent2"/>
+              </a:solidFill>
+              <a:ln>
+                <a:noFill/>
+              </a:ln>
+              <a:effectLst/>
+            </c:spPr>
+            <c:extLst>
+              <c:ext xmlns:c16="http://schemas.microsoft.com/office/drawing/2014/chart" uri="{C3380CC4-5D6E-409C-BE32-E72D297353CC}">
+                <c16:uniqueId val="{00000008-85FF-4A9E-A301-DA0EAA17C6A6}"/>
+              </c:ext>
+            </c:extLst>
+          </c:dPt>
+          <c:cat>
+            <c:strRef>
+              <c:f>Sheet1!$A$2:$A$3</c:f>
+              <c:strCache>
+                <c:ptCount val="2"/>
+                <c:pt idx="0">
+                  <c:v>Category 1</c:v>
+                </c:pt>
+                <c:pt idx="1">
+                  <c:v>Category 2</c:v>
+                </c:pt>
+              </c:strCache>
+            </c:strRef>
+          </c:cat>
+          <c:val>
+            <c:numRef>
+              <c:f>Sheet1!$C$2:$C$3</c:f>
+              <c:numCache>
+                <c:formatCode>General</c:formatCode>
+                <c:ptCount val="2"/>
+                <c:pt idx="0">
+                  <c:v>2.4</c:v>
+                </c:pt>
+                <c:pt idx="1">
+                  <c:v>4.4000000000000004</c:v>
+                </c:pt>
+              </c:numCache>
+            </c:numRef>
+          </c:val>
+          <c:extLst xmlns:c16r3="http://schemas.microsoft.com/office/drawing/2017/03/chart" xmlns:c16="http://schemas.microsoft.com/office/drawing/2014/chart" xmlns:c14="http://schemas.microsoft.com/office/drawing/2007/8/2/chart" xmlns:mc="http://schemas.openxmlformats.org/markup-compatibility/2006">
+            <c:ext xmlns:c16="http://schemas.microsoft.com/office/drawing/2014/chart" uri="{C3380CC4-5D6E-409C-BE32-E72D297353CC}">
+              <c16:uniqueId val="{00000009-85FF-4A9E-A301-DA0EAA17C6A6}"/>
+            </c:ext>
+          </c:extLst>
+        </c:ser>
+        <c:ser>
+          <c:idx val="2"/>
+          <c:order val="2"/>
+          <c:tx>
+            <c:strRef>
+              <c:f>Sheet1!$D$1</c:f>
+              <c:strCache>
+                <c:ptCount val="1"/>
+                <c:pt idx="0">
+                  <c:v>Series 3</c:v>
+                </c:pt>
+              </c:strCache>
+            </c:strRef>
+          </c:tx>
+          <c:spPr>
+            <a:solidFill>
+              <a:srgbClr val="FFC000"/>
+            </a:solidFill>
+          </c:spPr>
+          <c:dPt>
+            <c:idx val="0"/>
+            <c:bubble3D val="0"/>
+            <c:spPr>
+              <a:solidFill>
+                <a:srgbClr val="FFC000"/>
+              </a:solidFill>
+              <a:ln>
+                <a:noFill/>
+              </a:ln>
+              <a:effectLst/>
+            </c:spPr>
+            <c:extLst>
+              <c:ext xmlns:c16="http://schemas.microsoft.com/office/drawing/2014/chart" uri="{C3380CC4-5D6E-409C-BE32-E72D297353CC}">
+                <c16:uniqueId val="{0000000B-85FF-4A9E-A301-DA0EAA17C6A6}"/>
+              </c:ext>
+            </c:extLst>
+          </c:dPt>
+          <c:dPt>
+            <c:idx val="1"/>
+            <c:bubble3D val="0"/>
+            <c:spPr>
+              <a:solidFill>
+                <a:srgbClr val="FFC000"/>
+              </a:solidFill>
+              <a:ln>
+                <a:noFill/>
+              </a:ln>
+              <a:effectLst/>
+            </c:spPr>
+            <c:extLst>
+              <c:ext xmlns:c16="http://schemas.microsoft.com/office/drawing/2014/chart" uri="{C3380CC4-5D6E-409C-BE32-E72D297353CC}">
+                <c16:uniqueId val="{0000000D-85FF-4A9E-A301-DA0EAA17C6A6}"/>
+              </c:ext>
+            </c:extLst>
+          </c:dPt>
+          <c:cat>
+            <c:strRef>
+              <c:f>Sheet1!$A$2:$A$3</c:f>
+              <c:strCache>
+                <c:ptCount val="2"/>
+                <c:pt idx="0">
+                  <c:v>Category 1</c:v>
+                </c:pt>
+                <c:pt idx="1">
+                  <c:v>Category 2</c:v>
+                </c:pt>
+              </c:strCache>
+            </c:strRef>
+          </c:cat>
+          <c:val>
+            <c:numRef>
+              <c:f>Sheet1!$D$2:$D$3</c:f>
+              <c:numCache>
+                <c:formatCode>General</c:formatCode>
+                <c:ptCount val="2"/>
+                <c:pt idx="0">
+                  <c:v>2</c:v>
+                </c:pt>
+                <c:pt idx="1">
+                  <c:v>2</c:v>
+                </c:pt>
+              </c:numCache>
+            </c:numRef>
+          </c:val>
+          <c:extLst xmlns:c16r3="http://schemas.microsoft.com/office/drawing/2017/03/chart" xmlns:c16="http://schemas.microsoft.com/office/drawing/2014/chart" xmlns:c14="http://schemas.microsoft.com/office/drawing/2007/8/2/chart" xmlns:mc="http://schemas.openxmlformats.org/markup-compatibility/2006">
+            <c:ext xmlns:c16="http://schemas.microsoft.com/office/drawing/2014/chart" uri="{C3380CC4-5D6E-409C-BE32-E72D297353CC}">
+              <c16:uniqueId val="{0000000E-85FF-4A9E-A301-DA0EAA17C6A6}"/>
+            </c:ext>
+          </c:extLst>
+        </c:ser>
+        <c:ser>
+          <c:idx val="3"/>
+          <c:order val="3"/>
+          <c:tx>
+            <c:strRef>
+              <c:f>Sheet1!$E$1</c:f>
+              <c:strCache>
+                <c:ptCount val="1"/>
+                <c:pt idx="0">
+                  <c:v>Series 32</c:v>
+                </c:pt>
+              </c:strCache>
+            </c:strRef>
+          </c:tx>
+          <c:dPt>
+            <c:idx val="0"/>
+            <c:bubble3D val="0"/>
+            <c:spPr>
+              <a:solidFill>
+                <a:schemeClr val="accent1"/>
+              </a:solidFill>
+              <a:ln>
+                <a:noFill/>
+              </a:ln>
+              <a:effectLst/>
+            </c:spPr>
+            <c:extLst>
+              <c:ext xmlns:c16="http://schemas.microsoft.com/office/drawing/2014/chart" uri="{C3380CC4-5D6E-409C-BE32-E72D297353CC}">
+                <c16:uniqueId val="{00000010-85FF-4A9E-A301-DA0EAA17C6A6}"/>
+              </c:ext>
+            </c:extLst>
+          </c:dPt>
+          <c:dPt>
+            <c:idx val="1"/>
+            <c:bubble3D val="0"/>
+            <c:spPr>
+              <a:solidFill>
+                <a:schemeClr val="accent2"/>
+              </a:solidFill>
+              <a:ln>
+                <a:noFill/>
+              </a:ln>
+              <a:effectLst/>
+            </c:spPr>
+            <c:extLst>
+              <c:ext xmlns:c16="http://schemas.microsoft.com/office/drawing/2014/chart" uri="{C3380CC4-5D6E-409C-BE32-E72D297353CC}">
+                <c16:uniqueId val="{00000012-85FF-4A9E-A301-DA0EAA17C6A6}"/>
+              </c:ext>
+            </c:extLst>
+          </c:dPt>
+          <c:cat>
+            <c:strRef>
+              <c:f>Sheet1!$A$2:$A$3</c:f>
+              <c:strCache>
+                <c:ptCount val="2"/>
+                <c:pt idx="0">
+                  <c:v>Category 1</c:v>
+                </c:pt>
+                <c:pt idx="1">
+                  <c:v>Category 2</c:v>
+                </c:pt>
+              </c:strCache>
+            </c:strRef>
+          </c:cat>
+          <c:val>
+            <c:numRef>
+              <c:f>Sheet1!$E$2:$E$3</c:f>
+              <c:numCache>
+                <c:formatCode>General</c:formatCode>
+                <c:ptCount val="2"/>
+                <c:pt idx="0">
+                  <c:v>3</c:v>
+                </c:pt>
+                <c:pt idx="1">
+                  <c:v>2</c:v>
+                </c:pt>
+              </c:numCache>
+            </c:numRef>
+          </c:val>
+          <c:extLst xmlns:c16r3="http://schemas.microsoft.com/office/drawing/2017/03/chart" xmlns:c16="http://schemas.microsoft.com/office/drawing/2014/chart" xmlns:c14="http://schemas.microsoft.com/office/drawing/2007/8/2/chart" xmlns:mc="http://schemas.openxmlformats.org/markup-compatibility/2006">
+            <c:ext xmlns:c16="http://schemas.microsoft.com/office/drawing/2014/chart" uri="{C3380CC4-5D6E-409C-BE32-E72D297353CC}">
+              <c16:uniqueId val="{00000013-85FF-4A9E-A301-DA0EAA17C6A6}"/>
+            </c:ext>
+          </c:extLst>
+        </c:ser>
+        <c:dLbls>
+          <c:showLegendKey val="0"/>
+          <c:showVal val="0"/>
+          <c:showCatName val="0"/>
+          <c:showSerName val="0"/>
+          <c:showPercent val="0"/>
+          <c:showBubbleSize val="0"/>
+          <c:showLeaderLines val="1"/>
+        </c:dLbls>
+        <c:firstSliceAng val="0"/>
+      </c:pieChart>
+      <c:spPr>
+        <a:noFill/>
+        <a:ln>
+          <a:noFill/>
+        </a:ln>
+        <a:effectLst/>
+      </c:spPr>
+    </c:plotArea>
+    <c:legend>
+      <c:legendPos val="b"/>
+      <c:overlay val="0"/>
+      <c:spPr>
+        <a:noFill/>
+        <a:ln>
+          <a:noFill/>
+        </a:ln>
+        <a:effectLst/>
+      </c:spPr>
+      <c:txPr>
+        <a:bodyPr rot="0" spcFirstLastPara="1" vertOverflow="ellipsis" vert="horz" wrap="square" anchor="ctr" anchorCtr="1"/>
+        <a:lstStyle/>
+        <a:p>
+          <a:pPr>
+            <a:defRPr sz="800" b="0" i="0" u="none" strike="noStrike" kern="1200" baseline="0">
+              <a:solidFill>
+                <a:schemeClr val="tx1">
+                  <a:lumMod val="65000"/>
+                  <a:lumOff val="35000"/>
+                </a:schemeClr>
+              </a:solidFill>
+              <a:latin typeface="Aharoni" panose="020B0604020202020204" pitchFamily="2" charset="-79"/>
+              <a:ea typeface="+mn-ea"/>
+              <a:cs typeface="Aharoni" panose="020B0604020202020204" pitchFamily="2" charset="-79"/>
+            </a:defRPr>
+          </a:pPr>
+          <a:endParaRPr lang="LID4096"/>
+        </a:p>
+      </c:txPr>
+    </c:legend>
+    <c:plotVisOnly val="1"/>
+    <c:dispBlanksAs val="gap"/>
+    <c:extLst xmlns:c16r3="http://schemas.microsoft.com/office/drawing/2017/03/chart" xmlns:c16="http://schemas.microsoft.com/office/drawing/2014/chart" xmlns:c14="http://schemas.microsoft.com/office/drawing/2007/8/2/chart" xmlns:mc="http://schemas.openxmlformats.org/markup-compatibility/2006">
+      <c:ext xmlns:c16r3="http://schemas.microsoft.com/office/drawing/2017/03/chart" uri="{56B9EC1D-385E-4148-901F-78D8002777C0}">
+        <c16r3:dataDisplayOptions16>
+          <c16r3:dispNaAsBlank val="1"/>
+        </c16r3:dataDisplayOptions16>
+      </c:ext>
+    </c:extLst>
+    <c:showDLblsOverMax val="0"/>
+  </c:chart>
+  <c:spPr>
+    <a:noFill/>
+    <a:ln>
+      <a:noFill/>
+    </a:ln>
+    <a:effectLst/>
+  </c:spPr>
+  <c:txPr>
+    <a:bodyPr/>
+    <a:lstStyle/>
+    <a:p>
+      <a:pPr>
+        <a:defRPr sz="800">
+          <a:latin typeface="Aharoni" panose="020B0604020202020204" pitchFamily="2" charset="-79"/>
+          <a:cs typeface="Aharoni" panose="020B0604020202020204" pitchFamily="2" charset="-79"/>
+        </a:defRPr>
+      </a:pPr>
+      <a:endParaRPr lang="LID4096"/>
+    </a:p>
+  </c:txPr>
+  <c:externalData r:id="rId3">
+    <c:autoUpdate val="0"/>
+  </c:externalData>
+</c:chartSpace>
+</file>
+
+<file path=ppt/charts/chart5.xml><?xml version="1.0" encoding="utf-8"?>
+<c:chartSpace xmlns:c="http://schemas.openxmlformats.org/drawingml/2006/chart" xmlns:a="http://schemas.openxmlformats.org/drawingml/2006/main" xmlns:r="http://schemas.openxmlformats.org/officeDocument/2006/relationships" xmlns:c16r2="http://schemas.microsoft.com/office/drawing/2015/06/chart">
+  <c:date1904 val="0"/>
+  <c:lang val="en-US"/>
   <c:roundedCorners val="0"/>
   <mc:AlternateContent xmlns:mc="http://schemas.openxmlformats.org/markup-compatibility/2006">
     <mc:Choice xmlns:c14="http://schemas.microsoft.com/office/drawing/2007/8/2/chart" Requires="c14">
@@ -1088,7 +1569,7 @@
             </c:numRef>
           </c:yVal>
           <c:smooth val="1"/>
-          <c:extLst xmlns:c16="http://schemas.microsoft.com/office/drawing/2014/chart" xmlns:c14="http://schemas.microsoft.com/office/drawing/2007/8/2/chart" xmlns:mc="http://schemas.openxmlformats.org/markup-compatibility/2006">
+          <c:extLst xmlns:mc="http://schemas.openxmlformats.org/markup-compatibility/2006" xmlns:c14="http://schemas.microsoft.com/office/drawing/2007/8/2/chart" xmlns:c16="http://schemas.microsoft.com/office/drawing/2014/chart">
             <c:ext xmlns:c16="http://schemas.microsoft.com/office/drawing/2014/chart" uri="{C3380CC4-5D6E-409C-BE32-E72D297353CC}">
               <c16:uniqueId val="{00000000-9B82-4F0A-BBF2-F487496F06C9}"/>
             </c:ext>
@@ -1175,7 +1656,7 @@
             </c:numRef>
           </c:yVal>
           <c:smooth val="1"/>
-          <c:extLst xmlns:c16="http://schemas.microsoft.com/office/drawing/2014/chart" xmlns:c14="http://schemas.microsoft.com/office/drawing/2007/8/2/chart" xmlns:mc="http://schemas.openxmlformats.org/markup-compatibility/2006">
+          <c:extLst xmlns:mc="http://schemas.openxmlformats.org/markup-compatibility/2006" xmlns:c14="http://schemas.microsoft.com/office/drawing/2007/8/2/chart" xmlns:c16="http://schemas.microsoft.com/office/drawing/2014/chart">
             <c:ext xmlns:c16="http://schemas.microsoft.com/office/drawing/2014/chart" uri="{C3380CC4-5D6E-409C-BE32-E72D297353CC}">
               <c16:uniqueId val="{00000001-9B82-4F0A-BBF2-F487496F06C9}"/>
             </c:ext>
@@ -1262,7 +1743,7 @@
             </c:numRef>
           </c:yVal>
           <c:smooth val="1"/>
-          <c:extLst xmlns:c16="http://schemas.microsoft.com/office/drawing/2014/chart" xmlns:c14="http://schemas.microsoft.com/office/drawing/2007/8/2/chart" xmlns:mc="http://schemas.openxmlformats.org/markup-compatibility/2006">
+          <c:extLst xmlns:mc="http://schemas.openxmlformats.org/markup-compatibility/2006" xmlns:c14="http://schemas.microsoft.com/office/drawing/2007/8/2/chart" xmlns:c16="http://schemas.microsoft.com/office/drawing/2014/chart">
             <c:ext xmlns:c16="http://schemas.microsoft.com/office/drawing/2014/chart" uri="{C3380CC4-5D6E-409C-BE32-E72D297353CC}">
               <c16:uniqueId val="{00000002-9B82-4F0A-BBF2-F487496F06C9}"/>
             </c:ext>
@@ -1346,7 +1827,7 @@
                 <a:cs typeface="+mn-cs"/>
               </a:defRPr>
             </a:pPr>
-            <a:endParaRPr lang="ru-UA"/>
+            <a:endParaRPr lang="LID4096"/>
           </a:p>
         </c:txPr>
         <c:crossAx val="1576974280"/>
@@ -1385,7 +1866,7 @@
               <a:cs typeface="+mn-cs"/>
             </a:defRPr>
           </a:pPr>
-          <a:endParaRPr lang="ru-UA"/>
+          <a:endParaRPr lang="LID4096"/>
         </a:p>
       </c:txPr>
     </c:legend>
@@ -1408,7 +1889,575 @@
       <a:pPr>
         <a:defRPr sz="1600"/>
       </a:pPr>
-      <a:endParaRPr lang="ru-UA"/>
+      <a:endParaRPr lang="LID4096"/>
+    </a:p>
+  </c:txPr>
+  <c:externalData r:id="rId3">
+    <c:autoUpdate val="0"/>
+  </c:externalData>
+</c:chartSpace>
+</file>
+
+<file path=ppt/charts/chart6.xml><?xml version="1.0" encoding="utf-8"?>
+<c:chartSpace xmlns:c="http://schemas.openxmlformats.org/drawingml/2006/chart" xmlns:a="http://schemas.openxmlformats.org/drawingml/2006/main" xmlns:r="http://schemas.openxmlformats.org/officeDocument/2006/relationships" xmlns:c16r2="http://schemas.microsoft.com/office/drawing/2015/06/chart">
+  <c:date1904 val="0"/>
+  <c:lang val="en-US"/>
+  <c:roundedCorners val="0"/>
+  <mc:AlternateContent xmlns:mc="http://schemas.openxmlformats.org/markup-compatibility/2006">
+    <mc:Choice xmlns:c14="http://schemas.microsoft.com/office/drawing/2007/8/2/chart" Requires="c14">
+      <c14:style val="102"/>
+    </mc:Choice>
+    <mc:Fallback>
+      <c:style val="2"/>
+    </mc:Fallback>
+  </mc:AlternateContent>
+  <c:chart>
+    <c:autoTitleDeleted val="1"/>
+    <c:plotArea>
+      <c:layout>
+        <c:manualLayout>
+          <c:layoutTarget val="inner"/>
+          <c:xMode val="edge"/>
+          <c:yMode val="edge"/>
+          <c:x val="0.34022176568382323"/>
+          <c:y val="0"/>
+          <c:w val="0.65565508756623625"/>
+          <c:h val="0.99784082977186173"/>
+        </c:manualLayout>
+      </c:layout>
+      <c:barChart>
+        <c:barDir val="bar"/>
+        <c:grouping val="clustered"/>
+        <c:varyColors val="0"/>
+        <c:ser>
+          <c:idx val="0"/>
+          <c:order val="0"/>
+          <c:spPr>
+            <a:solidFill>
+              <a:schemeClr val="tx1"/>
+            </a:solidFill>
+            <a:ln>
+              <a:noFill/>
+            </a:ln>
+            <a:effectLst/>
+          </c:spPr>
+          <c:invertIfNegative val="0"/>
+          <c:dLbls>
+            <c:dLbl>
+              <c:idx val="0"/>
+              <c:layout>
+                <c:manualLayout>
+                  <c:x val="5.5555555555555046E-3"/>
+                  <c:y val="6.2208398133748056E-3"/>
+                </c:manualLayout>
+              </c:layout>
+              <c:tx>
+                <c:rich>
+                  <a:bodyPr rot="0" spcFirstLastPara="1" vertOverflow="ellipsis" vert="horz" wrap="square" anchor="ctr" anchorCtr="1"/>
+                  <a:lstStyle/>
+                  <a:p>
+                    <a:pPr>
+                      <a:defRPr sz="4000" b="0" i="0" u="none" strike="noStrike" kern="1200" baseline="0">
+                        <a:solidFill>
+                          <a:schemeClr val="tx1">
+                            <a:lumMod val="75000"/>
+                            <a:lumOff val="25000"/>
+                          </a:schemeClr>
+                        </a:solidFill>
+                        <a:latin typeface="Times New Roman" panose="02020603050405020304" pitchFamily="18" charset="0"/>
+                        <a:ea typeface="+mn-ea"/>
+                        <a:cs typeface="Times New Roman" panose="02020603050405020304" pitchFamily="18" charset="0"/>
+                      </a:defRPr>
+                    </a:pPr>
+                    <a:fld id="{2F747757-19F5-4ABC-A33B-AD86676DF289}" type="VALUE">
+                      <a:rPr lang="en-US"/>
+                      <a:pPr>
+                        <a:defRPr/>
+                      </a:pPr>
+                      <a:t>[VALUE]</a:t>
+                    </a:fld>
+                    <a:r>
+                      <a:rPr lang="uk-UA"/>
+                      <a:t>млн.</a:t>
+                    </a:r>
+                  </a:p>
+                </c:rich>
+              </c:tx>
+              <c:numFmt formatCode="_(&quot;₽&quot;* #,##0_);_(&quot;₽&quot;* \(#,##0\);_(&quot;₽&quot;* &quot;-&quot;_);_(@_)" sourceLinked="0"/>
+              <c:spPr>
+                <a:noFill/>
+                <a:ln>
+                  <a:noFill/>
+                </a:ln>
+                <a:effectLst/>
+              </c:spPr>
+              <c:txPr>
+                <a:bodyPr rot="0" spcFirstLastPara="1" vertOverflow="ellipsis" vert="horz" wrap="square" anchor="ctr" anchorCtr="1"/>
+                <a:lstStyle/>
+                <a:p>
+                  <a:pPr>
+                    <a:defRPr sz="4000" b="0" i="0" u="none" strike="noStrike" kern="1200" baseline="0">
+                      <a:solidFill>
+                        <a:schemeClr val="tx1">
+                          <a:lumMod val="75000"/>
+                          <a:lumOff val="25000"/>
+                        </a:schemeClr>
+                      </a:solidFill>
+                      <a:latin typeface="Times New Roman" panose="02020603050405020304" pitchFamily="18" charset="0"/>
+                      <a:ea typeface="+mn-ea"/>
+                      <a:cs typeface="Times New Roman" panose="02020603050405020304" pitchFamily="18" charset="0"/>
+                    </a:defRPr>
+                  </a:pPr>
+                  <a:endParaRPr lang="LID4096"/>
+                </a:p>
+              </c:txPr>
+              <c:showLegendKey val="0"/>
+              <c:showVal val="1"/>
+              <c:showCatName val="0"/>
+              <c:showSerName val="0"/>
+              <c:showPercent val="0"/>
+              <c:showBubbleSize val="0"/>
+              <c:extLst xmlns:c16="http://schemas.microsoft.com/office/drawing/2014/chart" xmlns:c15="http://schemas.microsoft.com/office/drawing/2012/chart" xmlns:c14="http://schemas.microsoft.com/office/drawing/2007/8/2/chart" xmlns:mc="http://schemas.openxmlformats.org/markup-compatibility/2006">
+                <c:ext xmlns:c15="http://schemas.microsoft.com/office/drawing/2012/chart" uri="{CE6537A1-D6FC-4f65-9D91-7224C49458BB}">
+                  <c15:dlblFieldTable/>
+                  <c15:showDataLabelsRange val="0"/>
+                </c:ext>
+                <c:ext xmlns:c16="http://schemas.microsoft.com/office/drawing/2014/chart" uri="{C3380CC4-5D6E-409C-BE32-E72D297353CC}">
+                  <c16:uniqueId val="{00000000-355C-46C5-8EE8-42EFA5183349}"/>
+                </c:ext>
+              </c:extLst>
+            </c:dLbl>
+            <c:dLbl>
+              <c:idx val="1"/>
+              <c:layout>
+                <c:manualLayout>
+                  <c:x val="-0.32885852739855004"/>
+                  <c:y val="0"/>
+                </c:manualLayout>
+              </c:layout>
+              <c:tx>
+                <c:rich>
+                  <a:bodyPr rot="0" spcFirstLastPara="1" vertOverflow="ellipsis" vert="horz" wrap="square" anchor="ctr" anchorCtr="1"/>
+                  <a:lstStyle/>
+                  <a:p>
+                    <a:pPr>
+                      <a:defRPr sz="4000" b="0" i="0" u="none" strike="noStrike" kern="1200" baseline="0">
+                        <a:solidFill>
+                          <a:schemeClr val="bg1"/>
+                        </a:solidFill>
+                        <a:latin typeface="Times New Roman" panose="02020603050405020304" pitchFamily="18" charset="0"/>
+                        <a:ea typeface="+mn-ea"/>
+                        <a:cs typeface="Times New Roman" panose="02020603050405020304" pitchFamily="18" charset="0"/>
+                      </a:defRPr>
+                    </a:pPr>
+                    <a:fld id="{BB37A977-F77F-43F7-8121-602A1D70F518}" type="VALUE">
+                      <a:rPr lang="en-US">
+                        <a:solidFill>
+                          <a:schemeClr val="bg1"/>
+                        </a:solidFill>
+                      </a:rPr>
+                      <a:pPr>
+                        <a:defRPr>
+                          <a:solidFill>
+                            <a:schemeClr val="bg1"/>
+                          </a:solidFill>
+                        </a:defRPr>
+                      </a:pPr>
+                      <a:t>[VALUE]</a:t>
+                    </a:fld>
+                    <a:r>
+                      <a:rPr lang="uk-UA">
+                        <a:solidFill>
+                          <a:schemeClr val="bg1"/>
+                        </a:solidFill>
+                      </a:rPr>
+                      <a:t>млн.</a:t>
+                    </a:r>
+                  </a:p>
+                </c:rich>
+              </c:tx>
+              <c:numFmt formatCode="_(&quot;₽&quot;* #,##0_);_(&quot;₽&quot;* \(#,##0\);_(&quot;₽&quot;* &quot;-&quot;_);_(@_)" sourceLinked="0"/>
+              <c:spPr>
+                <a:noFill/>
+                <a:ln>
+                  <a:noFill/>
+                </a:ln>
+                <a:effectLst/>
+              </c:spPr>
+              <c:txPr>
+                <a:bodyPr rot="0" spcFirstLastPara="1" vertOverflow="ellipsis" vert="horz" wrap="square" anchor="ctr" anchorCtr="1"/>
+                <a:lstStyle/>
+                <a:p>
+                  <a:pPr>
+                    <a:defRPr sz="4000" b="0" i="0" u="none" strike="noStrike" kern="1200" baseline="0">
+                      <a:solidFill>
+                        <a:schemeClr val="bg1"/>
+                      </a:solidFill>
+                      <a:latin typeface="Times New Roman" panose="02020603050405020304" pitchFamily="18" charset="0"/>
+                      <a:ea typeface="+mn-ea"/>
+                      <a:cs typeface="Times New Roman" panose="02020603050405020304" pitchFamily="18" charset="0"/>
+                    </a:defRPr>
+                  </a:pPr>
+                  <a:endParaRPr lang="LID4096"/>
+                </a:p>
+              </c:txPr>
+              <c:showLegendKey val="0"/>
+              <c:showVal val="1"/>
+              <c:showCatName val="0"/>
+              <c:showSerName val="0"/>
+              <c:showPercent val="0"/>
+              <c:showBubbleSize val="0"/>
+              <c:extLst xmlns:c16="http://schemas.microsoft.com/office/drawing/2014/chart" xmlns:c15="http://schemas.microsoft.com/office/drawing/2012/chart" xmlns:c14="http://schemas.microsoft.com/office/drawing/2007/8/2/chart" xmlns:mc="http://schemas.openxmlformats.org/markup-compatibility/2006">
+                <c:ext xmlns:c15="http://schemas.microsoft.com/office/drawing/2012/chart" uri="{CE6537A1-D6FC-4f65-9D91-7224C49458BB}">
+                  <c15:layout>
+                    <c:manualLayout>
+                      <c:w val="0.22184684684684686"/>
+                      <c:h val="0.22786437157683445"/>
+                    </c:manualLayout>
+                  </c15:layout>
+                  <c15:dlblFieldTable/>
+                  <c15:showDataLabelsRange val="0"/>
+                </c:ext>
+                <c:ext xmlns:c16="http://schemas.microsoft.com/office/drawing/2014/chart" uri="{C3380CC4-5D6E-409C-BE32-E72D297353CC}">
+                  <c16:uniqueId val="{00000001-355C-46C5-8EE8-42EFA5183349}"/>
+                </c:ext>
+              </c:extLst>
+            </c:dLbl>
+            <c:dLbl>
+              <c:idx val="2"/>
+              <c:layout>
+                <c:manualLayout>
+                  <c:x val="-0.28333333333333338"/>
+                  <c:y val="0"/>
+                </c:manualLayout>
+              </c:layout>
+              <c:tx>
+                <c:rich>
+                  <a:bodyPr rot="0" spcFirstLastPara="1" vertOverflow="ellipsis" vert="horz" wrap="square" anchor="ctr" anchorCtr="1"/>
+                  <a:lstStyle/>
+                  <a:p>
+                    <a:pPr>
+                      <a:defRPr sz="4000" b="0" i="0" u="none" strike="noStrike" kern="1200" baseline="0">
+                        <a:solidFill>
+                          <a:schemeClr val="bg1"/>
+                        </a:solidFill>
+                        <a:latin typeface="Times New Roman" panose="02020603050405020304" pitchFamily="18" charset="0"/>
+                        <a:ea typeface="+mn-ea"/>
+                        <a:cs typeface="Times New Roman" panose="02020603050405020304" pitchFamily="18" charset="0"/>
+                      </a:defRPr>
+                    </a:pPr>
+                    <a:fld id="{271A73C0-352E-47AB-9FBF-A7E95B1314BF}" type="VALUE">
+                      <a:rPr lang="en-US">
+                        <a:solidFill>
+                          <a:schemeClr val="bg1"/>
+                        </a:solidFill>
+                      </a:rPr>
+                      <a:pPr>
+                        <a:defRPr>
+                          <a:solidFill>
+                            <a:schemeClr val="bg1"/>
+                          </a:solidFill>
+                        </a:defRPr>
+                      </a:pPr>
+                      <a:t>[VALUE]</a:t>
+                    </a:fld>
+                    <a:r>
+                      <a:rPr lang="en-US">
+                        <a:solidFill>
+                          <a:schemeClr val="bg1"/>
+                        </a:solidFill>
+                      </a:rPr>
+                      <a:t> </a:t>
+                    </a:r>
+                    <a:r>
+                      <a:rPr lang="uk-UA">
+                        <a:solidFill>
+                          <a:schemeClr val="bg1"/>
+                        </a:solidFill>
+                      </a:rPr>
+                      <a:t>млн.</a:t>
+                    </a:r>
+                  </a:p>
+                </c:rich>
+              </c:tx>
+              <c:numFmt formatCode="_(&quot;₽&quot;* #,##0_);_(&quot;₽&quot;* \(#,##0\);_(&quot;₽&quot;* &quot;-&quot;_);_(@_)" sourceLinked="0"/>
+              <c:spPr>
+                <a:noFill/>
+                <a:ln>
+                  <a:noFill/>
+                </a:ln>
+                <a:effectLst/>
+              </c:spPr>
+              <c:txPr>
+                <a:bodyPr rot="0" spcFirstLastPara="1" vertOverflow="ellipsis" vert="horz" wrap="square" anchor="ctr" anchorCtr="1"/>
+                <a:lstStyle/>
+                <a:p>
+                  <a:pPr>
+                    <a:defRPr sz="4000" b="0" i="0" u="none" strike="noStrike" kern="1200" baseline="0">
+                      <a:solidFill>
+                        <a:schemeClr val="bg1"/>
+                      </a:solidFill>
+                      <a:latin typeface="Times New Roman" panose="02020603050405020304" pitchFamily="18" charset="0"/>
+                      <a:ea typeface="+mn-ea"/>
+                      <a:cs typeface="Times New Roman" panose="02020603050405020304" pitchFamily="18" charset="0"/>
+                    </a:defRPr>
+                  </a:pPr>
+                  <a:endParaRPr lang="LID4096"/>
+                </a:p>
+              </c:txPr>
+              <c:showLegendKey val="0"/>
+              <c:showVal val="1"/>
+              <c:showCatName val="0"/>
+              <c:showSerName val="0"/>
+              <c:showPercent val="0"/>
+              <c:showBubbleSize val="0"/>
+              <c:extLst xmlns:c16="http://schemas.microsoft.com/office/drawing/2014/chart" xmlns:c15="http://schemas.microsoft.com/office/drawing/2012/chart" xmlns:c14="http://schemas.microsoft.com/office/drawing/2007/8/2/chart" xmlns:mc="http://schemas.openxmlformats.org/markup-compatibility/2006">
+                <c:ext xmlns:c15="http://schemas.microsoft.com/office/drawing/2012/chart" uri="{CE6537A1-D6FC-4f65-9D91-7224C49458BB}">
+                  <c15:layout>
+                    <c:manualLayout>
+                      <c:w val="0.26863888888888887"/>
+                      <c:h val="0.12497667185069984"/>
+                    </c:manualLayout>
+                  </c15:layout>
+                  <c15:dlblFieldTable/>
+                  <c15:showDataLabelsRange val="0"/>
+                </c:ext>
+                <c:ext xmlns:c16="http://schemas.microsoft.com/office/drawing/2014/chart" uri="{C3380CC4-5D6E-409C-BE32-E72D297353CC}">
+                  <c16:uniqueId val="{00000002-355C-46C5-8EE8-42EFA5183349}"/>
+                </c:ext>
+              </c:extLst>
+            </c:dLbl>
+            <c:spPr>
+              <a:noFill/>
+              <a:ln>
+                <a:noFill/>
+              </a:ln>
+              <a:effectLst/>
+            </c:spPr>
+            <c:txPr>
+              <a:bodyPr rot="0" spcFirstLastPara="1" vertOverflow="ellipsis" vert="horz" wrap="square" anchor="ctr" anchorCtr="1"/>
+              <a:lstStyle/>
+              <a:p>
+                <a:pPr>
+                  <a:defRPr sz="4000" b="0" i="0" u="none" strike="noStrike" kern="1200" baseline="0">
+                    <a:solidFill>
+                      <a:schemeClr val="tx1">
+                        <a:lumMod val="75000"/>
+                        <a:lumOff val="25000"/>
+                      </a:schemeClr>
+                    </a:solidFill>
+                    <a:latin typeface="Times New Roman" panose="02020603050405020304" pitchFamily="18" charset="0"/>
+                    <a:ea typeface="+mn-ea"/>
+                    <a:cs typeface="Times New Roman" panose="02020603050405020304" pitchFamily="18" charset="0"/>
+                  </a:defRPr>
+                </a:pPr>
+                <a:endParaRPr lang="LID4096"/>
+              </a:p>
+            </c:txPr>
+            <c:showLegendKey val="0"/>
+            <c:showVal val="1"/>
+            <c:showCatName val="0"/>
+            <c:showSerName val="0"/>
+            <c:showPercent val="0"/>
+            <c:showBubbleSize val="0"/>
+            <c:showLeaderLines val="0"/>
+            <c:extLst xmlns:c16="http://schemas.microsoft.com/office/drawing/2014/chart" xmlns:c15="http://schemas.microsoft.com/office/drawing/2012/chart" xmlns:c14="http://schemas.microsoft.com/office/drawing/2007/8/2/chart" xmlns:mc="http://schemas.openxmlformats.org/markup-compatibility/2006">
+              <c:ext xmlns:c15="http://schemas.microsoft.com/office/drawing/2012/chart" uri="{CE6537A1-D6FC-4f65-9D91-7224C49458BB}">
+                <c15:showLeaderLines val="1"/>
+                <c15:leaderLines>
+                  <c:spPr>
+                    <a:ln w="9525" cap="flat" cmpd="sng" algn="ctr">
+                      <a:solidFill>
+                        <a:schemeClr val="tx1">
+                          <a:lumMod val="35000"/>
+                          <a:lumOff val="65000"/>
+                        </a:schemeClr>
+                      </a:solidFill>
+                      <a:round/>
+                    </a:ln>
+                    <a:effectLst/>
+                  </c:spPr>
+                </c15:leaderLines>
+              </c:ext>
+            </c:extLst>
+          </c:dLbls>
+          <c:cat>
+            <c:strRef>
+              <c:f>Лист1!$B$3:$B$5</c:f>
+              <c:strCache>
+                <c:ptCount val="3"/>
+                <c:pt idx="0">
+                  <c:v>EBITDA</c:v>
+                </c:pt>
+                <c:pt idx="1">
+                  <c:v>Выручка</c:v>
+                </c:pt>
+                <c:pt idx="2">
+                  <c:v>Капитализация</c:v>
+                </c:pt>
+              </c:strCache>
+            </c:strRef>
+          </c:cat>
+          <c:val>
+            <c:numRef>
+              <c:f>Лист1!$C$3:$C$5</c:f>
+              <c:numCache>
+                <c:formatCode>_(* #,##0_);_(* \(#,##0\);_(* "-"_);_(@_)</c:formatCode>
+                <c:ptCount val="3"/>
+                <c:pt idx="0">
+                  <c:v>72.662768922074051</c:v>
+                </c:pt>
+                <c:pt idx="1">
+                  <c:v>382.10210188000002</c:v>
+                </c:pt>
+                <c:pt idx="2">
+                  <c:v>437.23806199976224</c:v>
+                </c:pt>
+              </c:numCache>
+            </c:numRef>
+          </c:val>
+          <c:extLst xmlns:c16="http://schemas.microsoft.com/office/drawing/2014/chart" xmlns:c15="http://schemas.microsoft.com/office/drawing/2012/chart" xmlns:c14="http://schemas.microsoft.com/office/drawing/2007/8/2/chart" xmlns:mc="http://schemas.openxmlformats.org/markup-compatibility/2006">
+            <c:ext xmlns:c16="http://schemas.microsoft.com/office/drawing/2014/chart" uri="{C3380CC4-5D6E-409C-BE32-E72D297353CC}">
+              <c16:uniqueId val="{00000003-355C-46C5-8EE8-42EFA5183349}"/>
+            </c:ext>
+          </c:extLst>
+        </c:ser>
+        <c:dLbls>
+          <c:showLegendKey val="0"/>
+          <c:showVal val="0"/>
+          <c:showCatName val="0"/>
+          <c:showSerName val="0"/>
+          <c:showPercent val="0"/>
+          <c:showBubbleSize val="0"/>
+        </c:dLbls>
+        <c:gapWidth val="182"/>
+        <c:axId val="372795048"/>
+        <c:axId val="372798984"/>
+      </c:barChart>
+      <c:catAx>
+        <c:axId val="372795048"/>
+        <c:scaling>
+          <c:orientation val="minMax"/>
+        </c:scaling>
+        <c:delete val="0"/>
+        <c:axPos val="l"/>
+        <c:numFmt formatCode="General" sourceLinked="1"/>
+        <c:majorTickMark val="none"/>
+        <c:minorTickMark val="none"/>
+        <c:tickLblPos val="nextTo"/>
+        <c:spPr>
+          <a:noFill/>
+          <a:ln w="9525" cap="flat" cmpd="sng" algn="ctr">
+            <a:solidFill>
+              <a:schemeClr val="tx1">
+                <a:lumMod val="15000"/>
+                <a:lumOff val="85000"/>
+              </a:schemeClr>
+            </a:solidFill>
+            <a:round/>
+          </a:ln>
+          <a:effectLst/>
+        </c:spPr>
+        <c:txPr>
+          <a:bodyPr rot="-60000000" spcFirstLastPara="1" vertOverflow="ellipsis" vert="horz" wrap="square" anchor="ctr" anchorCtr="1"/>
+          <a:lstStyle/>
+          <a:p>
+            <a:pPr>
+              <a:defRPr sz="4000" b="0" i="0" u="none" strike="noStrike" kern="1200" baseline="0">
+                <a:solidFill>
+                  <a:schemeClr val="tx1">
+                    <a:lumMod val="65000"/>
+                    <a:lumOff val="35000"/>
+                  </a:schemeClr>
+                </a:solidFill>
+                <a:latin typeface="Times New Roman" panose="02020603050405020304" pitchFamily="18" charset="0"/>
+                <a:ea typeface="+mn-ea"/>
+                <a:cs typeface="Times New Roman" panose="02020603050405020304" pitchFamily="18" charset="0"/>
+              </a:defRPr>
+            </a:pPr>
+            <a:endParaRPr lang="LID4096"/>
+          </a:p>
+        </c:txPr>
+        <c:crossAx val="372798984"/>
+        <c:crosses val="autoZero"/>
+        <c:auto val="1"/>
+        <c:lblAlgn val="ctr"/>
+        <c:lblOffset val="100"/>
+        <c:noMultiLvlLbl val="0"/>
+      </c:catAx>
+      <c:valAx>
+        <c:axId val="372798984"/>
+        <c:scaling>
+          <c:orientation val="minMax"/>
+        </c:scaling>
+        <c:delete val="0"/>
+        <c:axPos val="b"/>
+        <c:numFmt formatCode="_(* #,##0_);_(* \(#,##0\);_(* &quot;-&quot;_);_(@_)" sourceLinked="1"/>
+        <c:majorTickMark val="none"/>
+        <c:minorTickMark val="none"/>
+        <c:tickLblPos val="none"/>
+        <c:spPr>
+          <a:noFill/>
+          <a:ln>
+            <a:noFill/>
+          </a:ln>
+          <a:effectLst/>
+        </c:spPr>
+        <c:txPr>
+          <a:bodyPr rot="-60000000" spcFirstLastPara="1" vertOverflow="ellipsis" vert="horz" wrap="square" anchor="ctr" anchorCtr="1"/>
+          <a:lstStyle/>
+          <a:p>
+            <a:pPr>
+              <a:defRPr sz="4000" b="0" i="0" u="none" strike="noStrike" kern="1200" baseline="0">
+                <a:solidFill>
+                  <a:schemeClr val="tx1">
+                    <a:lumMod val="65000"/>
+                    <a:lumOff val="35000"/>
+                  </a:schemeClr>
+                </a:solidFill>
+                <a:latin typeface="Times New Roman" panose="02020603050405020304" pitchFamily="18" charset="0"/>
+                <a:ea typeface="+mn-ea"/>
+                <a:cs typeface="Times New Roman" panose="02020603050405020304" pitchFamily="18" charset="0"/>
+              </a:defRPr>
+            </a:pPr>
+            <a:endParaRPr lang="LID4096"/>
+          </a:p>
+        </c:txPr>
+        <c:crossAx val="372795048"/>
+        <c:crosses val="autoZero"/>
+        <c:crossBetween val="between"/>
+      </c:valAx>
+      <c:spPr>
+        <a:noFill/>
+        <a:ln>
+          <a:noFill/>
+        </a:ln>
+        <a:effectLst/>
+      </c:spPr>
+    </c:plotArea>
+    <c:plotVisOnly val="1"/>
+    <c:dispBlanksAs val="gap"/>
+    <c:showDLblsOverMax val="0"/>
+  </c:chart>
+  <c:spPr>
+    <a:noFill/>
+    <a:ln w="9525" cap="flat" cmpd="sng" algn="ctr">
+      <a:noFill/>
+      <a:round/>
+    </a:ln>
+    <a:effectLst/>
+  </c:spPr>
+  <c:txPr>
+    <a:bodyPr/>
+    <a:lstStyle/>
+    <a:p>
+      <a:pPr>
+        <a:defRPr sz="4000">
+          <a:latin typeface="Times New Roman" panose="02020603050405020304" pitchFamily="18" charset="0"/>
+          <a:cs typeface="Times New Roman" panose="02020603050405020304" pitchFamily="18" charset="0"/>
+        </a:defRPr>
+      </a:pPr>
+      <a:endParaRPr lang="LID4096"/>
     </a:p>
   </c:txPr>
   <c:externalData r:id="rId3">
@@ -1537,6 +2586,86 @@
 </cs:colorStyle>
 </file>
 
+<file path=ppt/charts/colors4.xml><?xml version="1.0" encoding="utf-8"?>
+<cs:colorStyle xmlns:cs="http://schemas.microsoft.com/office/drawing/2012/chartStyle" xmlns:a="http://schemas.openxmlformats.org/drawingml/2006/main" meth="cycle" id="10">
+  <a:schemeClr val="accent1"/>
+  <a:schemeClr val="accent2"/>
+  <a:schemeClr val="accent3"/>
+  <a:schemeClr val="accent4"/>
+  <a:schemeClr val="accent5"/>
+  <a:schemeClr val="accent6"/>
+  <cs:variation/>
+  <cs:variation>
+    <a:lumMod val="60000"/>
+  </cs:variation>
+  <cs:variation>
+    <a:lumMod val="80000"/>
+    <a:lumOff val="20000"/>
+  </cs:variation>
+  <cs:variation>
+    <a:lumMod val="80000"/>
+  </cs:variation>
+  <cs:variation>
+    <a:lumMod val="60000"/>
+    <a:lumOff val="40000"/>
+  </cs:variation>
+  <cs:variation>
+    <a:lumMod val="50000"/>
+  </cs:variation>
+  <cs:variation>
+    <a:lumMod val="70000"/>
+    <a:lumOff val="30000"/>
+  </cs:variation>
+  <cs:variation>
+    <a:lumMod val="70000"/>
+  </cs:variation>
+  <cs:variation>
+    <a:lumMod val="50000"/>
+    <a:lumOff val="50000"/>
+  </cs:variation>
+</cs:colorStyle>
+</file>
+
+<file path=ppt/charts/colors5.xml><?xml version="1.0" encoding="utf-8"?>
+<cs:colorStyle xmlns:cs="http://schemas.microsoft.com/office/drawing/2012/chartStyle" xmlns:a="http://schemas.openxmlformats.org/drawingml/2006/main" meth="cycle" id="10">
+  <a:schemeClr val="accent1"/>
+  <a:schemeClr val="accent2"/>
+  <a:schemeClr val="accent3"/>
+  <a:schemeClr val="accent4"/>
+  <a:schemeClr val="accent5"/>
+  <a:schemeClr val="accent6"/>
+  <cs:variation/>
+  <cs:variation>
+    <a:lumMod val="60000"/>
+  </cs:variation>
+  <cs:variation>
+    <a:lumMod val="80000"/>
+    <a:lumOff val="20000"/>
+  </cs:variation>
+  <cs:variation>
+    <a:lumMod val="80000"/>
+  </cs:variation>
+  <cs:variation>
+    <a:lumMod val="60000"/>
+    <a:lumOff val="40000"/>
+  </cs:variation>
+  <cs:variation>
+    <a:lumMod val="50000"/>
+  </cs:variation>
+  <cs:variation>
+    <a:lumMod val="70000"/>
+    <a:lumOff val="30000"/>
+  </cs:variation>
+  <cs:variation>
+    <a:lumMod val="70000"/>
+  </cs:variation>
+  <cs:variation>
+    <a:lumMod val="50000"/>
+    <a:lumOff val="50000"/>
+  </cs:variation>
+</cs:colorStyle>
+</file>
+
 <file path=ppt/charts/style1.xml><?xml version="1.0" encoding="utf-8"?>
 <cs:chartStyle xmlns:cs="http://schemas.microsoft.com/office/drawing/2012/chartStyle" xmlns:a="http://schemas.openxmlformats.org/drawingml/2006/main" id="216">
   <cs:axisTitle>
@@ -2546,6 +3675,509 @@
 </file>
 
 <file path=ppt/charts/style3.xml><?xml version="1.0" encoding="utf-8"?>
+<cs:chartStyle xmlns:cs="http://schemas.microsoft.com/office/drawing/2012/chartStyle" xmlns:a="http://schemas.openxmlformats.org/drawingml/2006/main" id="201">
+  <cs:axisTitle>
+    <cs:lnRef idx="0"/>
+    <cs:fillRef idx="0"/>
+    <cs:effectRef idx="0"/>
+    <cs:fontRef idx="minor">
+      <a:schemeClr val="tx1">
+        <a:lumMod val="65000"/>
+        <a:lumOff val="35000"/>
+      </a:schemeClr>
+    </cs:fontRef>
+    <cs:defRPr sz="1330" kern="1200"/>
+  </cs:axisTitle>
+  <cs:categoryAxis>
+    <cs:lnRef idx="0"/>
+    <cs:fillRef idx="0"/>
+    <cs:effectRef idx="0"/>
+    <cs:fontRef idx="minor">
+      <a:schemeClr val="tx1">
+        <a:lumMod val="65000"/>
+        <a:lumOff val="35000"/>
+      </a:schemeClr>
+    </cs:fontRef>
+    <cs:spPr>
+      <a:ln w="9525" cap="flat" cmpd="sng" algn="ctr">
+        <a:solidFill>
+          <a:schemeClr val="tx1">
+            <a:lumMod val="15000"/>
+            <a:lumOff val="85000"/>
+          </a:schemeClr>
+        </a:solidFill>
+        <a:round/>
+      </a:ln>
+    </cs:spPr>
+    <cs:defRPr sz="1197" kern="1200"/>
+  </cs:categoryAxis>
+  <cs:chartArea mods="allowNoFillOverride allowNoLineOverride">
+    <cs:lnRef idx="0"/>
+    <cs:fillRef idx="0"/>
+    <cs:effectRef idx="0"/>
+    <cs:fontRef idx="minor">
+      <a:schemeClr val="tx1"/>
+    </cs:fontRef>
+    <cs:spPr>
+      <a:solidFill>
+        <a:schemeClr val="bg1"/>
+      </a:solidFill>
+      <a:ln w="9525" cap="flat" cmpd="sng" algn="ctr">
+        <a:solidFill>
+          <a:schemeClr val="tx1">
+            <a:lumMod val="15000"/>
+            <a:lumOff val="85000"/>
+          </a:schemeClr>
+        </a:solidFill>
+        <a:round/>
+      </a:ln>
+    </cs:spPr>
+    <cs:defRPr sz="1330" kern="1200"/>
+  </cs:chartArea>
+  <cs:dataLabel>
+    <cs:lnRef idx="0"/>
+    <cs:fillRef idx="0"/>
+    <cs:effectRef idx="0"/>
+    <cs:fontRef idx="minor">
+      <a:schemeClr val="tx1">
+        <a:lumMod val="75000"/>
+        <a:lumOff val="25000"/>
+      </a:schemeClr>
+    </cs:fontRef>
+    <cs:defRPr sz="1197" kern="1200"/>
+  </cs:dataLabel>
+  <cs:dataLabelCallout>
+    <cs:lnRef idx="0"/>
+    <cs:fillRef idx="0"/>
+    <cs:effectRef idx="0"/>
+    <cs:fontRef idx="minor">
+      <a:schemeClr val="dk1">
+        <a:lumMod val="65000"/>
+        <a:lumOff val="35000"/>
+      </a:schemeClr>
+    </cs:fontRef>
+    <cs:spPr>
+      <a:solidFill>
+        <a:schemeClr val="lt1"/>
+      </a:solidFill>
+      <a:ln>
+        <a:solidFill>
+          <a:schemeClr val="dk1">
+            <a:lumMod val="25000"/>
+            <a:lumOff val="75000"/>
+          </a:schemeClr>
+        </a:solidFill>
+      </a:ln>
+    </cs:spPr>
+    <cs:defRPr sz="1197" kern="1200"/>
+    <cs:bodyPr rot="0" spcFirstLastPara="1" vertOverflow="clip" horzOverflow="clip" vert="horz" wrap="square" lIns="36576" tIns="18288" rIns="36576" bIns="18288" anchor="ctr" anchorCtr="1">
+      <a:spAutoFit/>
+    </cs:bodyPr>
+  </cs:dataLabelCallout>
+  <cs:dataPoint>
+    <cs:lnRef idx="0"/>
+    <cs:fillRef idx="1">
+      <cs:styleClr val="auto"/>
+    </cs:fillRef>
+    <cs:effectRef idx="0"/>
+    <cs:fontRef idx="minor">
+      <a:schemeClr val="tx1"/>
+    </cs:fontRef>
+  </cs:dataPoint>
+  <cs:dataPoint3D>
+    <cs:lnRef idx="0"/>
+    <cs:fillRef idx="1">
+      <cs:styleClr val="auto"/>
+    </cs:fillRef>
+    <cs:effectRef idx="0"/>
+    <cs:fontRef idx="minor">
+      <a:schemeClr val="tx1"/>
+    </cs:fontRef>
+  </cs:dataPoint3D>
+  <cs:dataPointLine>
+    <cs:lnRef idx="0">
+      <cs:styleClr val="auto"/>
+    </cs:lnRef>
+    <cs:fillRef idx="1"/>
+    <cs:effectRef idx="0"/>
+    <cs:fontRef idx="minor">
+      <a:schemeClr val="tx1"/>
+    </cs:fontRef>
+    <cs:spPr>
+      <a:ln w="28575" cap="rnd">
+        <a:solidFill>
+          <a:schemeClr val="phClr"/>
+        </a:solidFill>
+        <a:round/>
+      </a:ln>
+    </cs:spPr>
+  </cs:dataPointLine>
+  <cs:dataPointMarker>
+    <cs:lnRef idx="0">
+      <cs:styleClr val="auto"/>
+    </cs:lnRef>
+    <cs:fillRef idx="1">
+      <cs:styleClr val="auto"/>
+    </cs:fillRef>
+    <cs:effectRef idx="0"/>
+    <cs:fontRef idx="minor">
+      <a:schemeClr val="tx1"/>
+    </cs:fontRef>
+    <cs:spPr>
+      <a:ln w="9525">
+        <a:solidFill>
+          <a:schemeClr val="phClr"/>
+        </a:solidFill>
+      </a:ln>
+    </cs:spPr>
+  </cs:dataPointMarker>
+  <cs:dataPointMarkerLayout symbol="circle" size="5"/>
+  <cs:dataPointWireframe>
+    <cs:lnRef idx="0">
+      <cs:styleClr val="auto"/>
+    </cs:lnRef>
+    <cs:fillRef idx="1"/>
+    <cs:effectRef idx="0"/>
+    <cs:fontRef idx="minor">
+      <a:schemeClr val="tx1"/>
+    </cs:fontRef>
+    <cs:spPr>
+      <a:ln w="9525" cap="rnd">
+        <a:solidFill>
+          <a:schemeClr val="phClr"/>
+        </a:solidFill>
+        <a:round/>
+      </a:ln>
+    </cs:spPr>
+  </cs:dataPointWireframe>
+  <cs:dataTable>
+    <cs:lnRef idx="0"/>
+    <cs:fillRef idx="0"/>
+    <cs:effectRef idx="0"/>
+    <cs:fontRef idx="minor">
+      <a:schemeClr val="tx1">
+        <a:lumMod val="65000"/>
+        <a:lumOff val="35000"/>
+      </a:schemeClr>
+    </cs:fontRef>
+    <cs:spPr>
+      <a:noFill/>
+      <a:ln w="9525" cap="flat" cmpd="sng" algn="ctr">
+        <a:solidFill>
+          <a:schemeClr val="tx1">
+            <a:lumMod val="15000"/>
+            <a:lumOff val="85000"/>
+          </a:schemeClr>
+        </a:solidFill>
+        <a:round/>
+      </a:ln>
+    </cs:spPr>
+    <cs:defRPr sz="1197" kern="1200"/>
+  </cs:dataTable>
+  <cs:downBar>
+    <cs:lnRef idx="0"/>
+    <cs:fillRef idx="0"/>
+    <cs:effectRef idx="0"/>
+    <cs:fontRef idx="minor">
+      <a:schemeClr val="dk1"/>
+    </cs:fontRef>
+    <cs:spPr>
+      <a:solidFill>
+        <a:schemeClr val="dk1">
+          <a:lumMod val="65000"/>
+          <a:lumOff val="35000"/>
+        </a:schemeClr>
+      </a:solidFill>
+      <a:ln w="9525">
+        <a:solidFill>
+          <a:schemeClr val="tx1">
+            <a:lumMod val="65000"/>
+            <a:lumOff val="35000"/>
+          </a:schemeClr>
+        </a:solidFill>
+      </a:ln>
+    </cs:spPr>
+  </cs:downBar>
+  <cs:dropLine>
+    <cs:lnRef idx="0"/>
+    <cs:fillRef idx="0"/>
+    <cs:effectRef idx="0"/>
+    <cs:fontRef idx="minor">
+      <a:schemeClr val="tx1"/>
+    </cs:fontRef>
+    <cs:spPr>
+      <a:ln w="9525" cap="flat" cmpd="sng" algn="ctr">
+        <a:solidFill>
+          <a:schemeClr val="tx1">
+            <a:lumMod val="35000"/>
+            <a:lumOff val="65000"/>
+          </a:schemeClr>
+        </a:solidFill>
+        <a:round/>
+      </a:ln>
+    </cs:spPr>
+  </cs:dropLine>
+  <cs:errorBar>
+    <cs:lnRef idx="0"/>
+    <cs:fillRef idx="0"/>
+    <cs:effectRef idx="0"/>
+    <cs:fontRef idx="minor">
+      <a:schemeClr val="tx1"/>
+    </cs:fontRef>
+    <cs:spPr>
+      <a:ln w="9525" cap="flat" cmpd="sng" algn="ctr">
+        <a:solidFill>
+          <a:schemeClr val="tx1">
+            <a:lumMod val="65000"/>
+            <a:lumOff val="35000"/>
+          </a:schemeClr>
+        </a:solidFill>
+        <a:round/>
+      </a:ln>
+    </cs:spPr>
+  </cs:errorBar>
+  <cs:floor>
+    <cs:lnRef idx="0"/>
+    <cs:fillRef idx="0"/>
+    <cs:effectRef idx="0"/>
+    <cs:fontRef idx="minor">
+      <a:schemeClr val="tx1"/>
+    </cs:fontRef>
+    <cs:spPr>
+      <a:noFill/>
+      <a:ln>
+        <a:noFill/>
+      </a:ln>
+    </cs:spPr>
+  </cs:floor>
+  <cs:gridlineMajor>
+    <cs:lnRef idx="0"/>
+    <cs:fillRef idx="0"/>
+    <cs:effectRef idx="0"/>
+    <cs:fontRef idx="minor">
+      <a:schemeClr val="tx1"/>
+    </cs:fontRef>
+    <cs:spPr>
+      <a:ln w="9525" cap="flat" cmpd="sng" algn="ctr">
+        <a:solidFill>
+          <a:schemeClr val="tx1">
+            <a:lumMod val="15000"/>
+            <a:lumOff val="85000"/>
+          </a:schemeClr>
+        </a:solidFill>
+        <a:round/>
+      </a:ln>
+    </cs:spPr>
+  </cs:gridlineMajor>
+  <cs:gridlineMinor>
+    <cs:lnRef idx="0"/>
+    <cs:fillRef idx="0"/>
+    <cs:effectRef idx="0"/>
+    <cs:fontRef idx="minor">
+      <a:schemeClr val="tx1"/>
+    </cs:fontRef>
+    <cs:spPr>
+      <a:ln w="9525" cap="flat" cmpd="sng" algn="ctr">
+        <a:solidFill>
+          <a:schemeClr val="tx1">
+            <a:lumMod val="5000"/>
+            <a:lumOff val="95000"/>
+          </a:schemeClr>
+        </a:solidFill>
+        <a:round/>
+      </a:ln>
+    </cs:spPr>
+  </cs:gridlineMinor>
+  <cs:hiLoLine>
+    <cs:lnRef idx="0"/>
+    <cs:fillRef idx="0"/>
+    <cs:effectRef idx="0"/>
+    <cs:fontRef idx="minor">
+      <a:schemeClr val="tx1"/>
+    </cs:fontRef>
+    <cs:spPr>
+      <a:ln w="9525" cap="flat" cmpd="sng" algn="ctr">
+        <a:solidFill>
+          <a:schemeClr val="tx1">
+            <a:lumMod val="75000"/>
+            <a:lumOff val="25000"/>
+          </a:schemeClr>
+        </a:solidFill>
+        <a:round/>
+      </a:ln>
+    </cs:spPr>
+  </cs:hiLoLine>
+  <cs:leaderLine>
+    <cs:lnRef idx="0"/>
+    <cs:fillRef idx="0"/>
+    <cs:effectRef idx="0"/>
+    <cs:fontRef idx="minor">
+      <a:schemeClr val="tx1"/>
+    </cs:fontRef>
+    <cs:spPr>
+      <a:ln w="9525" cap="flat" cmpd="sng" algn="ctr">
+        <a:solidFill>
+          <a:schemeClr val="tx1">
+            <a:lumMod val="35000"/>
+            <a:lumOff val="65000"/>
+          </a:schemeClr>
+        </a:solidFill>
+        <a:round/>
+      </a:ln>
+    </cs:spPr>
+  </cs:leaderLine>
+  <cs:legend>
+    <cs:lnRef idx="0"/>
+    <cs:fillRef idx="0"/>
+    <cs:effectRef idx="0"/>
+    <cs:fontRef idx="minor">
+      <a:schemeClr val="tx1">
+        <a:lumMod val="65000"/>
+        <a:lumOff val="35000"/>
+      </a:schemeClr>
+    </cs:fontRef>
+    <cs:defRPr sz="1197" kern="1200"/>
+  </cs:legend>
+  <cs:plotArea mods="allowNoFillOverride allowNoLineOverride">
+    <cs:lnRef idx="0"/>
+    <cs:fillRef idx="0"/>
+    <cs:effectRef idx="0"/>
+    <cs:fontRef idx="minor">
+      <a:schemeClr val="tx1"/>
+    </cs:fontRef>
+  </cs:plotArea>
+  <cs:plotArea3D mods="allowNoFillOverride allowNoLineOverride">
+    <cs:lnRef idx="0"/>
+    <cs:fillRef idx="0"/>
+    <cs:effectRef idx="0"/>
+    <cs:fontRef idx="minor">
+      <a:schemeClr val="tx1"/>
+    </cs:fontRef>
+  </cs:plotArea3D>
+  <cs:seriesAxis>
+    <cs:lnRef idx="0"/>
+    <cs:fillRef idx="0"/>
+    <cs:effectRef idx="0"/>
+    <cs:fontRef idx="minor">
+      <a:schemeClr val="tx1">
+        <a:lumMod val="65000"/>
+        <a:lumOff val="35000"/>
+      </a:schemeClr>
+    </cs:fontRef>
+    <cs:defRPr sz="1197" kern="1200"/>
+  </cs:seriesAxis>
+  <cs:seriesLine>
+    <cs:lnRef idx="0"/>
+    <cs:fillRef idx="0"/>
+    <cs:effectRef idx="0"/>
+    <cs:fontRef idx="minor">
+      <a:schemeClr val="tx1"/>
+    </cs:fontRef>
+    <cs:spPr>
+      <a:ln w="9525" cap="flat" cmpd="sng" algn="ctr">
+        <a:solidFill>
+          <a:schemeClr val="tx1">
+            <a:lumMod val="35000"/>
+            <a:lumOff val="65000"/>
+          </a:schemeClr>
+        </a:solidFill>
+        <a:round/>
+      </a:ln>
+    </cs:spPr>
+  </cs:seriesLine>
+  <cs:title>
+    <cs:lnRef idx="0"/>
+    <cs:fillRef idx="0"/>
+    <cs:effectRef idx="0"/>
+    <cs:fontRef idx="minor">
+      <a:schemeClr val="tx1">
+        <a:lumMod val="65000"/>
+        <a:lumOff val="35000"/>
+      </a:schemeClr>
+    </cs:fontRef>
+    <cs:defRPr sz="1862" b="0" kern="1200" spc="0" baseline="0"/>
+  </cs:title>
+  <cs:trendline>
+    <cs:lnRef idx="0">
+      <cs:styleClr val="auto"/>
+    </cs:lnRef>
+    <cs:fillRef idx="0"/>
+    <cs:effectRef idx="0"/>
+    <cs:fontRef idx="minor">
+      <a:schemeClr val="tx1"/>
+    </cs:fontRef>
+    <cs:spPr>
+      <a:ln w="19050" cap="rnd">
+        <a:solidFill>
+          <a:schemeClr val="phClr"/>
+        </a:solidFill>
+        <a:prstDash val="sysDot"/>
+      </a:ln>
+    </cs:spPr>
+  </cs:trendline>
+  <cs:trendlineLabel>
+    <cs:lnRef idx="0"/>
+    <cs:fillRef idx="0"/>
+    <cs:effectRef idx="0"/>
+    <cs:fontRef idx="minor">
+      <a:schemeClr val="tx1">
+        <a:lumMod val="65000"/>
+        <a:lumOff val="35000"/>
+      </a:schemeClr>
+    </cs:fontRef>
+    <cs:defRPr sz="1197" kern="1200"/>
+  </cs:trendlineLabel>
+  <cs:upBar>
+    <cs:lnRef idx="0"/>
+    <cs:fillRef idx="0"/>
+    <cs:effectRef idx="0"/>
+    <cs:fontRef idx="minor">
+      <a:schemeClr val="dk1"/>
+    </cs:fontRef>
+    <cs:spPr>
+      <a:solidFill>
+        <a:schemeClr val="lt1"/>
+      </a:solidFill>
+      <a:ln w="9525">
+        <a:solidFill>
+          <a:schemeClr val="tx1">
+            <a:lumMod val="15000"/>
+            <a:lumOff val="85000"/>
+          </a:schemeClr>
+        </a:solidFill>
+      </a:ln>
+    </cs:spPr>
+  </cs:upBar>
+  <cs:valueAxis>
+    <cs:lnRef idx="0"/>
+    <cs:fillRef idx="0"/>
+    <cs:effectRef idx="0"/>
+    <cs:fontRef idx="minor">
+      <a:schemeClr val="tx1">
+        <a:lumMod val="65000"/>
+        <a:lumOff val="35000"/>
+      </a:schemeClr>
+    </cs:fontRef>
+    <cs:defRPr sz="1197" kern="1200"/>
+  </cs:valueAxis>
+  <cs:wall>
+    <cs:lnRef idx="0"/>
+    <cs:fillRef idx="0"/>
+    <cs:effectRef idx="0"/>
+    <cs:fontRef idx="minor">
+      <a:schemeClr val="tx1"/>
+    </cs:fontRef>
+    <cs:spPr>
+      <a:noFill/>
+      <a:ln>
+        <a:noFill/>
+      </a:ln>
+    </cs:spPr>
+  </cs:wall>
+</cs:chartStyle>
+</file>
+
+<file path=ppt/charts/style4.xml><?xml version="1.0" encoding="utf-8"?>
 <cs:chartStyle xmlns:cs="http://schemas.microsoft.com/office/drawing/2012/chartStyle" xmlns:a="http://schemas.openxmlformats.org/drawingml/2006/main" id="102">
   <cs:axisTitle>
     <cs:lnRef idx="0"/>
@@ -2981,6 +4613,511 @@
     <cs:fontRef idx="minor">
       <a:schemeClr val="tx1"/>
     </cs:fontRef>
+  </cs:wall>
+</cs:chartStyle>
+</file>
+
+<file path=ppt/charts/style5.xml><?xml version="1.0" encoding="utf-8"?>
+<cs:chartStyle xmlns:cs="http://schemas.microsoft.com/office/drawing/2012/chartStyle" xmlns:a="http://schemas.openxmlformats.org/drawingml/2006/main" id="216">
+  <cs:axisTitle>
+    <cs:lnRef idx="0"/>
+    <cs:fillRef idx="0"/>
+    <cs:effectRef idx="0"/>
+    <cs:fontRef idx="minor">
+      <a:schemeClr val="tx1">
+        <a:lumMod val="65000"/>
+        <a:lumOff val="35000"/>
+      </a:schemeClr>
+    </cs:fontRef>
+    <cs:defRPr sz="1000" kern="1200"/>
+  </cs:axisTitle>
+  <cs:categoryAxis>
+    <cs:lnRef idx="0"/>
+    <cs:fillRef idx="0"/>
+    <cs:effectRef idx="0"/>
+    <cs:fontRef idx="minor">
+      <a:schemeClr val="tx1">
+        <a:lumMod val="65000"/>
+        <a:lumOff val="35000"/>
+      </a:schemeClr>
+    </cs:fontRef>
+    <cs:spPr>
+      <a:ln w="9525" cap="flat" cmpd="sng" algn="ctr">
+        <a:solidFill>
+          <a:schemeClr val="tx1">
+            <a:lumMod val="15000"/>
+            <a:lumOff val="85000"/>
+          </a:schemeClr>
+        </a:solidFill>
+        <a:round/>
+      </a:ln>
+    </cs:spPr>
+    <cs:defRPr sz="900" kern="1200"/>
+  </cs:categoryAxis>
+  <cs:chartArea mods="allowNoFillOverride allowNoLineOverride">
+    <cs:lnRef idx="0"/>
+    <cs:fillRef idx="0"/>
+    <cs:effectRef idx="0"/>
+    <cs:fontRef idx="minor">
+      <a:schemeClr val="tx1"/>
+    </cs:fontRef>
+    <cs:spPr>
+      <a:solidFill>
+        <a:schemeClr val="bg1"/>
+      </a:solidFill>
+      <a:ln w="9525" cap="flat" cmpd="sng" algn="ctr">
+        <a:solidFill>
+          <a:schemeClr val="tx1">
+            <a:lumMod val="15000"/>
+            <a:lumOff val="85000"/>
+          </a:schemeClr>
+        </a:solidFill>
+        <a:round/>
+      </a:ln>
+    </cs:spPr>
+    <cs:defRPr sz="1000" kern="1200"/>
+  </cs:chartArea>
+  <cs:dataLabel>
+    <cs:lnRef idx="0"/>
+    <cs:fillRef idx="0"/>
+    <cs:effectRef idx="0"/>
+    <cs:fontRef idx="minor">
+      <a:schemeClr val="tx1">
+        <a:lumMod val="75000"/>
+        <a:lumOff val="25000"/>
+      </a:schemeClr>
+    </cs:fontRef>
+    <cs:defRPr sz="900" kern="1200"/>
+  </cs:dataLabel>
+  <cs:dataLabelCallout>
+    <cs:lnRef idx="0"/>
+    <cs:fillRef idx="0"/>
+    <cs:effectRef idx="0"/>
+    <cs:fontRef idx="minor">
+      <a:schemeClr val="dk1">
+        <a:lumMod val="65000"/>
+        <a:lumOff val="35000"/>
+      </a:schemeClr>
+    </cs:fontRef>
+    <cs:spPr>
+      <a:solidFill>
+        <a:schemeClr val="lt1"/>
+      </a:solidFill>
+      <a:ln>
+        <a:solidFill>
+          <a:schemeClr val="dk1">
+            <a:lumMod val="25000"/>
+            <a:lumOff val="75000"/>
+          </a:schemeClr>
+        </a:solidFill>
+      </a:ln>
+    </cs:spPr>
+    <cs:defRPr sz="900" kern="1200"/>
+    <cs:bodyPr rot="0" spcFirstLastPara="1" vertOverflow="clip" horzOverflow="clip" vert="horz" wrap="square" lIns="36576" tIns="18288" rIns="36576" bIns="18288" anchor="ctr" anchorCtr="1">
+      <a:spAutoFit/>
+    </cs:bodyPr>
+  </cs:dataLabelCallout>
+  <cs:dataPoint>
+    <cs:lnRef idx="0"/>
+    <cs:fillRef idx="1">
+      <cs:styleClr val="auto"/>
+    </cs:fillRef>
+    <cs:effectRef idx="0"/>
+    <cs:fontRef idx="minor">
+      <a:schemeClr val="tx1"/>
+    </cs:fontRef>
+  </cs:dataPoint>
+  <cs:dataPoint3D>
+    <cs:lnRef idx="0"/>
+    <cs:fillRef idx="1">
+      <cs:styleClr val="auto"/>
+    </cs:fillRef>
+    <cs:effectRef idx="0"/>
+    <cs:fontRef idx="minor">
+      <a:schemeClr val="tx1"/>
+    </cs:fontRef>
+  </cs:dataPoint3D>
+  <cs:dataPointLine>
+    <cs:lnRef idx="0">
+      <cs:styleClr val="auto"/>
+    </cs:lnRef>
+    <cs:fillRef idx="1"/>
+    <cs:effectRef idx="0"/>
+    <cs:fontRef idx="minor">
+      <a:schemeClr val="tx1"/>
+    </cs:fontRef>
+    <cs:spPr>
+      <a:ln w="28575" cap="rnd">
+        <a:solidFill>
+          <a:schemeClr val="phClr"/>
+        </a:solidFill>
+        <a:round/>
+      </a:ln>
+    </cs:spPr>
+  </cs:dataPointLine>
+  <cs:dataPointMarker>
+    <cs:lnRef idx="0">
+      <cs:styleClr val="auto"/>
+    </cs:lnRef>
+    <cs:fillRef idx="1">
+      <cs:styleClr val="auto"/>
+    </cs:fillRef>
+    <cs:effectRef idx="0"/>
+    <cs:fontRef idx="minor">
+      <a:schemeClr val="tx1"/>
+    </cs:fontRef>
+    <cs:spPr>
+      <a:ln w="9525">
+        <a:solidFill>
+          <a:schemeClr val="phClr"/>
+        </a:solidFill>
+      </a:ln>
+    </cs:spPr>
+  </cs:dataPointMarker>
+  <cs:dataPointMarkerLayout symbol="circle" size="5"/>
+  <cs:dataPointWireframe>
+    <cs:lnRef idx="0">
+      <cs:styleClr val="auto"/>
+    </cs:lnRef>
+    <cs:fillRef idx="1"/>
+    <cs:effectRef idx="0"/>
+    <cs:fontRef idx="minor">
+      <a:schemeClr val="tx1"/>
+    </cs:fontRef>
+    <cs:spPr>
+      <a:ln w="9525" cap="rnd">
+        <a:solidFill>
+          <a:schemeClr val="phClr"/>
+        </a:solidFill>
+        <a:round/>
+      </a:ln>
+    </cs:spPr>
+  </cs:dataPointWireframe>
+  <cs:dataTable>
+    <cs:lnRef idx="0"/>
+    <cs:fillRef idx="0"/>
+    <cs:effectRef idx="0"/>
+    <cs:fontRef idx="minor">
+      <a:schemeClr val="tx1">
+        <a:lumMod val="65000"/>
+        <a:lumOff val="35000"/>
+      </a:schemeClr>
+    </cs:fontRef>
+    <cs:spPr>
+      <a:noFill/>
+      <a:ln w="9525" cap="flat" cmpd="sng" algn="ctr">
+        <a:solidFill>
+          <a:schemeClr val="tx1">
+            <a:lumMod val="15000"/>
+            <a:lumOff val="85000"/>
+          </a:schemeClr>
+        </a:solidFill>
+        <a:round/>
+      </a:ln>
+    </cs:spPr>
+    <cs:defRPr sz="900" kern="1200"/>
+  </cs:dataTable>
+  <cs:downBar>
+    <cs:lnRef idx="0"/>
+    <cs:fillRef idx="0"/>
+    <cs:effectRef idx="0"/>
+    <cs:fontRef idx="minor">
+      <a:schemeClr val="tx1"/>
+    </cs:fontRef>
+    <cs:spPr>
+      <a:solidFill>
+        <a:schemeClr val="dk1">
+          <a:lumMod val="75000"/>
+          <a:lumOff val="25000"/>
+        </a:schemeClr>
+      </a:solidFill>
+      <a:ln w="9525" cap="flat" cmpd="sng" algn="ctr">
+        <a:solidFill>
+          <a:schemeClr val="tx1">
+            <a:lumMod val="65000"/>
+            <a:lumOff val="35000"/>
+          </a:schemeClr>
+        </a:solidFill>
+        <a:round/>
+      </a:ln>
+    </cs:spPr>
+  </cs:downBar>
+  <cs:dropLine>
+    <cs:lnRef idx="0"/>
+    <cs:fillRef idx="0"/>
+    <cs:effectRef idx="0"/>
+    <cs:fontRef idx="minor">
+      <a:schemeClr val="tx1"/>
+    </cs:fontRef>
+    <cs:spPr>
+      <a:ln w="9525" cap="flat" cmpd="sng" algn="ctr">
+        <a:solidFill>
+          <a:schemeClr val="tx1">
+            <a:lumMod val="35000"/>
+            <a:lumOff val="65000"/>
+          </a:schemeClr>
+        </a:solidFill>
+        <a:round/>
+      </a:ln>
+    </cs:spPr>
+  </cs:dropLine>
+  <cs:errorBar>
+    <cs:lnRef idx="0"/>
+    <cs:fillRef idx="0"/>
+    <cs:effectRef idx="0"/>
+    <cs:fontRef idx="minor">
+      <a:schemeClr val="tx1"/>
+    </cs:fontRef>
+    <cs:spPr>
+      <a:ln w="9525" cap="flat" cmpd="sng" algn="ctr">
+        <a:solidFill>
+          <a:schemeClr val="tx1">
+            <a:lumMod val="65000"/>
+            <a:lumOff val="35000"/>
+          </a:schemeClr>
+        </a:solidFill>
+        <a:round/>
+      </a:ln>
+    </cs:spPr>
+  </cs:errorBar>
+  <cs:floor>
+    <cs:lnRef idx="0"/>
+    <cs:fillRef idx="0"/>
+    <cs:effectRef idx="0"/>
+    <cs:fontRef idx="minor">
+      <a:schemeClr val="tx1"/>
+    </cs:fontRef>
+    <cs:spPr>
+      <a:noFill/>
+      <a:ln>
+        <a:noFill/>
+      </a:ln>
+    </cs:spPr>
+  </cs:floor>
+  <cs:gridlineMajor>
+    <cs:lnRef idx="0"/>
+    <cs:fillRef idx="0"/>
+    <cs:effectRef idx="0"/>
+    <cs:fontRef idx="minor">
+      <a:schemeClr val="tx1"/>
+    </cs:fontRef>
+    <cs:spPr>
+      <a:ln w="9525" cap="flat" cmpd="sng" algn="ctr">
+        <a:solidFill>
+          <a:schemeClr val="tx1">
+            <a:lumMod val="15000"/>
+            <a:lumOff val="85000"/>
+          </a:schemeClr>
+        </a:solidFill>
+        <a:round/>
+      </a:ln>
+    </cs:spPr>
+  </cs:gridlineMajor>
+  <cs:gridlineMinor>
+    <cs:lnRef idx="0"/>
+    <cs:fillRef idx="0"/>
+    <cs:effectRef idx="0"/>
+    <cs:fontRef idx="minor">
+      <a:schemeClr val="tx1"/>
+    </cs:fontRef>
+    <cs:spPr>
+      <a:ln w="9525" cap="flat" cmpd="sng" algn="ctr">
+        <a:solidFill>
+          <a:schemeClr val="tx1">
+            <a:lumMod val="5000"/>
+            <a:lumOff val="95000"/>
+          </a:schemeClr>
+        </a:solidFill>
+        <a:round/>
+      </a:ln>
+    </cs:spPr>
+  </cs:gridlineMinor>
+  <cs:hiLoLine>
+    <cs:lnRef idx="0"/>
+    <cs:fillRef idx="0"/>
+    <cs:effectRef idx="0"/>
+    <cs:fontRef idx="minor">
+      <a:schemeClr val="tx1"/>
+    </cs:fontRef>
+    <cs:spPr>
+      <a:ln w="9525" cap="flat" cmpd="sng" algn="ctr">
+        <a:solidFill>
+          <a:schemeClr val="tx1">
+            <a:lumMod val="50000"/>
+            <a:lumOff val="50000"/>
+          </a:schemeClr>
+        </a:solidFill>
+        <a:round/>
+      </a:ln>
+    </cs:spPr>
+  </cs:hiLoLine>
+  <cs:leaderLine>
+    <cs:lnRef idx="0"/>
+    <cs:fillRef idx="0"/>
+    <cs:effectRef idx="0"/>
+    <cs:fontRef idx="minor">
+      <a:schemeClr val="tx1"/>
+    </cs:fontRef>
+    <cs:spPr>
+      <a:ln w="9525" cap="flat" cmpd="sng" algn="ctr">
+        <a:solidFill>
+          <a:schemeClr val="tx1">
+            <a:lumMod val="35000"/>
+            <a:lumOff val="65000"/>
+          </a:schemeClr>
+        </a:solidFill>
+        <a:round/>
+      </a:ln>
+    </cs:spPr>
+  </cs:leaderLine>
+  <cs:legend>
+    <cs:lnRef idx="0"/>
+    <cs:fillRef idx="0"/>
+    <cs:effectRef idx="0"/>
+    <cs:fontRef idx="minor">
+      <a:schemeClr val="tx1">
+        <a:lumMod val="65000"/>
+        <a:lumOff val="35000"/>
+      </a:schemeClr>
+    </cs:fontRef>
+    <cs:defRPr sz="900" kern="1200"/>
+  </cs:legend>
+  <cs:plotArea mods="allowNoFillOverride allowNoLineOverride">
+    <cs:lnRef idx="0"/>
+    <cs:fillRef idx="0"/>
+    <cs:effectRef idx="0"/>
+    <cs:fontRef idx="minor">
+      <a:schemeClr val="tx1"/>
+    </cs:fontRef>
+  </cs:plotArea>
+  <cs:plotArea3D mods="allowNoFillOverride allowNoLineOverride">
+    <cs:lnRef idx="0"/>
+    <cs:fillRef idx="0"/>
+    <cs:effectRef idx="0"/>
+    <cs:fontRef idx="minor">
+      <a:schemeClr val="tx1"/>
+    </cs:fontRef>
+  </cs:plotArea3D>
+  <cs:seriesAxis>
+    <cs:lnRef idx="0"/>
+    <cs:fillRef idx="0"/>
+    <cs:effectRef idx="0"/>
+    <cs:fontRef idx="minor">
+      <a:schemeClr val="tx1">
+        <a:lumMod val="65000"/>
+        <a:lumOff val="35000"/>
+      </a:schemeClr>
+    </cs:fontRef>
+    <cs:defRPr sz="900" kern="1200"/>
+  </cs:seriesAxis>
+  <cs:seriesLine>
+    <cs:lnRef idx="0"/>
+    <cs:fillRef idx="0"/>
+    <cs:effectRef idx="0"/>
+    <cs:fontRef idx="minor">
+      <a:schemeClr val="tx1"/>
+    </cs:fontRef>
+    <cs:spPr>
+      <a:ln w="9525" cap="flat" cmpd="sng" algn="ctr">
+        <a:solidFill>
+          <a:schemeClr val="tx1">
+            <a:lumMod val="35000"/>
+            <a:lumOff val="65000"/>
+          </a:schemeClr>
+        </a:solidFill>
+        <a:round/>
+      </a:ln>
+    </cs:spPr>
+  </cs:seriesLine>
+  <cs:title>
+    <cs:lnRef idx="0"/>
+    <cs:fillRef idx="0"/>
+    <cs:effectRef idx="0"/>
+    <cs:fontRef idx="minor">
+      <a:schemeClr val="tx1">
+        <a:lumMod val="65000"/>
+        <a:lumOff val="35000"/>
+      </a:schemeClr>
+    </cs:fontRef>
+    <cs:defRPr sz="1400" b="0" kern="1200" spc="0" baseline="0"/>
+  </cs:title>
+  <cs:trendline>
+    <cs:lnRef idx="0">
+      <cs:styleClr val="auto"/>
+    </cs:lnRef>
+    <cs:fillRef idx="0"/>
+    <cs:effectRef idx="0"/>
+    <cs:fontRef idx="minor">
+      <a:schemeClr val="tx1"/>
+    </cs:fontRef>
+    <cs:spPr>
+      <a:ln w="19050" cap="rnd">
+        <a:solidFill>
+          <a:schemeClr val="phClr"/>
+        </a:solidFill>
+        <a:prstDash val="sysDot"/>
+      </a:ln>
+    </cs:spPr>
+  </cs:trendline>
+  <cs:trendlineLabel>
+    <cs:lnRef idx="0"/>
+    <cs:fillRef idx="0"/>
+    <cs:effectRef idx="0"/>
+    <cs:fontRef idx="minor">
+      <a:schemeClr val="tx1">
+        <a:lumMod val="65000"/>
+        <a:lumOff val="35000"/>
+      </a:schemeClr>
+    </cs:fontRef>
+    <cs:defRPr sz="900" kern="1200"/>
+  </cs:trendlineLabel>
+  <cs:upBar>
+    <cs:lnRef idx="0"/>
+    <cs:fillRef idx="0"/>
+    <cs:effectRef idx="0"/>
+    <cs:fontRef idx="minor">
+      <a:schemeClr val="tx1"/>
+    </cs:fontRef>
+    <cs:spPr>
+      <a:solidFill>
+        <a:schemeClr val="lt1"/>
+      </a:solidFill>
+      <a:ln w="9525" cap="flat" cmpd="sng" algn="ctr">
+        <a:solidFill>
+          <a:schemeClr val="tx1">
+            <a:lumMod val="65000"/>
+            <a:lumOff val="35000"/>
+          </a:schemeClr>
+        </a:solidFill>
+        <a:round/>
+      </a:ln>
+    </cs:spPr>
+  </cs:upBar>
+  <cs:valueAxis>
+    <cs:lnRef idx="0"/>
+    <cs:fillRef idx="0"/>
+    <cs:effectRef idx="0"/>
+    <cs:fontRef idx="minor">
+      <a:schemeClr val="tx1">
+        <a:lumMod val="65000"/>
+        <a:lumOff val="35000"/>
+      </a:schemeClr>
+    </cs:fontRef>
+    <cs:defRPr sz="900" kern="1200"/>
+  </cs:valueAxis>
+  <cs:wall>
+    <cs:lnRef idx="0"/>
+    <cs:fillRef idx="0"/>
+    <cs:effectRef idx="0"/>
+    <cs:fontRef idx="minor">
+      <a:schemeClr val="tx1"/>
+    </cs:fontRef>
+    <cs:spPr>
+      <a:noFill/>
+      <a:ln>
+        <a:noFill/>
+      </a:ln>
+    </cs:spPr>
   </cs:wall>
 </cs:chartStyle>
 </file>
@@ -3071,7 +5208,7 @@
               <a:rPr lang="en-US" smtClean="0">
                 <a:latin typeface="Arial" panose="020B0604020202020204" pitchFamily="34" charset="0"/>
               </a:rPr>
-              <a:t>5/9/2020</a:t>
+              <a:t>5/11/2020</a:t>
             </a:fld>
             <a:endParaRPr lang="en-US" dirty="0">
               <a:latin typeface="Arial" panose="020B0604020202020204" pitchFamily="34" charset="0"/>
@@ -3250,7 +5387,7 @@
             <a:fld id="{0BA5BBE4-AEA3-489A-A28E-0C2FAF2506E3}" type="datetimeFigureOut">
               <a:rPr lang="en-US" smtClean="0"/>
               <a:pPr/>
-              <a:t>5/9/2020</a:t>
+              <a:t>5/11/2020</a:t>
             </a:fld>
             <a:endParaRPr lang="en-US" dirty="0"/>
           </a:p>
@@ -3986,7 +6123,7 @@
           <a:graphicData uri="http://schemas.openxmlformats.org/presentationml/2006/ole">
             <mc:AlternateContent xmlns:mc="http://schemas.openxmlformats.org/markup-compatibility/2006">
               <mc:Choice xmlns:v="urn:schemas-microsoft-com:vml" Requires="v">
-                <p:oleObj spid="_x0000_s2358" name="think-cell Slide" r:id="rId5" imgW="270" imgH="270" progId="TCLayout.ActiveDocument.1">
+                <p:oleObj spid="_x0000_s2361" name="think-cell Slide" r:id="rId5" imgW="270" imgH="270" progId="TCLayout.ActiveDocument.1">
                   <p:embed/>
                 </p:oleObj>
               </mc:Choice>
@@ -4799,6 +6936,34 @@
           </a:graphicData>
         </a:graphic>
       </p:graphicFrame>
+      <p:graphicFrame>
+        <p:nvGraphicFramePr>
+          <p:cNvPr id="7" name="Chart 6">
+            <a:extLst>
+              <a:ext uri="{FF2B5EF4-FFF2-40B4-BE49-F238E27FC236}">
+                <a16:creationId xmlns:a16="http://schemas.microsoft.com/office/drawing/2014/main" id="{0704F77D-392A-4DDC-8473-AB674D9882DC}"/>
+              </a:ext>
+            </a:extLst>
+          </p:cNvPr>
+          <p:cNvGraphicFramePr/>
+          <p:nvPr>
+            <p:extLst>
+              <p:ext uri="{D42A27DB-BD31-4B8C-83A1-F6EECF244321}">
+                <p14:modId xmlns:p14="http://schemas.microsoft.com/office/powerpoint/2010/main" val="2949922892"/>
+              </p:ext>
+            </p:extLst>
+          </p:nvPr>
+        </p:nvGraphicFramePr>
+        <p:xfrm>
+          <a:off x="5942842" y="4228866"/>
+          <a:ext cx="2926036" cy="1800184"/>
+        </p:xfrm>
+        <a:graphic>
+          <a:graphicData uri="http://schemas.openxmlformats.org/drawingml/2006/chart">
+            <c:chart xmlns:c="http://schemas.openxmlformats.org/drawingml/2006/chart" xmlns:r="http://schemas.openxmlformats.org/officeDocument/2006/relationships" r:id="rId6"/>
+          </a:graphicData>
+        </a:graphic>
+      </p:graphicFrame>
     </p:spTree>
     <p:extLst>
       <p:ext uri="{BB962C8B-B14F-4D97-AF65-F5344CB8AC3E}">
@@ -4815,7 +6980,7 @@
         <p:fade/>
       </p:transition>
     </mc:Choice>
-    <mc:Fallback xmlns:v="urn:schemas-microsoft-com:vml" xmlns:c="http://schemas.openxmlformats.org/drawingml/2006/chart" xmlns="">
+    <mc:Fallback xmlns="" xmlns:c="http://schemas.openxmlformats.org/drawingml/2006/chart" xmlns:v="urn:schemas-microsoft-com:vml">
       <p:transition spd="med">
         <p:fade/>
       </p:transition>
@@ -4866,6 +7031,36 @@
         <a:graphic>
           <a:graphicData uri="http://schemas.openxmlformats.org/drawingml/2006/chart">
             <c:chart xmlns:c="http://schemas.openxmlformats.org/drawingml/2006/chart" xmlns:r="http://schemas.openxmlformats.org/officeDocument/2006/relationships" r:id="rId2"/>
+          </a:graphicData>
+        </a:graphic>
+      </p:graphicFrame>
+      <p:graphicFrame>
+        <p:nvGraphicFramePr>
+          <p:cNvPr id="4" name="Диаграмма 19">
+            <a:extLst>
+              <a:ext uri="{FF2B5EF4-FFF2-40B4-BE49-F238E27FC236}">
+                <a16:creationId xmlns:a16="http://schemas.microsoft.com/office/drawing/2014/main" id="{0EBD4F82-AEC0-4F7E-AEC0-0551A23FF27C}"/>
+              </a:ext>
+            </a:extLst>
+          </p:cNvPr>
+          <p:cNvGraphicFramePr>
+            <a:graphicFrameLocks/>
+          </p:cNvGraphicFramePr>
+          <p:nvPr>
+            <p:extLst>
+              <p:ext uri="{D42A27DB-BD31-4B8C-83A1-F6EECF244321}">
+                <p14:modId xmlns:p14="http://schemas.microsoft.com/office/powerpoint/2010/main" val="3083372387"/>
+              </p:ext>
+            </p:extLst>
+          </p:nvPr>
+        </p:nvGraphicFramePr>
+        <p:xfrm>
+          <a:off x="1318145" y="3779837"/>
+          <a:ext cx="6929927" cy="2390352"/>
+        </p:xfrm>
+        <a:graphic>
+          <a:graphicData uri="http://schemas.openxmlformats.org/drawingml/2006/chart">
+            <c:chart xmlns:c="http://schemas.openxmlformats.org/drawingml/2006/chart" xmlns:r="http://schemas.openxmlformats.org/officeDocument/2006/relationships" r:id="rId3"/>
           </a:graphicData>
         </a:graphic>
       </p:graphicFrame>

</xml_diff>

<commit_message>
[WIP]: SLD-64: Add API to generate PNG-scheme
</commit_message>
<xml_diff>
--- a/src/SlideDotNet.Tests/Resource/025.pptx
+++ b/src/SlideDotNet.Tests/Resource/025.pptx
@@ -5,19 +5,20 @@
     <p:sldMasterId id="2147483648" r:id="rId1"/>
   </p:sldMasterIdLst>
   <p:notesMasterIdLst>
-    <p:notesMasterId r:id="rId4"/>
+    <p:notesMasterId r:id="rId5"/>
   </p:notesMasterIdLst>
   <p:handoutMasterIdLst>
-    <p:handoutMasterId r:id="rId5"/>
+    <p:handoutMasterId r:id="rId6"/>
   </p:handoutMasterIdLst>
   <p:sldIdLst>
     <p:sldId id="357" r:id="rId2"/>
     <p:sldId id="358" r:id="rId3"/>
+    <p:sldId id="359" r:id="rId4"/>
   </p:sldIdLst>
   <p:sldSz cx="10691813" cy="7559675"/>
   <p:notesSz cx="7315200" cy="9601200"/>
   <p:custDataLst>
-    <p:tags r:id="rId6"/>
+    <p:tags r:id="rId7"/>
   </p:custDataLst>
   <p:defaultTextStyle>
     <a:defPPr>
@@ -1105,7 +1106,7 @@
               </c:numCache>
             </c:numRef>
           </c:val>
-          <c:extLst xmlns:c16r3="http://schemas.microsoft.com/office/drawing/2017/03/chart" xmlns:c16="http://schemas.microsoft.com/office/drawing/2014/chart" xmlns:c14="http://schemas.microsoft.com/office/drawing/2007/8/2/chart" xmlns:mc="http://schemas.openxmlformats.org/markup-compatibility/2006">
+          <c:extLst xmlns:mc="http://schemas.openxmlformats.org/markup-compatibility/2006" xmlns:c14="http://schemas.microsoft.com/office/drawing/2007/8/2/chart" xmlns:c16="http://schemas.microsoft.com/office/drawing/2014/chart" xmlns:c16r3="http://schemas.microsoft.com/office/drawing/2017/03/chart">
             <c:ext xmlns:c16="http://schemas.microsoft.com/office/drawing/2014/chart" uri="{C3380CC4-5D6E-409C-BE32-E72D297353CC}">
               <c16:uniqueId val="{00000004-85FF-4A9E-A301-DA0EAA17C6A6}"/>
             </c:ext>
@@ -1190,7 +1191,7 @@
               </c:numCache>
             </c:numRef>
           </c:val>
-          <c:extLst xmlns:c16r3="http://schemas.microsoft.com/office/drawing/2017/03/chart" xmlns:c16="http://schemas.microsoft.com/office/drawing/2014/chart" xmlns:c14="http://schemas.microsoft.com/office/drawing/2007/8/2/chart" xmlns:mc="http://schemas.openxmlformats.org/markup-compatibility/2006">
+          <c:extLst xmlns:mc="http://schemas.openxmlformats.org/markup-compatibility/2006" xmlns:c14="http://schemas.microsoft.com/office/drawing/2007/8/2/chart" xmlns:c16="http://schemas.microsoft.com/office/drawing/2014/chart" xmlns:c16r3="http://schemas.microsoft.com/office/drawing/2017/03/chart">
             <c:ext xmlns:c16="http://schemas.microsoft.com/office/drawing/2014/chart" uri="{C3380CC4-5D6E-409C-BE32-E72D297353CC}">
               <c16:uniqueId val="{00000009-85FF-4A9E-A301-DA0EAA17C6A6}"/>
             </c:ext>
@@ -1280,7 +1281,7 @@
               </c:numCache>
             </c:numRef>
           </c:val>
-          <c:extLst xmlns:c16r3="http://schemas.microsoft.com/office/drawing/2017/03/chart" xmlns:c16="http://schemas.microsoft.com/office/drawing/2014/chart" xmlns:c14="http://schemas.microsoft.com/office/drawing/2007/8/2/chart" xmlns:mc="http://schemas.openxmlformats.org/markup-compatibility/2006">
+          <c:extLst xmlns:mc="http://schemas.openxmlformats.org/markup-compatibility/2006" xmlns:c14="http://schemas.microsoft.com/office/drawing/2007/8/2/chart" xmlns:c16="http://schemas.microsoft.com/office/drawing/2014/chart" xmlns:c16r3="http://schemas.microsoft.com/office/drawing/2017/03/chart">
             <c:ext xmlns:c16="http://schemas.microsoft.com/office/drawing/2014/chart" uri="{C3380CC4-5D6E-409C-BE32-E72D297353CC}">
               <c16:uniqueId val="{0000000E-85FF-4A9E-A301-DA0EAA17C6A6}"/>
             </c:ext>
@@ -1365,7 +1366,7 @@
               </c:numCache>
             </c:numRef>
           </c:val>
-          <c:extLst xmlns:c16r3="http://schemas.microsoft.com/office/drawing/2017/03/chart" xmlns:c16="http://schemas.microsoft.com/office/drawing/2014/chart" xmlns:c14="http://schemas.microsoft.com/office/drawing/2007/8/2/chart" xmlns:mc="http://schemas.openxmlformats.org/markup-compatibility/2006">
+          <c:extLst xmlns:mc="http://schemas.openxmlformats.org/markup-compatibility/2006" xmlns:c14="http://schemas.microsoft.com/office/drawing/2007/8/2/chart" xmlns:c16="http://schemas.microsoft.com/office/drawing/2014/chart" xmlns:c16r3="http://schemas.microsoft.com/office/drawing/2017/03/chart">
             <c:ext xmlns:c16="http://schemas.microsoft.com/office/drawing/2014/chart" uri="{C3380CC4-5D6E-409C-BE32-E72D297353CC}">
               <c16:uniqueId val="{00000013-85FF-4A9E-A301-DA0EAA17C6A6}"/>
             </c:ext>
@@ -1423,7 +1424,7 @@
     </c:legend>
     <c:plotVisOnly val="1"/>
     <c:dispBlanksAs val="gap"/>
-    <c:extLst xmlns:c16r3="http://schemas.microsoft.com/office/drawing/2017/03/chart" xmlns:c16="http://schemas.microsoft.com/office/drawing/2014/chart" xmlns:c14="http://schemas.microsoft.com/office/drawing/2007/8/2/chart" xmlns:mc="http://schemas.openxmlformats.org/markup-compatibility/2006">
+    <c:extLst xmlns:mc="http://schemas.openxmlformats.org/markup-compatibility/2006" xmlns:c14="http://schemas.microsoft.com/office/drawing/2007/8/2/chart" xmlns:c16="http://schemas.microsoft.com/office/drawing/2014/chart" xmlns:c16r3="http://schemas.microsoft.com/office/drawing/2017/03/chart">
       <c:ext xmlns:c16r3="http://schemas.microsoft.com/office/drawing/2017/03/chart" uri="{56B9EC1D-385E-4148-901F-78D8002777C0}">
         <c16r3:dataDisplayOptions16>
           <c16r3:dispNaAsBlank val="1"/>
@@ -1569,7 +1570,7 @@
             </c:numRef>
           </c:yVal>
           <c:smooth val="1"/>
-          <c:extLst xmlns:mc="http://schemas.openxmlformats.org/markup-compatibility/2006" xmlns:c14="http://schemas.microsoft.com/office/drawing/2007/8/2/chart" xmlns:c16="http://schemas.microsoft.com/office/drawing/2014/chart">
+          <c:extLst xmlns:c16="http://schemas.microsoft.com/office/drawing/2014/chart" xmlns:c14="http://schemas.microsoft.com/office/drawing/2007/8/2/chart" xmlns:mc="http://schemas.openxmlformats.org/markup-compatibility/2006">
             <c:ext xmlns:c16="http://schemas.microsoft.com/office/drawing/2014/chart" uri="{C3380CC4-5D6E-409C-BE32-E72D297353CC}">
               <c16:uniqueId val="{00000000-9B82-4F0A-BBF2-F487496F06C9}"/>
             </c:ext>
@@ -1656,7 +1657,7 @@
             </c:numRef>
           </c:yVal>
           <c:smooth val="1"/>
-          <c:extLst xmlns:mc="http://schemas.openxmlformats.org/markup-compatibility/2006" xmlns:c14="http://schemas.microsoft.com/office/drawing/2007/8/2/chart" xmlns:c16="http://schemas.microsoft.com/office/drawing/2014/chart">
+          <c:extLst xmlns:c16="http://schemas.microsoft.com/office/drawing/2014/chart" xmlns:c14="http://schemas.microsoft.com/office/drawing/2007/8/2/chart" xmlns:mc="http://schemas.openxmlformats.org/markup-compatibility/2006">
             <c:ext xmlns:c16="http://schemas.microsoft.com/office/drawing/2014/chart" uri="{C3380CC4-5D6E-409C-BE32-E72D297353CC}">
               <c16:uniqueId val="{00000001-9B82-4F0A-BBF2-F487496F06C9}"/>
             </c:ext>
@@ -1743,7 +1744,7 @@
             </c:numRef>
           </c:yVal>
           <c:smooth val="1"/>
-          <c:extLst xmlns:mc="http://schemas.openxmlformats.org/markup-compatibility/2006" xmlns:c14="http://schemas.microsoft.com/office/drawing/2007/8/2/chart" xmlns:c16="http://schemas.microsoft.com/office/drawing/2014/chart">
+          <c:extLst xmlns:c16="http://schemas.microsoft.com/office/drawing/2014/chart" xmlns:c14="http://schemas.microsoft.com/office/drawing/2007/8/2/chart" xmlns:mc="http://schemas.openxmlformats.org/markup-compatibility/2006">
             <c:ext xmlns:c16="http://schemas.microsoft.com/office/drawing/2014/chart" uri="{C3380CC4-5D6E-409C-BE32-E72D297353CC}">
               <c16:uniqueId val="{00000002-9B82-4F0A-BBF2-F487496F06C9}"/>
             </c:ext>
@@ -2017,7 +2018,7 @@
               <c:showSerName val="0"/>
               <c:showPercent val="0"/>
               <c:showBubbleSize val="0"/>
-              <c:extLst xmlns:c16="http://schemas.microsoft.com/office/drawing/2014/chart" xmlns:c15="http://schemas.microsoft.com/office/drawing/2012/chart" xmlns:c14="http://schemas.microsoft.com/office/drawing/2007/8/2/chart" xmlns:mc="http://schemas.openxmlformats.org/markup-compatibility/2006">
+              <c:extLst xmlns:mc="http://schemas.openxmlformats.org/markup-compatibility/2006" xmlns:c14="http://schemas.microsoft.com/office/drawing/2007/8/2/chart" xmlns:c15="http://schemas.microsoft.com/office/drawing/2012/chart" xmlns:c16="http://schemas.microsoft.com/office/drawing/2014/chart">
                 <c:ext xmlns:c15="http://schemas.microsoft.com/office/drawing/2012/chart" uri="{CE6537A1-D6FC-4f65-9D91-7224C49458BB}">
                   <c15:dlblFieldTable/>
                   <c15:showDataLabelsRange val="0"/>
@@ -2107,7 +2108,7 @@
               <c:showSerName val="0"/>
               <c:showPercent val="0"/>
               <c:showBubbleSize val="0"/>
-              <c:extLst xmlns:c16="http://schemas.microsoft.com/office/drawing/2014/chart" xmlns:c15="http://schemas.microsoft.com/office/drawing/2012/chart" xmlns:c14="http://schemas.microsoft.com/office/drawing/2007/8/2/chart" xmlns:mc="http://schemas.openxmlformats.org/markup-compatibility/2006">
+              <c:extLst xmlns:mc="http://schemas.openxmlformats.org/markup-compatibility/2006" xmlns:c14="http://schemas.microsoft.com/office/drawing/2007/8/2/chart" xmlns:c15="http://schemas.microsoft.com/office/drawing/2012/chart" xmlns:c16="http://schemas.microsoft.com/office/drawing/2014/chart">
                 <c:ext xmlns:c15="http://schemas.microsoft.com/office/drawing/2012/chart" uri="{CE6537A1-D6FC-4f65-9D91-7224C49458BB}">
                   <c15:layout>
                     <c:manualLayout>
@@ -2211,7 +2212,7 @@
               <c:showSerName val="0"/>
               <c:showPercent val="0"/>
               <c:showBubbleSize val="0"/>
-              <c:extLst xmlns:c16="http://schemas.microsoft.com/office/drawing/2014/chart" xmlns:c15="http://schemas.microsoft.com/office/drawing/2012/chart" xmlns:c14="http://schemas.microsoft.com/office/drawing/2007/8/2/chart" xmlns:mc="http://schemas.openxmlformats.org/markup-compatibility/2006">
+              <c:extLst xmlns:mc="http://schemas.openxmlformats.org/markup-compatibility/2006" xmlns:c14="http://schemas.microsoft.com/office/drawing/2007/8/2/chart" xmlns:c15="http://schemas.microsoft.com/office/drawing/2012/chart" xmlns:c16="http://schemas.microsoft.com/office/drawing/2014/chart">
                 <c:ext xmlns:c15="http://schemas.microsoft.com/office/drawing/2012/chart" uri="{CE6537A1-D6FC-4f65-9D91-7224C49458BB}">
                   <c15:layout>
                     <c:manualLayout>
@@ -2261,7 +2262,7 @@
             <c:showPercent val="0"/>
             <c:showBubbleSize val="0"/>
             <c:showLeaderLines val="0"/>
-            <c:extLst xmlns:c16="http://schemas.microsoft.com/office/drawing/2014/chart" xmlns:c15="http://schemas.microsoft.com/office/drawing/2012/chart" xmlns:c14="http://schemas.microsoft.com/office/drawing/2007/8/2/chart" xmlns:mc="http://schemas.openxmlformats.org/markup-compatibility/2006">
+            <c:extLst xmlns:mc="http://schemas.openxmlformats.org/markup-compatibility/2006" xmlns:c14="http://schemas.microsoft.com/office/drawing/2007/8/2/chart" xmlns:c15="http://schemas.microsoft.com/office/drawing/2012/chart" xmlns:c16="http://schemas.microsoft.com/office/drawing/2014/chart">
               <c:ext xmlns:c15="http://schemas.microsoft.com/office/drawing/2012/chart" uri="{CE6537A1-D6FC-4f65-9D91-7224C49458BB}">
                 <c15:showLeaderLines val="1"/>
                 <c15:leaderLines>
@@ -2316,7 +2317,7 @@
               </c:numCache>
             </c:numRef>
           </c:val>
-          <c:extLst xmlns:c16="http://schemas.microsoft.com/office/drawing/2014/chart" xmlns:c15="http://schemas.microsoft.com/office/drawing/2012/chart" xmlns:c14="http://schemas.microsoft.com/office/drawing/2007/8/2/chart" xmlns:mc="http://schemas.openxmlformats.org/markup-compatibility/2006">
+          <c:extLst xmlns:mc="http://schemas.openxmlformats.org/markup-compatibility/2006" xmlns:c14="http://schemas.microsoft.com/office/drawing/2007/8/2/chart" xmlns:c15="http://schemas.microsoft.com/office/drawing/2012/chart" xmlns:c16="http://schemas.microsoft.com/office/drawing/2014/chart">
             <c:ext xmlns:c16="http://schemas.microsoft.com/office/drawing/2014/chart" uri="{C3380CC4-5D6E-409C-BE32-E72D297353CC}">
               <c16:uniqueId val="{00000003-355C-46C5-8EE8-42EFA5183349}"/>
             </c:ext>
@@ -5208,7 +5209,7 @@
               <a:rPr lang="en-US" smtClean="0">
                 <a:latin typeface="Arial" panose="020B0604020202020204" pitchFamily="34" charset="0"/>
               </a:rPr>
-              <a:t>5/11/2020</a:t>
+              <a:t>5/17/2020</a:t>
             </a:fld>
             <a:endParaRPr lang="en-US" dirty="0">
               <a:latin typeface="Arial" panose="020B0604020202020204" pitchFamily="34" charset="0"/>
@@ -5387,7 +5388,7 @@
             <a:fld id="{0BA5BBE4-AEA3-489A-A28E-0C2FAF2506E3}" type="datetimeFigureOut">
               <a:rPr lang="en-US" smtClean="0"/>
               <a:pPr/>
-              <a:t>5/11/2020</a:t>
+              <a:t>5/17/2020</a:t>
             </a:fld>
             <a:endParaRPr lang="en-US" dirty="0"/>
           </a:p>
@@ -6123,7 +6124,7 @@
           <a:graphicData uri="http://schemas.openxmlformats.org/presentationml/2006/ole">
             <mc:AlternateContent xmlns:mc="http://schemas.openxmlformats.org/markup-compatibility/2006">
               <mc:Choice xmlns:v="urn:schemas-microsoft-com:vml" Requires="v">
-                <p:oleObj spid="_x0000_s2361" name="think-cell Slide" r:id="rId5" imgW="270" imgH="270" progId="TCLayout.ActiveDocument.1">
+                <p:oleObj spid="_x0000_s2362" name="think-cell Slide" r:id="rId5" imgW="270" imgH="270" progId="TCLayout.ActiveDocument.1">
                   <p:embed/>
                 </p:oleObj>
               </mc:Choice>
@@ -6980,7 +6981,7 @@
         <p:fade/>
       </p:transition>
     </mc:Choice>
-    <mc:Fallback xmlns="" xmlns:c="http://schemas.openxmlformats.org/drawingml/2006/chart" xmlns:v="urn:schemas-microsoft-com:vml">
+    <mc:Fallback xmlns:v="urn:schemas-microsoft-com:vml" xmlns:c="http://schemas.openxmlformats.org/drawingml/2006/chart" xmlns="">
       <p:transition spd="med">
         <p:fade/>
       </p:transition>
@@ -7068,6 +7069,96 @@
     <p:extLst>
       <p:ext uri="{BB962C8B-B14F-4D97-AF65-F5344CB8AC3E}">
         <p14:creationId xmlns:p14="http://schemas.microsoft.com/office/powerpoint/2010/main" val="4109518255"/>
+      </p:ext>
+    </p:extLst>
+  </p:cSld>
+  <p:clrMapOvr>
+    <a:masterClrMapping/>
+  </p:clrMapOvr>
+  <p:transition>
+    <p:fade/>
+  </p:transition>
+</p:sld>
+</file>
+
+<file path=ppt/slides/slide3.xml><?xml version="1.0" encoding="utf-8"?>
+<p:sld xmlns:a="http://schemas.openxmlformats.org/drawingml/2006/main" xmlns:r="http://schemas.openxmlformats.org/officeDocument/2006/relationships" xmlns:p="http://schemas.openxmlformats.org/presentationml/2006/main">
+  <p:cSld>
+    <p:spTree>
+      <p:nvGrpSpPr>
+        <p:cNvPr id="1" name=""/>
+        <p:cNvGrpSpPr/>
+        <p:nvPr/>
+      </p:nvGrpSpPr>
+      <p:grpSpPr>
+        <a:xfrm>
+          <a:off x="0" y="0"/>
+          <a:ext cx="0" cy="0"/>
+          <a:chOff x="0" y="0"/>
+          <a:chExt cx="0" cy="0"/>
+        </a:xfrm>
+      </p:grpSpPr>
+      <p:sp>
+        <p:nvSpPr>
+          <p:cNvPr id="11" name="Rectangle 10">
+            <a:extLst>
+              <a:ext uri="{FF2B5EF4-FFF2-40B4-BE49-F238E27FC236}">
+                <a16:creationId xmlns:a16="http://schemas.microsoft.com/office/drawing/2014/main" id="{3E3895B0-D43B-4684-8ABE-17B76961BDE3}"/>
+              </a:ext>
+            </a:extLst>
+          </p:cNvPr>
+          <p:cNvSpPr/>
+          <p:nvPr/>
+        </p:nvSpPr>
+        <p:spPr bwMode="gray">
+          <a:xfrm>
+            <a:off x="831273" y="1136073"/>
+            <a:ext cx="2946400" cy="1136072"/>
+          </a:xfrm>
+          <a:prstGeom prst="rect">
+            <a:avLst/>
+          </a:prstGeom>
+          <a:solidFill>
+            <a:schemeClr val="accent3"/>
+          </a:solidFill>
+          <a:ln w="19050" algn="ctr">
+            <a:noFill/>
+            <a:miter lim="800000"/>
+            <a:headEnd/>
+            <a:tailEnd/>
+          </a:ln>
+        </p:spPr>
+        <p:txBody>
+          <a:bodyPr wrap="square" lIns="88900" tIns="88900" rIns="88900" bIns="88900" rtlCol="0" anchor="ctr"/>
+          <a:lstStyle/>
+          <a:p>
+            <a:pPr algn="ctr">
+              <a:lnSpc>
+                <a:spcPct val="106000"/>
+              </a:lnSpc>
+              <a:buFont typeface="Wingdings 2" pitchFamily="18" charset="2"/>
+              <a:buNone/>
+            </a:pPr>
+            <a:r>
+              <a:rPr lang="en-US" sz="1600" b="1" dirty="0">
+                <a:solidFill>
+                  <a:schemeClr val="bg1"/>
+                </a:solidFill>
+              </a:rPr>
+              <a:t>AutoShape</a:t>
+            </a:r>
+            <a:endParaRPr lang="LID4096" sz="1600" b="1" dirty="0">
+              <a:solidFill>
+                <a:schemeClr val="bg1"/>
+              </a:solidFill>
+            </a:endParaRPr>
+          </a:p>
+        </p:txBody>
+      </p:sp>
+    </p:spTree>
+    <p:extLst>
+      <p:ext uri="{BB962C8B-B14F-4D97-AF65-F5344CB8AC3E}">
+        <p14:creationId xmlns:p14="http://schemas.microsoft.com/office/powerpoint/2010/main" val="2064280800"/>
       </p:ext>
     </p:extLst>
   </p:cSld>

</xml_diff>

<commit_message>
[WIP] SLD-64: Add API to generate PNG-scheme
</commit_message>
<xml_diff>
--- a/src/SlideDotNet.Tests/Resource/025.pptx
+++ b/src/SlideDotNet.Tests/Resource/025.pptx
@@ -2467,6 +2467,463 @@
 </c:chartSpace>
 </file>
 
+<file path=ppt/charts/chart7.xml><?xml version="1.0" encoding="utf-8"?>
+<c:chartSpace xmlns:c="http://schemas.openxmlformats.org/drawingml/2006/chart" xmlns:a="http://schemas.openxmlformats.org/drawingml/2006/main" xmlns:r="http://schemas.openxmlformats.org/officeDocument/2006/relationships" xmlns:c16r2="http://schemas.microsoft.com/office/drawing/2015/06/chart">
+  <c:date1904 val="0"/>
+  <c:lang val="en-US"/>
+  <c:roundedCorners val="0"/>
+  <mc:AlternateContent xmlns:mc="http://schemas.openxmlformats.org/markup-compatibility/2006">
+    <mc:Choice xmlns:c14="http://schemas.microsoft.com/office/drawing/2007/8/2/chart" Requires="c14">
+      <c14:style val="102"/>
+    </mc:Choice>
+    <mc:Fallback>
+      <c:style val="2"/>
+    </mc:Fallback>
+  </mc:AlternateContent>
+  <c:chart>
+    <c:title>
+      <c:overlay val="0"/>
+      <c:spPr>
+        <a:noFill/>
+        <a:ln>
+          <a:noFill/>
+        </a:ln>
+        <a:effectLst/>
+      </c:spPr>
+      <c:txPr>
+        <a:bodyPr rot="0" spcFirstLastPara="1" vertOverflow="ellipsis" vert="horz" wrap="square" anchor="ctr" anchorCtr="1"/>
+        <a:lstStyle/>
+        <a:p>
+          <a:pPr>
+            <a:defRPr sz="1862" b="0" i="0" u="none" strike="noStrike" kern="1200" spc="0" baseline="0">
+              <a:solidFill>
+                <a:schemeClr val="tx1">
+                  <a:lumMod val="65000"/>
+                  <a:lumOff val="35000"/>
+                </a:schemeClr>
+              </a:solidFill>
+              <a:latin typeface="+mn-lt"/>
+              <a:ea typeface="+mn-ea"/>
+              <a:cs typeface="+mn-cs"/>
+            </a:defRPr>
+          </a:pPr>
+          <a:endParaRPr lang="LID4096"/>
+        </a:p>
+      </c:txPr>
+    </c:title>
+    <c:autoTitleDeleted val="0"/>
+    <c:plotArea>
+      <c:layout/>
+      <c:barChart>
+        <c:barDir val="col"/>
+        <c:grouping val="clustered"/>
+        <c:varyColors val="0"/>
+        <c:ser>
+          <c:idx val="0"/>
+          <c:order val="0"/>
+          <c:tx>
+            <c:strRef>
+              <c:f>Sheet1!$B$1</c:f>
+              <c:strCache>
+                <c:ptCount val="1"/>
+                <c:pt idx="0">
+                  <c:v>Series 1</c:v>
+                </c:pt>
+              </c:strCache>
+            </c:strRef>
+          </c:tx>
+          <c:spPr>
+            <a:solidFill>
+              <a:schemeClr val="accent1"/>
+            </a:solidFill>
+            <a:ln>
+              <a:noFill/>
+            </a:ln>
+            <a:effectLst/>
+          </c:spPr>
+          <c:invertIfNegative val="0"/>
+          <c:cat>
+            <c:strRef>
+              <c:f>Sheet1!$A$2:$A$5</c:f>
+              <c:strCache>
+                <c:ptCount val="4"/>
+                <c:pt idx="0">
+                  <c:v>Category 1</c:v>
+                </c:pt>
+                <c:pt idx="1">
+                  <c:v>Category 2</c:v>
+                </c:pt>
+                <c:pt idx="2">
+                  <c:v>Category 3</c:v>
+                </c:pt>
+                <c:pt idx="3">
+                  <c:v>Category 4</c:v>
+                </c:pt>
+              </c:strCache>
+            </c:strRef>
+          </c:cat>
+          <c:val>
+            <c:numRef>
+              <c:f>Sheet1!$B$2:$B$5</c:f>
+              <c:numCache>
+                <c:formatCode>General</c:formatCode>
+                <c:ptCount val="4"/>
+                <c:pt idx="0">
+                  <c:v>4.3</c:v>
+                </c:pt>
+                <c:pt idx="1">
+                  <c:v>2.5</c:v>
+                </c:pt>
+                <c:pt idx="2">
+                  <c:v>3.5</c:v>
+                </c:pt>
+                <c:pt idx="3">
+                  <c:v>4.5</c:v>
+                </c:pt>
+              </c:numCache>
+            </c:numRef>
+          </c:val>
+          <c:extLst>
+            <c:ext xmlns:c16="http://schemas.microsoft.com/office/drawing/2014/chart" uri="{C3380CC4-5D6E-409C-BE32-E72D297353CC}">
+              <c16:uniqueId val="{00000000-182C-476E-B53D-82B7EE5ED5FF}"/>
+            </c:ext>
+          </c:extLst>
+        </c:ser>
+        <c:ser>
+          <c:idx val="1"/>
+          <c:order val="1"/>
+          <c:tx>
+            <c:strRef>
+              <c:f>Sheet1!$C$1</c:f>
+              <c:strCache>
+                <c:ptCount val="1"/>
+                <c:pt idx="0">
+                  <c:v>Series 2</c:v>
+                </c:pt>
+              </c:strCache>
+            </c:strRef>
+          </c:tx>
+          <c:spPr>
+            <a:solidFill>
+              <a:schemeClr val="accent2"/>
+            </a:solidFill>
+            <a:ln>
+              <a:noFill/>
+            </a:ln>
+            <a:effectLst/>
+          </c:spPr>
+          <c:invertIfNegative val="0"/>
+          <c:cat>
+            <c:strRef>
+              <c:f>Sheet1!$A$2:$A$5</c:f>
+              <c:strCache>
+                <c:ptCount val="4"/>
+                <c:pt idx="0">
+                  <c:v>Category 1</c:v>
+                </c:pt>
+                <c:pt idx="1">
+                  <c:v>Category 2</c:v>
+                </c:pt>
+                <c:pt idx="2">
+                  <c:v>Category 3</c:v>
+                </c:pt>
+                <c:pt idx="3">
+                  <c:v>Category 4</c:v>
+                </c:pt>
+              </c:strCache>
+            </c:strRef>
+          </c:cat>
+          <c:val>
+            <c:numRef>
+              <c:f>Sheet1!$C$2:$C$5</c:f>
+              <c:numCache>
+                <c:formatCode>General</c:formatCode>
+                <c:ptCount val="4"/>
+                <c:pt idx="0">
+                  <c:v>2.4</c:v>
+                </c:pt>
+                <c:pt idx="1">
+                  <c:v>4.4000000000000004</c:v>
+                </c:pt>
+                <c:pt idx="2">
+                  <c:v>1.8</c:v>
+                </c:pt>
+                <c:pt idx="3">
+                  <c:v>2.8</c:v>
+                </c:pt>
+              </c:numCache>
+            </c:numRef>
+          </c:val>
+          <c:extLst>
+            <c:ext xmlns:c16="http://schemas.microsoft.com/office/drawing/2014/chart" uri="{C3380CC4-5D6E-409C-BE32-E72D297353CC}">
+              <c16:uniqueId val="{00000001-182C-476E-B53D-82B7EE5ED5FF}"/>
+            </c:ext>
+          </c:extLst>
+        </c:ser>
+        <c:ser>
+          <c:idx val="2"/>
+          <c:order val="2"/>
+          <c:tx>
+            <c:strRef>
+              <c:f>Sheet1!$D$1</c:f>
+              <c:strCache>
+                <c:ptCount val="1"/>
+                <c:pt idx="0">
+                  <c:v>Series 3</c:v>
+                </c:pt>
+              </c:strCache>
+            </c:strRef>
+          </c:tx>
+          <c:spPr>
+            <a:solidFill>
+              <a:schemeClr val="accent3"/>
+            </a:solidFill>
+            <a:ln>
+              <a:noFill/>
+            </a:ln>
+            <a:effectLst/>
+          </c:spPr>
+          <c:invertIfNegative val="0"/>
+          <c:cat>
+            <c:strRef>
+              <c:f>Sheet1!$A$2:$A$5</c:f>
+              <c:strCache>
+                <c:ptCount val="4"/>
+                <c:pt idx="0">
+                  <c:v>Category 1</c:v>
+                </c:pt>
+                <c:pt idx="1">
+                  <c:v>Category 2</c:v>
+                </c:pt>
+                <c:pt idx="2">
+                  <c:v>Category 3</c:v>
+                </c:pt>
+                <c:pt idx="3">
+                  <c:v>Category 4</c:v>
+                </c:pt>
+              </c:strCache>
+            </c:strRef>
+          </c:cat>
+          <c:val>
+            <c:numRef>
+              <c:f>Sheet1!$D$2:$D$5</c:f>
+              <c:numCache>
+                <c:formatCode>General</c:formatCode>
+                <c:ptCount val="4"/>
+                <c:pt idx="0">
+                  <c:v>2</c:v>
+                </c:pt>
+                <c:pt idx="1">
+                  <c:v>2</c:v>
+                </c:pt>
+                <c:pt idx="2">
+                  <c:v>3</c:v>
+                </c:pt>
+                <c:pt idx="3">
+                  <c:v>5</c:v>
+                </c:pt>
+              </c:numCache>
+            </c:numRef>
+          </c:val>
+          <c:extLst>
+            <c:ext xmlns:c16="http://schemas.microsoft.com/office/drawing/2014/chart" uri="{C3380CC4-5D6E-409C-BE32-E72D297353CC}">
+              <c16:uniqueId val="{00000002-182C-476E-B53D-82B7EE5ED5FF}"/>
+            </c:ext>
+          </c:extLst>
+        </c:ser>
+        <c:dLbls>
+          <c:showLegendKey val="0"/>
+          <c:showVal val="0"/>
+          <c:showCatName val="0"/>
+          <c:showSerName val="0"/>
+          <c:showPercent val="0"/>
+          <c:showBubbleSize val="0"/>
+        </c:dLbls>
+        <c:gapWidth val="219"/>
+        <c:overlap val="-27"/>
+        <c:axId val="898842399"/>
+        <c:axId val="653069919"/>
+      </c:barChart>
+      <c:catAx>
+        <c:axId val="898842399"/>
+        <c:scaling>
+          <c:orientation val="minMax"/>
+        </c:scaling>
+        <c:delete val="0"/>
+        <c:axPos val="b"/>
+        <c:numFmt formatCode="General" sourceLinked="1"/>
+        <c:majorTickMark val="none"/>
+        <c:minorTickMark val="none"/>
+        <c:tickLblPos val="nextTo"/>
+        <c:spPr>
+          <a:noFill/>
+          <a:ln w="9525" cap="flat" cmpd="sng" algn="ctr">
+            <a:solidFill>
+              <a:schemeClr val="tx1">
+                <a:lumMod val="15000"/>
+                <a:lumOff val="85000"/>
+              </a:schemeClr>
+            </a:solidFill>
+            <a:round/>
+          </a:ln>
+          <a:effectLst/>
+        </c:spPr>
+        <c:txPr>
+          <a:bodyPr rot="-60000000" spcFirstLastPara="1" vertOverflow="ellipsis" vert="horz" wrap="square" anchor="ctr" anchorCtr="1"/>
+          <a:lstStyle/>
+          <a:p>
+            <a:pPr>
+              <a:defRPr sz="1197" b="0" i="0" u="none" strike="noStrike" kern="1200" baseline="0">
+                <a:solidFill>
+                  <a:schemeClr val="tx1">
+                    <a:lumMod val="65000"/>
+                    <a:lumOff val="35000"/>
+                  </a:schemeClr>
+                </a:solidFill>
+                <a:latin typeface="+mn-lt"/>
+                <a:ea typeface="+mn-ea"/>
+                <a:cs typeface="+mn-cs"/>
+              </a:defRPr>
+            </a:pPr>
+            <a:endParaRPr lang="LID4096"/>
+          </a:p>
+        </c:txPr>
+        <c:crossAx val="653069919"/>
+        <c:crosses val="autoZero"/>
+        <c:auto val="1"/>
+        <c:lblAlgn val="ctr"/>
+        <c:lblOffset val="100"/>
+        <c:noMultiLvlLbl val="0"/>
+      </c:catAx>
+      <c:valAx>
+        <c:axId val="653069919"/>
+        <c:scaling>
+          <c:orientation val="minMax"/>
+        </c:scaling>
+        <c:delete val="0"/>
+        <c:axPos val="l"/>
+        <c:majorGridlines>
+          <c:spPr>
+            <a:ln w="9525" cap="flat" cmpd="sng" algn="ctr">
+              <a:solidFill>
+                <a:schemeClr val="tx1">
+                  <a:lumMod val="15000"/>
+                  <a:lumOff val="85000"/>
+                </a:schemeClr>
+              </a:solidFill>
+              <a:round/>
+            </a:ln>
+            <a:effectLst/>
+          </c:spPr>
+        </c:majorGridlines>
+        <c:numFmt formatCode="General" sourceLinked="1"/>
+        <c:majorTickMark val="none"/>
+        <c:minorTickMark val="none"/>
+        <c:tickLblPos val="nextTo"/>
+        <c:spPr>
+          <a:noFill/>
+          <a:ln>
+            <a:noFill/>
+          </a:ln>
+          <a:effectLst/>
+        </c:spPr>
+        <c:txPr>
+          <a:bodyPr rot="-60000000" spcFirstLastPara="1" vertOverflow="ellipsis" vert="horz" wrap="square" anchor="ctr" anchorCtr="1"/>
+          <a:lstStyle/>
+          <a:p>
+            <a:pPr>
+              <a:defRPr sz="1197" b="0" i="0" u="none" strike="noStrike" kern="1200" baseline="0">
+                <a:solidFill>
+                  <a:schemeClr val="tx1">
+                    <a:lumMod val="65000"/>
+                    <a:lumOff val="35000"/>
+                  </a:schemeClr>
+                </a:solidFill>
+                <a:latin typeface="+mn-lt"/>
+                <a:ea typeface="+mn-ea"/>
+                <a:cs typeface="+mn-cs"/>
+              </a:defRPr>
+            </a:pPr>
+            <a:endParaRPr lang="LID4096"/>
+          </a:p>
+        </c:txPr>
+        <c:crossAx val="898842399"/>
+        <c:crosses val="autoZero"/>
+        <c:crossBetween val="between"/>
+      </c:valAx>
+      <c:spPr>
+        <a:noFill/>
+        <a:ln>
+          <a:noFill/>
+        </a:ln>
+        <a:effectLst/>
+      </c:spPr>
+    </c:plotArea>
+    <c:legend>
+      <c:legendPos val="b"/>
+      <c:overlay val="0"/>
+      <c:spPr>
+        <a:noFill/>
+        <a:ln>
+          <a:noFill/>
+        </a:ln>
+        <a:effectLst/>
+      </c:spPr>
+      <c:txPr>
+        <a:bodyPr rot="0" spcFirstLastPara="1" vertOverflow="ellipsis" vert="horz" wrap="square" anchor="ctr" anchorCtr="1"/>
+        <a:lstStyle/>
+        <a:p>
+          <a:pPr>
+            <a:defRPr sz="1197" b="0" i="0" u="none" strike="noStrike" kern="1200" baseline="0">
+              <a:solidFill>
+                <a:schemeClr val="tx1">
+                  <a:lumMod val="65000"/>
+                  <a:lumOff val="35000"/>
+                </a:schemeClr>
+              </a:solidFill>
+              <a:latin typeface="+mn-lt"/>
+              <a:ea typeface="+mn-ea"/>
+              <a:cs typeface="+mn-cs"/>
+            </a:defRPr>
+          </a:pPr>
+          <a:endParaRPr lang="LID4096"/>
+        </a:p>
+      </c:txPr>
+    </c:legend>
+    <c:plotVisOnly val="1"/>
+    <c:dispBlanksAs val="gap"/>
+    <c:extLst>
+      <c:ext xmlns:c16r3="http://schemas.microsoft.com/office/drawing/2017/03/chart" uri="{56B9EC1D-385E-4148-901F-78D8002777C0}">
+        <c16r3:dataDisplayOptions16>
+          <c16r3:dispNaAsBlank val="1"/>
+        </c16r3:dataDisplayOptions16>
+      </c:ext>
+    </c:extLst>
+    <c:showDLblsOverMax val="0"/>
+  </c:chart>
+  <c:spPr>
+    <a:noFill/>
+    <a:ln>
+      <a:noFill/>
+    </a:ln>
+    <a:effectLst/>
+  </c:spPr>
+  <c:txPr>
+    <a:bodyPr/>
+    <a:lstStyle/>
+    <a:p>
+      <a:pPr>
+        <a:defRPr/>
+      </a:pPr>
+      <a:endParaRPr lang="LID4096"/>
+    </a:p>
+  </c:txPr>
+  <c:externalData r:id="rId3">
+    <c:autoUpdate val="0"/>
+  </c:externalData>
+</c:chartSpace>
+</file>
+
 <file path=ppt/charts/colors1.xml><?xml version="1.0" encoding="utf-8"?>
 <cs:colorStyle xmlns:cs="http://schemas.microsoft.com/office/drawing/2012/chartStyle" xmlns:a="http://schemas.openxmlformats.org/drawingml/2006/main" meth="cycle" id="10">
   <a:schemeClr val="accent1"/>
@@ -2667,6 +3124,46 @@
 </cs:colorStyle>
 </file>
 
+<file path=ppt/charts/colors6.xml><?xml version="1.0" encoding="utf-8"?>
+<cs:colorStyle xmlns:cs="http://schemas.microsoft.com/office/drawing/2012/chartStyle" xmlns:a="http://schemas.openxmlformats.org/drawingml/2006/main" meth="cycle" id="10">
+  <a:schemeClr val="accent1"/>
+  <a:schemeClr val="accent2"/>
+  <a:schemeClr val="accent3"/>
+  <a:schemeClr val="accent4"/>
+  <a:schemeClr val="accent5"/>
+  <a:schemeClr val="accent6"/>
+  <cs:variation/>
+  <cs:variation>
+    <a:lumMod val="60000"/>
+  </cs:variation>
+  <cs:variation>
+    <a:lumMod val="80000"/>
+    <a:lumOff val="20000"/>
+  </cs:variation>
+  <cs:variation>
+    <a:lumMod val="80000"/>
+  </cs:variation>
+  <cs:variation>
+    <a:lumMod val="60000"/>
+    <a:lumOff val="40000"/>
+  </cs:variation>
+  <cs:variation>
+    <a:lumMod val="50000"/>
+  </cs:variation>
+  <cs:variation>
+    <a:lumMod val="70000"/>
+    <a:lumOff val="30000"/>
+  </cs:variation>
+  <cs:variation>
+    <a:lumMod val="70000"/>
+  </cs:variation>
+  <cs:variation>
+    <a:lumMod val="50000"/>
+    <a:lumOff val="50000"/>
+  </cs:variation>
+</cs:colorStyle>
+</file>
+
 <file path=ppt/charts/style1.xml><?xml version="1.0" encoding="utf-8"?>
 <cs:chartStyle xmlns:cs="http://schemas.microsoft.com/office/drawing/2012/chartStyle" xmlns:a="http://schemas.openxmlformats.org/drawingml/2006/main" id="216">
   <cs:axisTitle>
@@ -5105,6 +5602,509 @@
       </a:schemeClr>
     </cs:fontRef>
     <cs:defRPr sz="900" kern="1200"/>
+  </cs:valueAxis>
+  <cs:wall>
+    <cs:lnRef idx="0"/>
+    <cs:fillRef idx="0"/>
+    <cs:effectRef idx="0"/>
+    <cs:fontRef idx="minor">
+      <a:schemeClr val="tx1"/>
+    </cs:fontRef>
+    <cs:spPr>
+      <a:noFill/>
+      <a:ln>
+        <a:noFill/>
+      </a:ln>
+    </cs:spPr>
+  </cs:wall>
+</cs:chartStyle>
+</file>
+
+<file path=ppt/charts/style6.xml><?xml version="1.0" encoding="utf-8"?>
+<cs:chartStyle xmlns:cs="http://schemas.microsoft.com/office/drawing/2012/chartStyle" xmlns:a="http://schemas.openxmlformats.org/drawingml/2006/main" id="201">
+  <cs:axisTitle>
+    <cs:lnRef idx="0"/>
+    <cs:fillRef idx="0"/>
+    <cs:effectRef idx="0"/>
+    <cs:fontRef idx="minor">
+      <a:schemeClr val="tx1">
+        <a:lumMod val="65000"/>
+        <a:lumOff val="35000"/>
+      </a:schemeClr>
+    </cs:fontRef>
+    <cs:defRPr sz="1330" kern="1200"/>
+  </cs:axisTitle>
+  <cs:categoryAxis>
+    <cs:lnRef idx="0"/>
+    <cs:fillRef idx="0"/>
+    <cs:effectRef idx="0"/>
+    <cs:fontRef idx="minor">
+      <a:schemeClr val="tx1">
+        <a:lumMod val="65000"/>
+        <a:lumOff val="35000"/>
+      </a:schemeClr>
+    </cs:fontRef>
+    <cs:spPr>
+      <a:ln w="9525" cap="flat" cmpd="sng" algn="ctr">
+        <a:solidFill>
+          <a:schemeClr val="tx1">
+            <a:lumMod val="15000"/>
+            <a:lumOff val="85000"/>
+          </a:schemeClr>
+        </a:solidFill>
+        <a:round/>
+      </a:ln>
+    </cs:spPr>
+    <cs:defRPr sz="1197" kern="1200"/>
+  </cs:categoryAxis>
+  <cs:chartArea mods="allowNoFillOverride allowNoLineOverride">
+    <cs:lnRef idx="0"/>
+    <cs:fillRef idx="0"/>
+    <cs:effectRef idx="0"/>
+    <cs:fontRef idx="minor">
+      <a:schemeClr val="tx1"/>
+    </cs:fontRef>
+    <cs:spPr>
+      <a:solidFill>
+        <a:schemeClr val="bg1"/>
+      </a:solidFill>
+      <a:ln w="9525" cap="flat" cmpd="sng" algn="ctr">
+        <a:solidFill>
+          <a:schemeClr val="tx1">
+            <a:lumMod val="15000"/>
+            <a:lumOff val="85000"/>
+          </a:schemeClr>
+        </a:solidFill>
+        <a:round/>
+      </a:ln>
+    </cs:spPr>
+    <cs:defRPr sz="1330" kern="1200"/>
+  </cs:chartArea>
+  <cs:dataLabel>
+    <cs:lnRef idx="0"/>
+    <cs:fillRef idx="0"/>
+    <cs:effectRef idx="0"/>
+    <cs:fontRef idx="minor">
+      <a:schemeClr val="tx1">
+        <a:lumMod val="75000"/>
+        <a:lumOff val="25000"/>
+      </a:schemeClr>
+    </cs:fontRef>
+    <cs:defRPr sz="1197" kern="1200"/>
+  </cs:dataLabel>
+  <cs:dataLabelCallout>
+    <cs:lnRef idx="0"/>
+    <cs:fillRef idx="0"/>
+    <cs:effectRef idx="0"/>
+    <cs:fontRef idx="minor">
+      <a:schemeClr val="dk1">
+        <a:lumMod val="65000"/>
+        <a:lumOff val="35000"/>
+      </a:schemeClr>
+    </cs:fontRef>
+    <cs:spPr>
+      <a:solidFill>
+        <a:schemeClr val="lt1"/>
+      </a:solidFill>
+      <a:ln>
+        <a:solidFill>
+          <a:schemeClr val="dk1">
+            <a:lumMod val="25000"/>
+            <a:lumOff val="75000"/>
+          </a:schemeClr>
+        </a:solidFill>
+      </a:ln>
+    </cs:spPr>
+    <cs:defRPr sz="1197" kern="1200"/>
+    <cs:bodyPr rot="0" spcFirstLastPara="1" vertOverflow="clip" horzOverflow="clip" vert="horz" wrap="square" lIns="36576" tIns="18288" rIns="36576" bIns="18288" anchor="ctr" anchorCtr="1">
+      <a:spAutoFit/>
+    </cs:bodyPr>
+  </cs:dataLabelCallout>
+  <cs:dataPoint>
+    <cs:lnRef idx="0"/>
+    <cs:fillRef idx="1">
+      <cs:styleClr val="auto"/>
+    </cs:fillRef>
+    <cs:effectRef idx="0"/>
+    <cs:fontRef idx="minor">
+      <a:schemeClr val="tx1"/>
+    </cs:fontRef>
+  </cs:dataPoint>
+  <cs:dataPoint3D>
+    <cs:lnRef idx="0"/>
+    <cs:fillRef idx="1">
+      <cs:styleClr val="auto"/>
+    </cs:fillRef>
+    <cs:effectRef idx="0"/>
+    <cs:fontRef idx="minor">
+      <a:schemeClr val="tx1"/>
+    </cs:fontRef>
+  </cs:dataPoint3D>
+  <cs:dataPointLine>
+    <cs:lnRef idx="0">
+      <cs:styleClr val="auto"/>
+    </cs:lnRef>
+    <cs:fillRef idx="1"/>
+    <cs:effectRef idx="0"/>
+    <cs:fontRef idx="minor">
+      <a:schemeClr val="tx1"/>
+    </cs:fontRef>
+    <cs:spPr>
+      <a:ln w="28575" cap="rnd">
+        <a:solidFill>
+          <a:schemeClr val="phClr"/>
+        </a:solidFill>
+        <a:round/>
+      </a:ln>
+    </cs:spPr>
+  </cs:dataPointLine>
+  <cs:dataPointMarker>
+    <cs:lnRef idx="0">
+      <cs:styleClr val="auto"/>
+    </cs:lnRef>
+    <cs:fillRef idx="1">
+      <cs:styleClr val="auto"/>
+    </cs:fillRef>
+    <cs:effectRef idx="0"/>
+    <cs:fontRef idx="minor">
+      <a:schemeClr val="tx1"/>
+    </cs:fontRef>
+    <cs:spPr>
+      <a:ln w="9525">
+        <a:solidFill>
+          <a:schemeClr val="phClr"/>
+        </a:solidFill>
+      </a:ln>
+    </cs:spPr>
+  </cs:dataPointMarker>
+  <cs:dataPointMarkerLayout symbol="circle" size="5"/>
+  <cs:dataPointWireframe>
+    <cs:lnRef idx="0">
+      <cs:styleClr val="auto"/>
+    </cs:lnRef>
+    <cs:fillRef idx="1"/>
+    <cs:effectRef idx="0"/>
+    <cs:fontRef idx="minor">
+      <a:schemeClr val="tx1"/>
+    </cs:fontRef>
+    <cs:spPr>
+      <a:ln w="9525" cap="rnd">
+        <a:solidFill>
+          <a:schemeClr val="phClr"/>
+        </a:solidFill>
+        <a:round/>
+      </a:ln>
+    </cs:spPr>
+  </cs:dataPointWireframe>
+  <cs:dataTable>
+    <cs:lnRef idx="0"/>
+    <cs:fillRef idx="0"/>
+    <cs:effectRef idx="0"/>
+    <cs:fontRef idx="minor">
+      <a:schemeClr val="tx1">
+        <a:lumMod val="65000"/>
+        <a:lumOff val="35000"/>
+      </a:schemeClr>
+    </cs:fontRef>
+    <cs:spPr>
+      <a:noFill/>
+      <a:ln w="9525" cap="flat" cmpd="sng" algn="ctr">
+        <a:solidFill>
+          <a:schemeClr val="tx1">
+            <a:lumMod val="15000"/>
+            <a:lumOff val="85000"/>
+          </a:schemeClr>
+        </a:solidFill>
+        <a:round/>
+      </a:ln>
+    </cs:spPr>
+    <cs:defRPr sz="1197" kern="1200"/>
+  </cs:dataTable>
+  <cs:downBar>
+    <cs:lnRef idx="0"/>
+    <cs:fillRef idx="0"/>
+    <cs:effectRef idx="0"/>
+    <cs:fontRef idx="minor">
+      <a:schemeClr val="dk1"/>
+    </cs:fontRef>
+    <cs:spPr>
+      <a:solidFill>
+        <a:schemeClr val="dk1">
+          <a:lumMod val="65000"/>
+          <a:lumOff val="35000"/>
+        </a:schemeClr>
+      </a:solidFill>
+      <a:ln w="9525">
+        <a:solidFill>
+          <a:schemeClr val="tx1">
+            <a:lumMod val="65000"/>
+            <a:lumOff val="35000"/>
+          </a:schemeClr>
+        </a:solidFill>
+      </a:ln>
+    </cs:spPr>
+  </cs:downBar>
+  <cs:dropLine>
+    <cs:lnRef idx="0"/>
+    <cs:fillRef idx="0"/>
+    <cs:effectRef idx="0"/>
+    <cs:fontRef idx="minor">
+      <a:schemeClr val="tx1"/>
+    </cs:fontRef>
+    <cs:spPr>
+      <a:ln w="9525" cap="flat" cmpd="sng" algn="ctr">
+        <a:solidFill>
+          <a:schemeClr val="tx1">
+            <a:lumMod val="35000"/>
+            <a:lumOff val="65000"/>
+          </a:schemeClr>
+        </a:solidFill>
+        <a:round/>
+      </a:ln>
+    </cs:spPr>
+  </cs:dropLine>
+  <cs:errorBar>
+    <cs:lnRef idx="0"/>
+    <cs:fillRef idx="0"/>
+    <cs:effectRef idx="0"/>
+    <cs:fontRef idx="minor">
+      <a:schemeClr val="tx1"/>
+    </cs:fontRef>
+    <cs:spPr>
+      <a:ln w="9525" cap="flat" cmpd="sng" algn="ctr">
+        <a:solidFill>
+          <a:schemeClr val="tx1">
+            <a:lumMod val="65000"/>
+            <a:lumOff val="35000"/>
+          </a:schemeClr>
+        </a:solidFill>
+        <a:round/>
+      </a:ln>
+    </cs:spPr>
+  </cs:errorBar>
+  <cs:floor>
+    <cs:lnRef idx="0"/>
+    <cs:fillRef idx="0"/>
+    <cs:effectRef idx="0"/>
+    <cs:fontRef idx="minor">
+      <a:schemeClr val="tx1"/>
+    </cs:fontRef>
+    <cs:spPr>
+      <a:noFill/>
+      <a:ln>
+        <a:noFill/>
+      </a:ln>
+    </cs:spPr>
+  </cs:floor>
+  <cs:gridlineMajor>
+    <cs:lnRef idx="0"/>
+    <cs:fillRef idx="0"/>
+    <cs:effectRef idx="0"/>
+    <cs:fontRef idx="minor">
+      <a:schemeClr val="tx1"/>
+    </cs:fontRef>
+    <cs:spPr>
+      <a:ln w="9525" cap="flat" cmpd="sng" algn="ctr">
+        <a:solidFill>
+          <a:schemeClr val="tx1">
+            <a:lumMod val="15000"/>
+            <a:lumOff val="85000"/>
+          </a:schemeClr>
+        </a:solidFill>
+        <a:round/>
+      </a:ln>
+    </cs:spPr>
+  </cs:gridlineMajor>
+  <cs:gridlineMinor>
+    <cs:lnRef idx="0"/>
+    <cs:fillRef idx="0"/>
+    <cs:effectRef idx="0"/>
+    <cs:fontRef idx="minor">
+      <a:schemeClr val="tx1"/>
+    </cs:fontRef>
+    <cs:spPr>
+      <a:ln w="9525" cap="flat" cmpd="sng" algn="ctr">
+        <a:solidFill>
+          <a:schemeClr val="tx1">
+            <a:lumMod val="5000"/>
+            <a:lumOff val="95000"/>
+          </a:schemeClr>
+        </a:solidFill>
+        <a:round/>
+      </a:ln>
+    </cs:spPr>
+  </cs:gridlineMinor>
+  <cs:hiLoLine>
+    <cs:lnRef idx="0"/>
+    <cs:fillRef idx="0"/>
+    <cs:effectRef idx="0"/>
+    <cs:fontRef idx="minor">
+      <a:schemeClr val="tx1"/>
+    </cs:fontRef>
+    <cs:spPr>
+      <a:ln w="9525" cap="flat" cmpd="sng" algn="ctr">
+        <a:solidFill>
+          <a:schemeClr val="tx1">
+            <a:lumMod val="75000"/>
+            <a:lumOff val="25000"/>
+          </a:schemeClr>
+        </a:solidFill>
+        <a:round/>
+      </a:ln>
+    </cs:spPr>
+  </cs:hiLoLine>
+  <cs:leaderLine>
+    <cs:lnRef idx="0"/>
+    <cs:fillRef idx="0"/>
+    <cs:effectRef idx="0"/>
+    <cs:fontRef idx="minor">
+      <a:schemeClr val="tx1"/>
+    </cs:fontRef>
+    <cs:spPr>
+      <a:ln w="9525" cap="flat" cmpd="sng" algn="ctr">
+        <a:solidFill>
+          <a:schemeClr val="tx1">
+            <a:lumMod val="35000"/>
+            <a:lumOff val="65000"/>
+          </a:schemeClr>
+        </a:solidFill>
+        <a:round/>
+      </a:ln>
+    </cs:spPr>
+  </cs:leaderLine>
+  <cs:legend>
+    <cs:lnRef idx="0"/>
+    <cs:fillRef idx="0"/>
+    <cs:effectRef idx="0"/>
+    <cs:fontRef idx="minor">
+      <a:schemeClr val="tx1">
+        <a:lumMod val="65000"/>
+        <a:lumOff val="35000"/>
+      </a:schemeClr>
+    </cs:fontRef>
+    <cs:defRPr sz="1197" kern="1200"/>
+  </cs:legend>
+  <cs:plotArea mods="allowNoFillOverride allowNoLineOverride">
+    <cs:lnRef idx="0"/>
+    <cs:fillRef idx="0"/>
+    <cs:effectRef idx="0"/>
+    <cs:fontRef idx="minor">
+      <a:schemeClr val="tx1"/>
+    </cs:fontRef>
+  </cs:plotArea>
+  <cs:plotArea3D mods="allowNoFillOverride allowNoLineOverride">
+    <cs:lnRef idx="0"/>
+    <cs:fillRef idx="0"/>
+    <cs:effectRef idx="0"/>
+    <cs:fontRef idx="minor">
+      <a:schemeClr val="tx1"/>
+    </cs:fontRef>
+  </cs:plotArea3D>
+  <cs:seriesAxis>
+    <cs:lnRef idx="0"/>
+    <cs:fillRef idx="0"/>
+    <cs:effectRef idx="0"/>
+    <cs:fontRef idx="minor">
+      <a:schemeClr val="tx1">
+        <a:lumMod val="65000"/>
+        <a:lumOff val="35000"/>
+      </a:schemeClr>
+    </cs:fontRef>
+    <cs:defRPr sz="1197" kern="1200"/>
+  </cs:seriesAxis>
+  <cs:seriesLine>
+    <cs:lnRef idx="0"/>
+    <cs:fillRef idx="0"/>
+    <cs:effectRef idx="0"/>
+    <cs:fontRef idx="minor">
+      <a:schemeClr val="tx1"/>
+    </cs:fontRef>
+    <cs:spPr>
+      <a:ln w="9525" cap="flat" cmpd="sng" algn="ctr">
+        <a:solidFill>
+          <a:schemeClr val="tx1">
+            <a:lumMod val="35000"/>
+            <a:lumOff val="65000"/>
+          </a:schemeClr>
+        </a:solidFill>
+        <a:round/>
+      </a:ln>
+    </cs:spPr>
+  </cs:seriesLine>
+  <cs:title>
+    <cs:lnRef idx="0"/>
+    <cs:fillRef idx="0"/>
+    <cs:effectRef idx="0"/>
+    <cs:fontRef idx="minor">
+      <a:schemeClr val="tx1">
+        <a:lumMod val="65000"/>
+        <a:lumOff val="35000"/>
+      </a:schemeClr>
+    </cs:fontRef>
+    <cs:defRPr sz="1862" b="0" kern="1200" spc="0" baseline="0"/>
+  </cs:title>
+  <cs:trendline>
+    <cs:lnRef idx="0">
+      <cs:styleClr val="auto"/>
+    </cs:lnRef>
+    <cs:fillRef idx="0"/>
+    <cs:effectRef idx="0"/>
+    <cs:fontRef idx="minor">
+      <a:schemeClr val="tx1"/>
+    </cs:fontRef>
+    <cs:spPr>
+      <a:ln w="19050" cap="rnd">
+        <a:solidFill>
+          <a:schemeClr val="phClr"/>
+        </a:solidFill>
+        <a:prstDash val="sysDot"/>
+      </a:ln>
+    </cs:spPr>
+  </cs:trendline>
+  <cs:trendlineLabel>
+    <cs:lnRef idx="0"/>
+    <cs:fillRef idx="0"/>
+    <cs:effectRef idx="0"/>
+    <cs:fontRef idx="minor">
+      <a:schemeClr val="tx1">
+        <a:lumMod val="65000"/>
+        <a:lumOff val="35000"/>
+      </a:schemeClr>
+    </cs:fontRef>
+    <cs:defRPr sz="1197" kern="1200"/>
+  </cs:trendlineLabel>
+  <cs:upBar>
+    <cs:lnRef idx="0"/>
+    <cs:fillRef idx="0"/>
+    <cs:effectRef idx="0"/>
+    <cs:fontRef idx="minor">
+      <a:schemeClr val="dk1"/>
+    </cs:fontRef>
+    <cs:spPr>
+      <a:solidFill>
+        <a:schemeClr val="lt1"/>
+      </a:solidFill>
+      <a:ln w="9525">
+        <a:solidFill>
+          <a:schemeClr val="tx1">
+            <a:lumMod val="15000"/>
+            <a:lumOff val="85000"/>
+          </a:schemeClr>
+        </a:solidFill>
+      </a:ln>
+    </cs:spPr>
+  </cs:upBar>
+  <cs:valueAxis>
+    <cs:lnRef idx="0"/>
+    <cs:fillRef idx="0"/>
+    <cs:effectRef idx="0"/>
+    <cs:fontRef idx="minor">
+      <a:schemeClr val="tx1">
+        <a:lumMod val="65000"/>
+        <a:lumOff val="35000"/>
+      </a:schemeClr>
+    </cs:fontRef>
+    <cs:defRPr sz="1197" kern="1200"/>
   </cs:valueAxis>
   <cs:wall>
     <cs:lnRef idx="0"/>
@@ -5209,7 +6209,7 @@
               <a:rPr lang="en-US" smtClean="0">
                 <a:latin typeface="Arial" panose="020B0604020202020204" pitchFamily="34" charset="0"/>
               </a:rPr>
-              <a:t>5/17/2020</a:t>
+              <a:t>5/24/2020</a:t>
             </a:fld>
             <a:endParaRPr lang="en-US" dirty="0">
               <a:latin typeface="Arial" panose="020B0604020202020204" pitchFamily="34" charset="0"/>
@@ -5388,7 +6388,7 @@
             <a:fld id="{0BA5BBE4-AEA3-489A-A28E-0C2FAF2506E3}" type="datetimeFigureOut">
               <a:rPr lang="en-US" smtClean="0"/>
               <a:pPr/>
-              <a:t>5/17/2020</a:t>
+              <a:t>5/24/2020</a:t>
             </a:fld>
             <a:endParaRPr lang="en-US" dirty="0"/>
           </a:p>
@@ -6124,7 +7124,7 @@
           <a:graphicData uri="http://schemas.openxmlformats.org/presentationml/2006/ole">
             <mc:AlternateContent xmlns:mc="http://schemas.openxmlformats.org/markup-compatibility/2006">
               <mc:Choice xmlns:v="urn:schemas-microsoft-com:vml" Requires="v">
-                <p:oleObj spid="_x0000_s2362" name="think-cell Slide" r:id="rId5" imgW="270" imgH="270" progId="TCLayout.ActiveDocument.1">
+                <p:oleObj spid="_x0000_s2364" name="think-cell Slide" r:id="rId5" imgW="270" imgH="270" progId="TCLayout.ActiveDocument.1">
                   <p:embed/>
                 </p:oleObj>
               </mc:Choice>
@@ -6197,108 +7197,6 @@
       </p:sp>
       <p:sp>
         <p:nvSpPr>
-          <p:cNvPr id="15" name="TextBox 14"/>
-          <p:cNvSpPr txBox="1"/>
-          <p:nvPr userDrawn="1"/>
-        </p:nvSpPr>
-        <p:spPr>
-          <a:xfrm>
-            <a:off x="5441859" y="7139694"/>
-            <a:ext cx="4294054" cy="216726"/>
-          </a:xfrm>
-          <a:prstGeom prst="rect">
-            <a:avLst/>
-          </a:prstGeom>
-          <a:noFill/>
-        </p:spPr>
-        <p:txBody>
-          <a:bodyPr wrap="square" lIns="0" tIns="0" rIns="0" bIns="0" rtlCol="0">
-            <a:noAutofit/>
-          </a:bodyPr>
-          <a:lstStyle/>
-          <a:p>
-            <a:pPr marL="0" indent="0" algn="r">
-              <a:spcBef>
-                <a:spcPts val="0"/>
-              </a:spcBef>
-              <a:buSzPct val="100000"/>
-              <a:buFont typeface="Arial"/>
-              <a:buNone/>
-            </a:pPr>
-            <a:r>
-              <a:rPr lang="en-US" sz="704" noProof="0" dirty="0">
-                <a:solidFill>
-                  <a:schemeClr val="tx1"/>
-                </a:solidFill>
-              </a:rPr>
-              <a:t>Presentation title</a:t>
-            </a:r>
-            <a:br>
-              <a:rPr lang="en-US" sz="704" noProof="0" dirty="0">
-                <a:solidFill>
-                  <a:schemeClr val="tx1"/>
-                </a:solidFill>
-              </a:rPr>
-            </a:br>
-            <a:r>
-              <a:rPr lang="en-US" sz="704" noProof="0" dirty="0">
-                <a:solidFill>
-                  <a:schemeClr val="tx1"/>
-                </a:solidFill>
-              </a:rPr>
-              <a:t>[To edit, click View &gt; Slide Master &gt; Slide Master]</a:t>
-            </a:r>
-          </a:p>
-        </p:txBody>
-      </p:sp>
-      <p:sp>
-        <p:nvSpPr>
-          <p:cNvPr id="18" name="TextBox 17"/>
-          <p:cNvSpPr txBox="1"/>
-          <p:nvPr userDrawn="1"/>
-        </p:nvSpPr>
-        <p:spPr>
-          <a:xfrm>
-            <a:off x="433388" y="7139694"/>
-            <a:ext cx="4696232" cy="216726"/>
-          </a:xfrm>
-          <a:prstGeom prst="rect">
-            <a:avLst/>
-          </a:prstGeom>
-          <a:noFill/>
-        </p:spPr>
-        <p:txBody>
-          <a:bodyPr wrap="square" lIns="0" tIns="0" rIns="0" bIns="0" rtlCol="0">
-            <a:noAutofit/>
-          </a:bodyPr>
-          <a:lstStyle/>
-          <a:p>
-            <a:pPr marL="0" indent="0">
-              <a:spcBef>
-                <a:spcPts val="650"/>
-              </a:spcBef>
-              <a:buSzPct val="100000"/>
-              <a:buFont typeface="Arial"/>
-              <a:buNone/>
-            </a:pPr>
-            <a:r>
-              <a:rPr lang="en-US" sz="704" noProof="0" dirty="0">
-                <a:solidFill>
-                  <a:schemeClr val="tx1"/>
-                </a:solidFill>
-              </a:rPr>
-              <a:t>© 2017 XXX</a:t>
-            </a:r>
-            <a:endParaRPr lang="fr-FR" sz="704" noProof="0" dirty="0">
-              <a:solidFill>
-                <a:schemeClr val="tx1"/>
-              </a:solidFill>
-            </a:endParaRPr>
-          </a:p>
-        </p:txBody>
-      </p:sp>
-      <p:sp>
-        <p:nvSpPr>
           <p:cNvPr id="19" name="Text Placeholder 18"/>
           <p:cNvSpPr>
             <a:spLocks noGrp="1"/>
@@ -6355,60 +7253,6 @@
               <a:rPr lang="en-US" noProof="0" dirty="0"/>
               <a:t>Fifth level</a:t>
             </a:r>
-          </a:p>
-        </p:txBody>
-      </p:sp>
-      <p:sp>
-        <p:nvSpPr>
-          <p:cNvPr id="3" name="TextBox 2"/>
-          <p:cNvSpPr txBox="1"/>
-          <p:nvPr userDrawn="1"/>
-        </p:nvSpPr>
-        <p:spPr>
-          <a:xfrm>
-            <a:off x="9986759" y="7138988"/>
-            <a:ext cx="270079" cy="108363"/>
-          </a:xfrm>
-          <a:prstGeom prst="rect">
-            <a:avLst/>
-          </a:prstGeom>
-          <a:noFill/>
-        </p:spPr>
-        <p:txBody>
-          <a:bodyPr wrap="square" lIns="0" tIns="0" rIns="0" bIns="0" rtlCol="0">
-            <a:noAutofit/>
-          </a:bodyPr>
-          <a:lstStyle/>
-          <a:p>
-            <a:pPr marL="0" indent="0" algn="r">
-              <a:spcBef>
-                <a:spcPts val="650"/>
-              </a:spcBef>
-              <a:buSzPct val="100000"/>
-              <a:buFont typeface="Arial"/>
-              <a:buNone/>
-            </a:pPr>
-            <a:fld id="{C58DF478-B544-4ED8-9ED4-6A2648E2D233}" type="slidenum">
-              <a:rPr lang="en-US" sz="704" noProof="0" smtClean="0">
-                <a:solidFill>
-                  <a:schemeClr val="tx1"/>
-                </a:solidFill>
-              </a:rPr>
-              <a:pPr marL="0" indent="0" algn="r">
-                <a:spcBef>
-                  <a:spcPts val="650"/>
-                </a:spcBef>
-                <a:buSzPct val="100000"/>
-                <a:buFont typeface="Arial"/>
-                <a:buNone/>
-              </a:pPr>
-              <a:t>‹#›</a:t>
-            </a:fld>
-            <a:endParaRPr lang="en-US" sz="704" noProof="0" dirty="0">
-              <a:solidFill>
-                <a:schemeClr val="tx1"/>
-              </a:solidFill>
-            </a:endParaRPr>
           </a:p>
         </p:txBody>
       </p:sp>
@@ -7112,7 +7956,7 @@
         </p:nvSpPr>
         <p:spPr bwMode="gray">
           <a:xfrm>
-            <a:off x="831273" y="1136073"/>
+            <a:off x="757383" y="417936"/>
             <a:ext cx="2946400" cy="1136072"/>
           </a:xfrm>
           <a:prstGeom prst="rect">
@@ -7155,6 +7999,232 @@
           </a:p>
         </p:txBody>
       </p:sp>
+      <p:pic>
+        <p:nvPicPr>
+          <p:cNvPr id="4" name="Picture 3" descr="A picture containing drawing&#10;&#10;Description automatically generated">
+            <a:extLst>
+              <a:ext uri="{FF2B5EF4-FFF2-40B4-BE49-F238E27FC236}">
+                <a16:creationId xmlns:a16="http://schemas.microsoft.com/office/drawing/2014/main" id="{58D373F6-7E7A-4201-959C-ECEFA520F9D3}"/>
+              </a:ext>
+            </a:extLst>
+          </p:cNvPr>
+          <p:cNvPicPr>
+            <a:picLocks noChangeAspect="1"/>
+          </p:cNvPicPr>
+          <p:nvPr/>
+        </p:nvPicPr>
+        <p:blipFill>
+          <a:blip r:embed="rId2"/>
+          <a:stretch>
+            <a:fillRect/>
+          </a:stretch>
+        </p:blipFill>
+        <p:spPr>
+          <a:xfrm>
+            <a:off x="7201764" y="417936"/>
+            <a:ext cx="2659424" cy="2984812"/>
+          </a:xfrm>
+          <a:prstGeom prst="rect">
+            <a:avLst/>
+          </a:prstGeom>
+        </p:spPr>
+      </p:pic>
+      <p:graphicFrame>
+        <p:nvGraphicFramePr>
+          <p:cNvPr id="7" name="Chart 6">
+            <a:extLst>
+              <a:ext uri="{FF2B5EF4-FFF2-40B4-BE49-F238E27FC236}">
+                <a16:creationId xmlns:a16="http://schemas.microsoft.com/office/drawing/2014/main" id="{CE2D3782-8DE1-434B-9943-C0C12F30C476}"/>
+              </a:ext>
+            </a:extLst>
+          </p:cNvPr>
+          <p:cNvGraphicFramePr/>
+          <p:nvPr>
+            <p:extLst>
+              <p:ext uri="{D42A27DB-BD31-4B8C-83A1-F6EECF244321}">
+                <p14:modId xmlns:p14="http://schemas.microsoft.com/office/powerpoint/2010/main" val="637206286"/>
+              </p:ext>
+            </p:extLst>
+          </p:nvPr>
+        </p:nvGraphicFramePr>
+        <p:xfrm>
+          <a:off x="757383" y="1976582"/>
+          <a:ext cx="4451926" cy="3671214"/>
+        </p:xfrm>
+        <a:graphic>
+          <a:graphicData uri="http://schemas.openxmlformats.org/drawingml/2006/chart">
+            <c:chart xmlns:c="http://schemas.openxmlformats.org/drawingml/2006/chart" xmlns:r="http://schemas.openxmlformats.org/officeDocument/2006/relationships" r:id="rId3"/>
+          </a:graphicData>
+        </a:graphic>
+      </p:graphicFrame>
+      <p:graphicFrame>
+        <p:nvGraphicFramePr>
+          <p:cNvPr id="9" name="Table 9">
+            <a:extLst>
+              <a:ext uri="{FF2B5EF4-FFF2-40B4-BE49-F238E27FC236}">
+                <a16:creationId xmlns:a16="http://schemas.microsoft.com/office/drawing/2014/main" id="{2275C2E6-9FCA-4C00-862E-6EB14C4FD39B}"/>
+              </a:ext>
+            </a:extLst>
+          </p:cNvPr>
+          <p:cNvGraphicFramePr>
+            <a:graphicFrameLocks noGrp="1"/>
+          </p:cNvGraphicFramePr>
+          <p:nvPr>
+            <p:extLst>
+              <p:ext uri="{D42A27DB-BD31-4B8C-83A1-F6EECF244321}">
+                <p14:modId xmlns:p14="http://schemas.microsoft.com/office/powerpoint/2010/main" val="752226698"/>
+              </p:ext>
+            </p:extLst>
+          </p:nvPr>
+        </p:nvGraphicFramePr>
+        <p:xfrm>
+          <a:off x="757383" y="5754206"/>
+          <a:ext cx="7127874" cy="1165860"/>
+        </p:xfrm>
+        <a:graphic>
+          <a:graphicData uri="http://schemas.openxmlformats.org/drawingml/2006/table">
+            <a:tbl>
+              <a:tblPr firstRow="1" bandRow="1">
+                <a:tableStyleId>{5C22544A-7EE6-4342-B048-85BDC9FD1C3A}</a:tableStyleId>
+              </a:tblPr>
+              <a:tblGrid>
+                <a:gridCol w="2375958">
+                  <a:extLst>
+                    <a:ext uri="{9D8B030D-6E8A-4147-A177-3AD203B41FA5}">
+                      <a16:colId xmlns:a16="http://schemas.microsoft.com/office/drawing/2014/main" val="1847140761"/>
+                    </a:ext>
+                  </a:extLst>
+                </a:gridCol>
+                <a:gridCol w="2375958">
+                  <a:extLst>
+                    <a:ext uri="{9D8B030D-6E8A-4147-A177-3AD203B41FA5}">
+                      <a16:colId xmlns:a16="http://schemas.microsoft.com/office/drawing/2014/main" val="2114985627"/>
+                    </a:ext>
+                  </a:extLst>
+                </a:gridCol>
+                <a:gridCol w="2375958">
+                  <a:extLst>
+                    <a:ext uri="{9D8B030D-6E8A-4147-A177-3AD203B41FA5}">
+                      <a16:colId xmlns:a16="http://schemas.microsoft.com/office/drawing/2014/main" val="2340164591"/>
+                    </a:ext>
+                  </a:extLst>
+                </a:gridCol>
+              </a:tblGrid>
+              <a:tr h="370840">
+                <a:tc>
+                  <a:txBody>
+                    <a:bodyPr/>
+                    <a:lstStyle/>
+                    <a:p>
+                      <a:endParaRPr lang="LID4096"/>
+                    </a:p>
+                  </a:txBody>
+                  <a:tcPr/>
+                </a:tc>
+                <a:tc>
+                  <a:txBody>
+                    <a:bodyPr/>
+                    <a:lstStyle/>
+                    <a:p>
+                      <a:endParaRPr lang="LID4096"/>
+                    </a:p>
+                  </a:txBody>
+                  <a:tcPr/>
+                </a:tc>
+                <a:tc>
+                  <a:txBody>
+                    <a:bodyPr/>
+                    <a:lstStyle/>
+                    <a:p>
+                      <a:endParaRPr lang="LID4096" dirty="0"/>
+                    </a:p>
+                  </a:txBody>
+                  <a:tcPr/>
+                </a:tc>
+                <a:extLst>
+                  <a:ext uri="{0D108BD9-81ED-4DB2-BD59-A6C34878D82A}">
+                    <a16:rowId xmlns:a16="http://schemas.microsoft.com/office/drawing/2014/main" val="447175001"/>
+                  </a:ext>
+                </a:extLst>
+              </a:tr>
+              <a:tr h="370840">
+                <a:tc>
+                  <a:txBody>
+                    <a:bodyPr/>
+                    <a:lstStyle/>
+                    <a:p>
+                      <a:endParaRPr lang="LID4096"/>
+                    </a:p>
+                  </a:txBody>
+                  <a:tcPr/>
+                </a:tc>
+                <a:tc>
+                  <a:txBody>
+                    <a:bodyPr/>
+                    <a:lstStyle/>
+                    <a:p>
+                      <a:endParaRPr lang="LID4096"/>
+                    </a:p>
+                  </a:txBody>
+                  <a:tcPr/>
+                </a:tc>
+                <a:tc>
+                  <a:txBody>
+                    <a:bodyPr/>
+                    <a:lstStyle/>
+                    <a:p>
+                      <a:endParaRPr lang="LID4096"/>
+                    </a:p>
+                  </a:txBody>
+                  <a:tcPr/>
+                </a:tc>
+                <a:extLst>
+                  <a:ext uri="{0D108BD9-81ED-4DB2-BD59-A6C34878D82A}">
+                    <a16:rowId xmlns:a16="http://schemas.microsoft.com/office/drawing/2014/main" val="314585811"/>
+                  </a:ext>
+                </a:extLst>
+              </a:tr>
+              <a:tr h="370840">
+                <a:tc>
+                  <a:txBody>
+                    <a:bodyPr/>
+                    <a:lstStyle/>
+                    <a:p>
+                      <a:endParaRPr lang="LID4096"/>
+                    </a:p>
+                  </a:txBody>
+                  <a:tcPr/>
+                </a:tc>
+                <a:tc>
+                  <a:txBody>
+                    <a:bodyPr/>
+                    <a:lstStyle/>
+                    <a:p>
+                      <a:endParaRPr lang="LID4096"/>
+                    </a:p>
+                  </a:txBody>
+                  <a:tcPr/>
+                </a:tc>
+                <a:tc>
+                  <a:txBody>
+                    <a:bodyPr/>
+                    <a:lstStyle/>
+                    <a:p>
+                      <a:endParaRPr lang="LID4096" dirty="0"/>
+                    </a:p>
+                  </a:txBody>
+                  <a:tcPr/>
+                </a:tc>
+                <a:extLst>
+                  <a:ext uri="{0D108BD9-81ED-4DB2-BD59-A6C34878D82A}">
+                    <a16:rowId xmlns:a16="http://schemas.microsoft.com/office/drawing/2014/main" val="1886769301"/>
+                  </a:ext>
+                </a:extLst>
+              </a:tr>
+            </a:tbl>
+          </a:graphicData>
+        </a:graphic>
+      </p:graphicFrame>
     </p:spTree>
     <p:extLst>
       <p:ext uri="{BB962C8B-B14F-4D97-AF65-F5344CB8AC3E}">

</xml_diff>